<commit_message>
Changes made for HTF2018
</commit_message>
<xml_diff>
--- a/Slides/Git for the Normal Developer.pptx
+++ b/Slides/Git for the Normal Developer.pptx
@@ -5,7 +5,7 @@
     <p:sldMasterId id="2147483648" r:id="rId1"/>
   </p:sldMasterIdLst>
   <p:notesMasterIdLst>
-    <p:notesMasterId r:id="rId29"/>
+    <p:notesMasterId r:id="rId31"/>
   </p:notesMasterIdLst>
   <p:sldIdLst>
     <p:sldId id="425" r:id="rId2"/>
@@ -28,13 +28,15 @@
     <p:sldId id="432" r:id="rId19"/>
     <p:sldId id="434" r:id="rId20"/>
     <p:sldId id="446" r:id="rId21"/>
-    <p:sldId id="447" r:id="rId22"/>
-    <p:sldId id="448" r:id="rId23"/>
-    <p:sldId id="449" r:id="rId24"/>
-    <p:sldId id="450" r:id="rId25"/>
-    <p:sldId id="451" r:id="rId26"/>
-    <p:sldId id="433" r:id="rId27"/>
-    <p:sldId id="423" r:id="rId28"/>
+    <p:sldId id="452" r:id="rId22"/>
+    <p:sldId id="453" r:id="rId23"/>
+    <p:sldId id="447" r:id="rId24"/>
+    <p:sldId id="448" r:id="rId25"/>
+    <p:sldId id="449" r:id="rId26"/>
+    <p:sldId id="450" r:id="rId27"/>
+    <p:sldId id="451" r:id="rId28"/>
+    <p:sldId id="433" r:id="rId29"/>
+    <p:sldId id="423" r:id="rId30"/>
   </p:sldIdLst>
   <p:sldSz cx="12192000" cy="6858000"/>
   <p:notesSz cx="6858000" cy="9144000"/>
@@ -158,6 +160,8 @@
             <p14:sldId id="432"/>
             <p14:sldId id="434"/>
             <p14:sldId id="446"/>
+            <p14:sldId id="452"/>
+            <p14:sldId id="453"/>
             <p14:sldId id="447"/>
             <p14:sldId id="448"/>
             <p14:sldId id="449"/>
@@ -281,7 +285,7 @@
           <a:p>
             <a:fld id="{1BEA97F8-B659-47CA-8766-3CBCF3366F26}" type="datetimeFigureOut">
               <a:rPr lang="en-US" smtClean="0"/>
-              <a:t>5/2/2018</a:t>
+              <a:t>5/4/2018</a:t>
             </a:fld>
             <a:endParaRPr lang="en-US"/>
           </a:p>
@@ -11850,10 +11854,10 @@
       </p:grpSpPr>
       <p:sp>
         <p:nvSpPr>
-          <p:cNvPr id="2" name="Title 1">
+          <p:cNvPr id="4" name="Title 3">
             <a:extLst>
               <a:ext uri="{FF2B5EF4-FFF2-40B4-BE49-F238E27FC236}">
-                <a16:creationId xmlns:a16="http://schemas.microsoft.com/office/drawing/2014/main" id="{F220168B-851B-448D-B065-1390D2D73C20}"/>
+                <a16:creationId xmlns:a16="http://schemas.microsoft.com/office/drawing/2014/main" id="{B4D0A662-C37A-473D-A246-0D681A71BA66}"/>
               </a:ext>
             </a:extLst>
           </p:cNvPr>
@@ -11871,40 +11875,66 @@
           <a:p>
             <a:r>
               <a:rPr lang="en-US" dirty="0"/>
-              <a:t>Common UI Tools</a:t>
+              <a:t>Gitflow</a:t>
             </a:r>
           </a:p>
         </p:txBody>
       </p:sp>
-      <p:sp>
-        <p:nvSpPr>
-          <p:cNvPr id="3" name="Text Placeholder 2">
+      <p:pic>
+        <p:nvPicPr>
+          <p:cNvPr id="7" name="Content Placeholder 6">
             <a:extLst>
               <a:ext uri="{FF2B5EF4-FFF2-40B4-BE49-F238E27FC236}">
-                <a16:creationId xmlns:a16="http://schemas.microsoft.com/office/drawing/2014/main" id="{1471B88D-28C1-4B4E-A5A7-4BC5DECCA821}"/>
+                <a16:creationId xmlns:a16="http://schemas.microsoft.com/office/drawing/2014/main" id="{EEB5084E-8EDB-474F-8DAC-73F4A7AF336D}"/>
               </a:ext>
             </a:extLst>
           </p:cNvPr>
-          <p:cNvSpPr>
-            <a:spLocks noGrp="1"/>
-          </p:cNvSpPr>
-          <p:nvPr>
-            <p:ph type="body" idx="1"/>
-          </p:nvPr>
-        </p:nvSpPr>
-        <p:spPr/>
-        <p:txBody>
-          <a:bodyPr/>
-          <a:lstStyle/>
-          <a:p>
-            <a:endParaRPr lang="en-US"/>
-          </a:p>
-        </p:txBody>
-      </p:sp>
+          <p:cNvPicPr>
+            <a:picLocks noGrp="1" noChangeAspect="1"/>
+          </p:cNvPicPr>
+          <p:nvPr>
+            <p:ph idx="1"/>
+          </p:nvPr>
+        </p:nvPicPr>
+        <p:blipFill>
+          <a:blip r:embed="rId2">
+            <a:extLst>
+              <a:ext uri="{28A0092B-C50C-407E-A947-70E740481C1C}">
+                <a14:useLocalDpi xmlns:a14="http://schemas.microsoft.com/office/drawing/2010/main" val="0"/>
+              </a:ext>
+              <a:ext uri="{96DAC541-7B7A-43D3-8B79-37D633B846F1}">
+                <asvg:svgBlip xmlns:asvg="http://schemas.microsoft.com/office/drawing/2016/SVG/main" r:embed="rId3"/>
+              </a:ext>
+            </a:extLst>
+          </a:blip>
+          <a:stretch>
+            <a:fillRect/>
+          </a:stretch>
+        </p:blipFill>
+        <p:spPr bwMode="auto">
+          <a:xfrm>
+            <a:off x="3063709" y="1825625"/>
+            <a:ext cx="6064582" cy="4351338"/>
+          </a:xfrm>
+          <a:prstGeom prst="rect">
+            <a:avLst/>
+          </a:prstGeom>
+          <a:noFill/>
+          <a:extLst>
+            <a:ext uri="{909E8E84-426E-40DD-AFC4-6F175D3DCCD1}">
+              <a14:hiddenFill xmlns:a14="http://schemas.microsoft.com/office/drawing/2010/main">
+                <a:solidFill>
+                  <a:srgbClr val="FFFFFF"/>
+                </a:solidFill>
+              </a14:hiddenFill>
+            </a:ext>
+          </a:extLst>
+        </p:spPr>
+      </p:pic>
     </p:spTree>
     <p:extLst>
       <p:ext uri="{BB962C8B-B14F-4D97-AF65-F5344CB8AC3E}">
-        <p14:creationId xmlns:p14="http://schemas.microsoft.com/office/powerpoint/2010/main" val="384892571"/>
+        <p14:creationId xmlns:p14="http://schemas.microsoft.com/office/powerpoint/2010/main" val="2377605413"/>
       </p:ext>
     </p:extLst>
   </p:cSld>
@@ -11936,7 +11966,7 @@
           <p:cNvPr id="2" name="Title 1">
             <a:extLst>
               <a:ext uri="{FF2B5EF4-FFF2-40B4-BE49-F238E27FC236}">
-                <a16:creationId xmlns:a16="http://schemas.microsoft.com/office/drawing/2014/main" id="{58877F43-7F96-4A05-9192-F72D5998C0FD}"/>
+                <a16:creationId xmlns:a16="http://schemas.microsoft.com/office/drawing/2014/main" id="{CC4A54E6-05F8-4D89-971E-BC053D209B94}"/>
               </a:ext>
             </a:extLst>
           </p:cNvPr>
@@ -11954,17 +11984,17 @@
           <a:p>
             <a:r>
               <a:rPr lang="en-US" dirty="0"/>
-              <a:t>The Command Line</a:t>
+              <a:t>Github Flow</a:t>
             </a:r>
           </a:p>
         </p:txBody>
       </p:sp>
       <p:pic>
         <p:nvPicPr>
-          <p:cNvPr id="4" name="Content Placeholder 3">
+          <p:cNvPr id="5" name="Content Placeholder 4">
             <a:extLst>
               <a:ext uri="{FF2B5EF4-FFF2-40B4-BE49-F238E27FC236}">
-                <a16:creationId xmlns:a16="http://schemas.microsoft.com/office/drawing/2014/main" id="{58CD5727-155C-4842-B31F-01A46BD28679}"/>
+                <a16:creationId xmlns:a16="http://schemas.microsoft.com/office/drawing/2014/main" id="{7A2BCEFD-3342-43C1-B40B-42DE90C5E3F6}"/>
               </a:ext>
             </a:extLst>
           </p:cNvPr>
@@ -11976,25 +12006,28 @@
           </p:nvPr>
         </p:nvPicPr>
         <p:blipFill>
-          <a:blip r:embed="rId2"/>
+          <a:blip r:embed="rId2">
+            <a:extLst>
+              <a:ext uri="{28A0092B-C50C-407E-A947-70E740481C1C}">
+                <a14:useLocalDpi xmlns:a14="http://schemas.microsoft.com/office/drawing/2010/main" val="0"/>
+              </a:ext>
+            </a:extLst>
+          </a:blip>
           <a:stretch>
             <a:fillRect/>
           </a:stretch>
         </p:blipFill>
         <p:spPr>
           <a:xfrm>
-            <a:off x="2032713" y="1881069"/>
-            <a:ext cx="8126574" cy="4240449"/>
-          </a:xfrm>
-          <a:prstGeom prst="rect">
-            <a:avLst/>
-          </a:prstGeom>
+            <a:off x="838200" y="2678073"/>
+            <a:ext cx="10515600" cy="2646442"/>
+          </a:xfrm>
         </p:spPr>
       </p:pic>
     </p:spTree>
     <p:extLst>
       <p:ext uri="{BB962C8B-B14F-4D97-AF65-F5344CB8AC3E}">
-        <p14:creationId xmlns:p14="http://schemas.microsoft.com/office/powerpoint/2010/main" val="1978598311"/>
+        <p14:creationId xmlns:p14="http://schemas.microsoft.com/office/powerpoint/2010/main" val="3213113248"/>
       </p:ext>
     </p:extLst>
   </p:cSld>
@@ -12026,7 +12059,7 @@
           <p:cNvPr id="2" name="Title 1">
             <a:extLst>
               <a:ext uri="{FF2B5EF4-FFF2-40B4-BE49-F238E27FC236}">
-                <a16:creationId xmlns:a16="http://schemas.microsoft.com/office/drawing/2014/main" id="{6F065B9B-DF9F-4EE1-A34B-B214540B13E1}"/>
+                <a16:creationId xmlns:a16="http://schemas.microsoft.com/office/drawing/2014/main" id="{F220168B-851B-448D-B065-1390D2D73C20}"/>
               </a:ext>
             </a:extLst>
           </p:cNvPr>
@@ -12044,17 +12077,17 @@
           <a:p>
             <a:r>
               <a:rPr lang="en-US" dirty="0"/>
-              <a:t>The Command Line</a:t>
+              <a:t>Common UI Tools</a:t>
             </a:r>
           </a:p>
         </p:txBody>
       </p:sp>
       <p:sp>
         <p:nvSpPr>
-          <p:cNvPr id="3" name="Content Placeholder 2">
+          <p:cNvPr id="3" name="Text Placeholder 2">
             <a:extLst>
               <a:ext uri="{FF2B5EF4-FFF2-40B4-BE49-F238E27FC236}">
-                <a16:creationId xmlns:a16="http://schemas.microsoft.com/office/drawing/2014/main" id="{C45A14B0-644B-4112-AA76-B2906EAB6FFB}"/>
+                <a16:creationId xmlns:a16="http://schemas.microsoft.com/office/drawing/2014/main" id="{1471B88D-28C1-4B4E-A5A7-4BC5DECCA821}"/>
               </a:ext>
             </a:extLst>
           </p:cNvPr>
@@ -12062,7 +12095,7 @@
             <a:spLocks noGrp="1"/>
           </p:cNvSpPr>
           <p:nvPr>
-            <p:ph idx="1"/>
+            <p:ph type="body" idx="1"/>
           </p:nvPr>
         </p:nvSpPr>
         <p:spPr/>
@@ -12070,58 +12103,14 @@
           <a:bodyPr/>
           <a:lstStyle/>
           <a:p>
-            <a:r>
-              <a:rPr lang="en-US" dirty="0"/>
-              <a:t>Advantages</a:t>
-            </a:r>
-          </a:p>
-          <a:p>
-            <a:pPr lvl="1"/>
-            <a:r>
-              <a:rPr lang="en-US" dirty="0"/>
-              <a:t>Ubiquitous</a:t>
-            </a:r>
-          </a:p>
-          <a:p>
-            <a:pPr lvl="1"/>
-            <a:r>
-              <a:rPr lang="en-US" dirty="0"/>
-              <a:t>Easy to find solutions, answers, hints</a:t>
-            </a:r>
-          </a:p>
-          <a:p>
-            <a:pPr lvl="1"/>
-            <a:r>
-              <a:rPr lang="en-US" dirty="0"/>
-              <a:t>It’s always there</a:t>
-            </a:r>
-          </a:p>
-          <a:p>
-            <a:r>
-              <a:rPr lang="en-US" dirty="0"/>
-              <a:t>Disadvantages</a:t>
-            </a:r>
-          </a:p>
-          <a:p>
-            <a:pPr lvl="1"/>
-            <a:r>
-              <a:rPr lang="en-US" dirty="0"/>
-              <a:t>It’s the command line.</a:t>
-            </a:r>
-          </a:p>
-          <a:p>
-            <a:pPr lvl="1"/>
-            <a:r>
-              <a:rPr lang="en-US" dirty="0"/>
-              <a:t>Seriously though… it’s the command line.</a:t>
-            </a:r>
+            <a:endParaRPr lang="en-US"/>
           </a:p>
         </p:txBody>
       </p:sp>
     </p:spTree>
     <p:extLst>
       <p:ext uri="{BB962C8B-B14F-4D97-AF65-F5344CB8AC3E}">
-        <p14:creationId xmlns:p14="http://schemas.microsoft.com/office/powerpoint/2010/main" val="2403642711"/>
+        <p14:creationId xmlns:p14="http://schemas.microsoft.com/office/powerpoint/2010/main" val="384892571"/>
       </p:ext>
     </p:extLst>
   </p:cSld>
@@ -12153,7 +12142,7 @@
           <p:cNvPr id="2" name="Title 1">
             <a:extLst>
               <a:ext uri="{FF2B5EF4-FFF2-40B4-BE49-F238E27FC236}">
-                <a16:creationId xmlns:a16="http://schemas.microsoft.com/office/drawing/2014/main" id="{52B9E538-2607-48E8-89B9-7E324991C43E}"/>
+                <a16:creationId xmlns:a16="http://schemas.microsoft.com/office/drawing/2014/main" id="{58877F43-7F96-4A05-9192-F72D5998C0FD}"/>
               </a:ext>
             </a:extLst>
           </p:cNvPr>
@@ -12171,7 +12160,7 @@
           <a:p>
             <a:r>
               <a:rPr lang="en-US" dirty="0"/>
-              <a:t>SourceTree</a:t>
+              <a:t>The Command Line</a:t>
             </a:r>
           </a:p>
         </p:txBody>
@@ -12181,7 +12170,7 @@
           <p:cNvPr id="4" name="Content Placeholder 3">
             <a:extLst>
               <a:ext uri="{FF2B5EF4-FFF2-40B4-BE49-F238E27FC236}">
-                <a16:creationId xmlns:a16="http://schemas.microsoft.com/office/drawing/2014/main" id="{170692BA-4A52-45A4-AD54-BDE3EB083DF2}"/>
+                <a16:creationId xmlns:a16="http://schemas.microsoft.com/office/drawing/2014/main" id="{58CD5727-155C-4842-B31F-01A46BD28679}"/>
               </a:ext>
             </a:extLst>
           </p:cNvPr>
@@ -12200,8 +12189,8 @@
         </p:blipFill>
         <p:spPr>
           <a:xfrm>
-            <a:off x="2228144" y="1825625"/>
-            <a:ext cx="7735711" cy="4351338"/>
+            <a:off x="2032713" y="1881069"/>
+            <a:ext cx="8126574" cy="4240449"/>
           </a:xfrm>
           <a:prstGeom prst="rect">
             <a:avLst/>
@@ -12211,7 +12200,7 @@
     </p:spTree>
     <p:extLst>
       <p:ext uri="{BB962C8B-B14F-4D97-AF65-F5344CB8AC3E}">
-        <p14:creationId xmlns:p14="http://schemas.microsoft.com/office/powerpoint/2010/main" val="932627191"/>
+        <p14:creationId xmlns:p14="http://schemas.microsoft.com/office/powerpoint/2010/main" val="1978598311"/>
       </p:ext>
     </p:extLst>
   </p:cSld>
@@ -12243,7 +12232,7 @@
           <p:cNvPr id="2" name="Title 1">
             <a:extLst>
               <a:ext uri="{FF2B5EF4-FFF2-40B4-BE49-F238E27FC236}">
-                <a16:creationId xmlns:a16="http://schemas.microsoft.com/office/drawing/2014/main" id="{47F9B615-73A8-454F-BA70-483057F276EF}"/>
+                <a16:creationId xmlns:a16="http://schemas.microsoft.com/office/drawing/2014/main" id="{6F065B9B-DF9F-4EE1-A34B-B214540B13E1}"/>
               </a:ext>
             </a:extLst>
           </p:cNvPr>
@@ -12261,7 +12250,7 @@
           <a:p>
             <a:r>
               <a:rPr lang="en-US" dirty="0"/>
-              <a:t>SourceTree</a:t>
+              <a:t>The Command Line</a:t>
             </a:r>
           </a:p>
         </p:txBody>
@@ -12271,7 +12260,7 @@
           <p:cNvPr id="3" name="Content Placeholder 2">
             <a:extLst>
               <a:ext uri="{FF2B5EF4-FFF2-40B4-BE49-F238E27FC236}">
-                <a16:creationId xmlns:a16="http://schemas.microsoft.com/office/drawing/2014/main" id="{FFC99A81-2CCC-44FA-A25B-613AAA5F0C11}"/>
+                <a16:creationId xmlns:a16="http://schemas.microsoft.com/office/drawing/2014/main" id="{C45A14B0-644B-4112-AA76-B2906EAB6FFB}"/>
               </a:ext>
             </a:extLst>
           </p:cNvPr>
@@ -12296,21 +12285,21 @@
             <a:pPr lvl="1"/>
             <a:r>
               <a:rPr lang="en-US" dirty="0"/>
-              <a:t>Common UI</a:t>
+              <a:t>Ubiquitous</a:t>
             </a:r>
           </a:p>
           <a:p>
             <a:pPr lvl="1"/>
             <a:r>
               <a:rPr lang="en-US" dirty="0"/>
-              <a:t>Easy to use</a:t>
+              <a:t>Easy to find solutions, answers, hints</a:t>
             </a:r>
           </a:p>
           <a:p>
             <a:pPr lvl="1"/>
             <a:r>
               <a:rPr lang="en-US" dirty="0"/>
-              <a:t>Multi-Platform</a:t>
+              <a:t>It’s always there</a:t>
             </a:r>
           </a:p>
           <a:p>
@@ -12323,18 +12312,14 @@
             <a:pPr lvl="1"/>
             <a:r>
               <a:rPr lang="en-US" dirty="0"/>
-              <a:t>Seems to update a LOT – this can be a pain</a:t>
+              <a:t>It’s the command line.</a:t>
             </a:r>
           </a:p>
           <a:p>
             <a:pPr lvl="1"/>
             <a:r>
               <a:rPr lang="en-US" dirty="0"/>
-              <a:t>Owned by Atlassian, requires </a:t>
-            </a:r>
-            <a:r>
-              <a:rPr lang="en-US"/>
-              <a:t>an account</a:t>
+              <a:t>Seriously though… it’s the command line.</a:t>
             </a:r>
           </a:p>
         </p:txBody>
@@ -12342,7 +12327,7 @@
     </p:spTree>
     <p:extLst>
       <p:ext uri="{BB962C8B-B14F-4D97-AF65-F5344CB8AC3E}">
-        <p14:creationId xmlns:p14="http://schemas.microsoft.com/office/powerpoint/2010/main" val="105811851"/>
+        <p14:creationId xmlns:p14="http://schemas.microsoft.com/office/powerpoint/2010/main" val="2403642711"/>
       </p:ext>
     </p:extLst>
   </p:cSld>
@@ -12374,6 +12359,227 @@
           <p:cNvPr id="2" name="Title 1">
             <a:extLst>
               <a:ext uri="{FF2B5EF4-FFF2-40B4-BE49-F238E27FC236}">
+                <a16:creationId xmlns:a16="http://schemas.microsoft.com/office/drawing/2014/main" id="{52B9E538-2607-48E8-89B9-7E324991C43E}"/>
+              </a:ext>
+            </a:extLst>
+          </p:cNvPr>
+          <p:cNvSpPr>
+            <a:spLocks noGrp="1"/>
+          </p:cNvSpPr>
+          <p:nvPr>
+            <p:ph type="title"/>
+          </p:nvPr>
+        </p:nvSpPr>
+        <p:spPr/>
+        <p:txBody>
+          <a:bodyPr/>
+          <a:lstStyle/>
+          <a:p>
+            <a:r>
+              <a:rPr lang="en-US" dirty="0"/>
+              <a:t>SourceTree</a:t>
+            </a:r>
+          </a:p>
+        </p:txBody>
+      </p:sp>
+      <p:pic>
+        <p:nvPicPr>
+          <p:cNvPr id="4" name="Content Placeholder 3">
+            <a:extLst>
+              <a:ext uri="{FF2B5EF4-FFF2-40B4-BE49-F238E27FC236}">
+                <a16:creationId xmlns:a16="http://schemas.microsoft.com/office/drawing/2014/main" id="{170692BA-4A52-45A4-AD54-BDE3EB083DF2}"/>
+              </a:ext>
+            </a:extLst>
+          </p:cNvPr>
+          <p:cNvPicPr>
+            <a:picLocks noGrp="1" noChangeAspect="1"/>
+          </p:cNvPicPr>
+          <p:nvPr>
+            <p:ph idx="1"/>
+          </p:nvPr>
+        </p:nvPicPr>
+        <p:blipFill>
+          <a:blip r:embed="rId2"/>
+          <a:stretch>
+            <a:fillRect/>
+          </a:stretch>
+        </p:blipFill>
+        <p:spPr>
+          <a:xfrm>
+            <a:off x="2228144" y="1825625"/>
+            <a:ext cx="7735711" cy="4351338"/>
+          </a:xfrm>
+          <a:prstGeom prst="rect">
+            <a:avLst/>
+          </a:prstGeom>
+        </p:spPr>
+      </p:pic>
+    </p:spTree>
+    <p:extLst>
+      <p:ext uri="{BB962C8B-B14F-4D97-AF65-F5344CB8AC3E}">
+        <p14:creationId xmlns:p14="http://schemas.microsoft.com/office/powerpoint/2010/main" val="932627191"/>
+      </p:ext>
+    </p:extLst>
+  </p:cSld>
+  <p:clrMapOvr>
+    <a:masterClrMapping/>
+  </p:clrMapOvr>
+</p:sld>
+</file>
+
+<file path=ppt/slides/slide27.xml><?xml version="1.0" encoding="utf-8"?>
+<p:sld xmlns:a="http://schemas.openxmlformats.org/drawingml/2006/main" xmlns:r="http://schemas.openxmlformats.org/officeDocument/2006/relationships" xmlns:p="http://schemas.openxmlformats.org/presentationml/2006/main">
+  <p:cSld>
+    <p:spTree>
+      <p:nvGrpSpPr>
+        <p:cNvPr id="1" name=""/>
+        <p:cNvGrpSpPr/>
+        <p:nvPr/>
+      </p:nvGrpSpPr>
+      <p:grpSpPr>
+        <a:xfrm>
+          <a:off x="0" y="0"/>
+          <a:ext cx="0" cy="0"/>
+          <a:chOff x="0" y="0"/>
+          <a:chExt cx="0" cy="0"/>
+        </a:xfrm>
+      </p:grpSpPr>
+      <p:sp>
+        <p:nvSpPr>
+          <p:cNvPr id="2" name="Title 1">
+            <a:extLst>
+              <a:ext uri="{FF2B5EF4-FFF2-40B4-BE49-F238E27FC236}">
+                <a16:creationId xmlns:a16="http://schemas.microsoft.com/office/drawing/2014/main" id="{47F9B615-73A8-454F-BA70-483057F276EF}"/>
+              </a:ext>
+            </a:extLst>
+          </p:cNvPr>
+          <p:cNvSpPr>
+            <a:spLocks noGrp="1"/>
+          </p:cNvSpPr>
+          <p:nvPr>
+            <p:ph type="title"/>
+          </p:nvPr>
+        </p:nvSpPr>
+        <p:spPr/>
+        <p:txBody>
+          <a:bodyPr/>
+          <a:lstStyle/>
+          <a:p>
+            <a:r>
+              <a:rPr lang="en-US" dirty="0"/>
+              <a:t>SourceTree</a:t>
+            </a:r>
+          </a:p>
+        </p:txBody>
+      </p:sp>
+      <p:sp>
+        <p:nvSpPr>
+          <p:cNvPr id="3" name="Content Placeholder 2">
+            <a:extLst>
+              <a:ext uri="{FF2B5EF4-FFF2-40B4-BE49-F238E27FC236}">
+                <a16:creationId xmlns:a16="http://schemas.microsoft.com/office/drawing/2014/main" id="{FFC99A81-2CCC-44FA-A25B-613AAA5F0C11}"/>
+              </a:ext>
+            </a:extLst>
+          </p:cNvPr>
+          <p:cNvSpPr>
+            <a:spLocks noGrp="1"/>
+          </p:cNvSpPr>
+          <p:nvPr>
+            <p:ph idx="1"/>
+          </p:nvPr>
+        </p:nvSpPr>
+        <p:spPr/>
+        <p:txBody>
+          <a:bodyPr/>
+          <a:lstStyle/>
+          <a:p>
+            <a:r>
+              <a:rPr lang="en-US" dirty="0"/>
+              <a:t>Advantages</a:t>
+            </a:r>
+          </a:p>
+          <a:p>
+            <a:pPr lvl="1"/>
+            <a:r>
+              <a:rPr lang="en-US" dirty="0"/>
+              <a:t>Common UI</a:t>
+            </a:r>
+          </a:p>
+          <a:p>
+            <a:pPr lvl="1"/>
+            <a:r>
+              <a:rPr lang="en-US" dirty="0"/>
+              <a:t>Easy to use</a:t>
+            </a:r>
+          </a:p>
+          <a:p>
+            <a:pPr lvl="1"/>
+            <a:r>
+              <a:rPr lang="en-US" dirty="0"/>
+              <a:t>Multi-Platform</a:t>
+            </a:r>
+          </a:p>
+          <a:p>
+            <a:r>
+              <a:rPr lang="en-US" dirty="0"/>
+              <a:t>Disadvantages</a:t>
+            </a:r>
+          </a:p>
+          <a:p>
+            <a:pPr lvl="1"/>
+            <a:r>
+              <a:rPr lang="en-US" dirty="0"/>
+              <a:t>Seems to update a LOT – this can be a pain</a:t>
+            </a:r>
+          </a:p>
+          <a:p>
+            <a:pPr lvl="1"/>
+            <a:r>
+              <a:rPr lang="en-US" dirty="0"/>
+              <a:t>Owned by Atlassian, requires </a:t>
+            </a:r>
+            <a:r>
+              <a:rPr lang="en-US"/>
+              <a:t>an account</a:t>
+            </a:r>
+          </a:p>
+        </p:txBody>
+      </p:sp>
+    </p:spTree>
+    <p:extLst>
+      <p:ext uri="{BB962C8B-B14F-4D97-AF65-F5344CB8AC3E}">
+        <p14:creationId xmlns:p14="http://schemas.microsoft.com/office/powerpoint/2010/main" val="105811851"/>
+      </p:ext>
+    </p:extLst>
+  </p:cSld>
+  <p:clrMapOvr>
+    <a:masterClrMapping/>
+  </p:clrMapOvr>
+</p:sld>
+</file>
+
+<file path=ppt/slides/slide28.xml><?xml version="1.0" encoding="utf-8"?>
+<p:sld xmlns:a="http://schemas.openxmlformats.org/drawingml/2006/main" xmlns:r="http://schemas.openxmlformats.org/officeDocument/2006/relationships" xmlns:p="http://schemas.openxmlformats.org/presentationml/2006/main">
+  <p:cSld>
+    <p:spTree>
+      <p:nvGrpSpPr>
+        <p:cNvPr id="1" name=""/>
+        <p:cNvGrpSpPr/>
+        <p:nvPr/>
+      </p:nvGrpSpPr>
+      <p:grpSpPr>
+        <a:xfrm>
+          <a:off x="0" y="0"/>
+          <a:ext cx="0" cy="0"/>
+          <a:chOff x="0" y="0"/>
+          <a:chExt cx="0" cy="0"/>
+        </a:xfrm>
+      </p:grpSpPr>
+      <p:sp>
+        <p:nvSpPr>
+          <p:cNvPr id="2" name="Title 1">
+            <a:extLst>
+              <a:ext uri="{FF2B5EF4-FFF2-40B4-BE49-F238E27FC236}">
                 <a16:creationId xmlns:a16="http://schemas.microsoft.com/office/drawing/2014/main" id="{BF5778DD-3C07-454D-981B-E4BE4CA84837}"/>
               </a:ext>
             </a:extLst>
@@ -12489,7 +12695,7 @@
 </p:sld>
 </file>
 
-<file path=ppt/slides/slide27.xml><?xml version="1.0" encoding="utf-8"?>
+<file path=ppt/slides/slide29.xml><?xml version="1.0" encoding="utf-8"?>
 <p:sld xmlns:a="http://schemas.openxmlformats.org/drawingml/2006/main" xmlns:r="http://schemas.openxmlformats.org/officeDocument/2006/relationships" xmlns:p="http://schemas.openxmlformats.org/presentationml/2006/main">
   <p:cSld>
     <p:spTree>

</xml_diff>

<commit_message>
added merge, rebase information
</commit_message>
<xml_diff>
--- a/Slides/Git for the Normal Developer.pptx
+++ b/Slides/Git for the Normal Developer.pptx
@@ -5,7 +5,7 @@
     <p:sldMasterId id="2147483648" r:id="rId1"/>
   </p:sldMasterIdLst>
   <p:notesMasterIdLst>
-    <p:notesMasterId r:id="rId33"/>
+    <p:notesMasterId r:id="rId38"/>
   </p:notesMasterIdLst>
   <p:sldIdLst>
     <p:sldId id="425" r:id="rId2"/>
@@ -15,30 +15,35 @@
     <p:sldId id="441" r:id="rId6"/>
     <p:sldId id="454" r:id="rId7"/>
     <p:sldId id="455" r:id="rId8"/>
-    <p:sldId id="437" r:id="rId9"/>
-    <p:sldId id="438" r:id="rId10"/>
-    <p:sldId id="439" r:id="rId11"/>
-    <p:sldId id="440" r:id="rId12"/>
-    <p:sldId id="442" r:id="rId13"/>
-    <p:sldId id="443" r:id="rId14"/>
-    <p:sldId id="444" r:id="rId15"/>
-    <p:sldId id="445" r:id="rId16"/>
-    <p:sldId id="435" r:id="rId17"/>
-    <p:sldId id="429" r:id="rId18"/>
-    <p:sldId id="430" r:id="rId19"/>
-    <p:sldId id="431" r:id="rId20"/>
-    <p:sldId id="432" r:id="rId21"/>
-    <p:sldId id="434" r:id="rId22"/>
-    <p:sldId id="446" r:id="rId23"/>
-    <p:sldId id="452" r:id="rId24"/>
-    <p:sldId id="453" r:id="rId25"/>
-    <p:sldId id="447" r:id="rId26"/>
-    <p:sldId id="448" r:id="rId27"/>
-    <p:sldId id="449" r:id="rId28"/>
-    <p:sldId id="450" r:id="rId29"/>
-    <p:sldId id="451" r:id="rId30"/>
-    <p:sldId id="433" r:id="rId31"/>
-    <p:sldId id="423" r:id="rId32"/>
+    <p:sldId id="456" r:id="rId9"/>
+    <p:sldId id="457" r:id="rId10"/>
+    <p:sldId id="458" r:id="rId11"/>
+    <p:sldId id="459" r:id="rId12"/>
+    <p:sldId id="460" r:id="rId13"/>
+    <p:sldId id="437" r:id="rId14"/>
+    <p:sldId id="438" r:id="rId15"/>
+    <p:sldId id="439" r:id="rId16"/>
+    <p:sldId id="440" r:id="rId17"/>
+    <p:sldId id="442" r:id="rId18"/>
+    <p:sldId id="443" r:id="rId19"/>
+    <p:sldId id="444" r:id="rId20"/>
+    <p:sldId id="445" r:id="rId21"/>
+    <p:sldId id="435" r:id="rId22"/>
+    <p:sldId id="429" r:id="rId23"/>
+    <p:sldId id="430" r:id="rId24"/>
+    <p:sldId id="431" r:id="rId25"/>
+    <p:sldId id="432" r:id="rId26"/>
+    <p:sldId id="434" r:id="rId27"/>
+    <p:sldId id="446" r:id="rId28"/>
+    <p:sldId id="452" r:id="rId29"/>
+    <p:sldId id="453" r:id="rId30"/>
+    <p:sldId id="447" r:id="rId31"/>
+    <p:sldId id="448" r:id="rId32"/>
+    <p:sldId id="449" r:id="rId33"/>
+    <p:sldId id="450" r:id="rId34"/>
+    <p:sldId id="451" r:id="rId35"/>
+    <p:sldId id="433" r:id="rId36"/>
+    <p:sldId id="423" r:id="rId37"/>
   </p:sldIdLst>
   <p:sldSz cx="12192000" cy="6858000"/>
   <p:notesSz cx="6858000" cy="9144000"/>
@@ -149,6 +154,11 @@
             <p14:sldId id="441"/>
             <p14:sldId id="454"/>
             <p14:sldId id="455"/>
+            <p14:sldId id="456"/>
+            <p14:sldId id="457"/>
+            <p14:sldId id="458"/>
+            <p14:sldId id="459"/>
+            <p14:sldId id="460"/>
             <p14:sldId id="437"/>
             <p14:sldId id="438"/>
             <p14:sldId id="439"/>
@@ -289,7 +299,7 @@
           <a:p>
             <a:fld id="{1BEA97F8-B659-47CA-8766-3CBCF3366F26}" type="datetimeFigureOut">
               <a:rPr lang="en-US" smtClean="0"/>
-              <a:t>6/12/2019</a:t>
+              <a:t>6/13/2019</a:t>
             </a:fld>
             <a:endParaRPr lang="en-US"/>
           </a:p>
@@ -1076,7 +1086,7 @@
           <a:noFill/>
           <a:extLst>
             <a:ext uri="{909E8E84-426E-40dd-AFC4-6F175D3DCCD1}">
-              <a14:hiddenFill xmlns="" xmlns:a14="http://schemas.microsoft.com/office/drawing/2010/main">
+              <a14:hiddenFill xmlns:a14="http://schemas.microsoft.com/office/drawing/2010/main" xmlns="">
                 <a:solidFill>
                   <a:srgbClr val="FFFFFF"/>
                 </a:solidFill>
@@ -1292,7 +1302,7 @@
           <a:noFill/>
           <a:extLst>
             <a:ext uri="{909E8E84-426E-40dd-AFC4-6F175D3DCCD1}">
-              <a14:hiddenFill xmlns="" xmlns:a14="http://schemas.microsoft.com/office/drawing/2010/main">
+              <a14:hiddenFill xmlns:a14="http://schemas.microsoft.com/office/drawing/2010/main" xmlns="">
                 <a:solidFill>
                   <a:srgbClr val="FFFFFF"/>
                 </a:solidFill>
@@ -1331,7 +1341,7 @@
           <a:noFill/>
           <a:extLst>
             <a:ext uri="{909E8E84-426E-40dd-AFC4-6F175D3DCCD1}">
-              <a14:hiddenFill xmlns="" xmlns:a14="http://schemas.microsoft.com/office/drawing/2010/main">
+              <a14:hiddenFill xmlns:a14="http://schemas.microsoft.com/office/drawing/2010/main" xmlns="">
                 <a:solidFill>
                   <a:srgbClr val="FFFFFF"/>
                 </a:solidFill>
@@ -1517,7 +1527,7 @@
           <a:noFill/>
           <a:extLst>
             <a:ext uri="{909E8E84-426E-40dd-AFC4-6F175D3DCCD1}">
-              <a14:hiddenFill xmlns="" xmlns:a14="http://schemas.microsoft.com/office/drawing/2010/main">
+              <a14:hiddenFill xmlns:a14="http://schemas.microsoft.com/office/drawing/2010/main" xmlns="">
                 <a:solidFill>
                   <a:srgbClr val="FFFFFF"/>
                 </a:solidFill>
@@ -1733,7 +1743,7 @@
           <a:noFill/>
           <a:extLst>
             <a:ext uri="{909E8E84-426E-40dd-AFC4-6F175D3DCCD1}">
-              <a14:hiddenFill xmlns="" xmlns:a14="http://schemas.microsoft.com/office/drawing/2010/main">
+              <a14:hiddenFill xmlns:a14="http://schemas.microsoft.com/office/drawing/2010/main" xmlns="">
                 <a:solidFill>
                   <a:srgbClr val="FFFFFF"/>
                 </a:solidFill>
@@ -1781,7 +1791,7 @@
           <a:noFill/>
           <a:extLst>
             <a:ext uri="{909E8E84-426E-40dd-AFC4-6F175D3DCCD1}">
-              <a14:hiddenFill xmlns="" xmlns:a14="http://schemas.microsoft.com/office/drawing/2010/main">
+              <a14:hiddenFill xmlns:a14="http://schemas.microsoft.com/office/drawing/2010/main" xmlns="">
                 <a:solidFill>
                   <a:srgbClr val="FFFFFF"/>
                 </a:solidFill>
@@ -1967,7 +1977,7 @@
           <a:noFill/>
           <a:extLst>
             <a:ext uri="{909E8E84-426E-40dd-AFC4-6F175D3DCCD1}">
-              <a14:hiddenFill xmlns="" xmlns:a14="http://schemas.microsoft.com/office/drawing/2010/main">
+              <a14:hiddenFill xmlns:a14="http://schemas.microsoft.com/office/drawing/2010/main" xmlns="">
                 <a:solidFill>
                   <a:srgbClr val="FFFFFF"/>
                 </a:solidFill>
@@ -2182,7 +2192,7 @@
           <a:noFill/>
           <a:extLst>
             <a:ext uri="{909E8E84-426E-40dd-AFC4-6F175D3DCCD1}">
-              <a14:hiddenFill xmlns="" xmlns:a14="http://schemas.microsoft.com/office/drawing/2010/main">
+              <a14:hiddenFill xmlns:a14="http://schemas.microsoft.com/office/drawing/2010/main" xmlns="">
                 <a:solidFill>
                   <a:srgbClr val="FFFFFF"/>
                 </a:solidFill>
@@ -2398,7 +2408,7 @@
           <a:noFill/>
           <a:extLst>
             <a:ext uri="{909E8E84-426E-40dd-AFC4-6F175D3DCCD1}">
-              <a14:hiddenFill xmlns="" xmlns:a14="http://schemas.microsoft.com/office/drawing/2010/main">
+              <a14:hiddenFill xmlns:a14="http://schemas.microsoft.com/office/drawing/2010/main" xmlns="">
                 <a:solidFill>
                   <a:srgbClr val="FFFFFF"/>
                 </a:solidFill>
@@ -2613,7 +2623,7 @@
           <a:noFill/>
           <a:extLst>
             <a:ext uri="{909E8E84-426E-40dd-AFC4-6F175D3DCCD1}">
-              <a14:hiddenFill xmlns="" xmlns:a14="http://schemas.microsoft.com/office/drawing/2010/main">
+              <a14:hiddenFill xmlns:a14="http://schemas.microsoft.com/office/drawing/2010/main" xmlns="">
                 <a:solidFill>
                   <a:srgbClr val="FFFFFF"/>
                 </a:solidFill>
@@ -2829,7 +2839,7 @@
           <a:noFill/>
           <a:extLst>
             <a:ext uri="{909E8E84-426E-40dd-AFC4-6F175D3DCCD1}">
-              <a14:hiddenFill xmlns="" xmlns:a14="http://schemas.microsoft.com/office/drawing/2010/main">
+              <a14:hiddenFill xmlns:a14="http://schemas.microsoft.com/office/drawing/2010/main" xmlns="">
                 <a:solidFill>
                   <a:srgbClr val="FFFFFF"/>
                 </a:solidFill>
@@ -3192,7 +3202,7 @@
           <a:noFill/>
           <a:extLst>
             <a:ext uri="{909E8E84-426E-40dd-AFC4-6F175D3DCCD1}">
-              <a14:hiddenFill xmlns="" xmlns:a14="http://schemas.microsoft.com/office/drawing/2010/main">
+              <a14:hiddenFill xmlns:a14="http://schemas.microsoft.com/office/drawing/2010/main" xmlns="">
                 <a:solidFill>
                   <a:srgbClr val="FFFFFF"/>
                 </a:solidFill>
@@ -3231,7 +3241,7 @@
           <a:noFill/>
           <a:extLst>
             <a:ext uri="{909E8E84-426E-40dd-AFC4-6F175D3DCCD1}">
-              <a14:hiddenFill xmlns="" xmlns:a14="http://schemas.microsoft.com/office/drawing/2010/main">
+              <a14:hiddenFill xmlns:a14="http://schemas.microsoft.com/office/drawing/2010/main" xmlns="">
                 <a:solidFill>
                   <a:srgbClr val="FFFFFF"/>
                 </a:solidFill>
@@ -3270,7 +3280,7 @@
           <a:noFill/>
           <a:extLst>
             <a:ext uri="{909E8E84-426E-40dd-AFC4-6F175D3DCCD1}">
-              <a14:hiddenFill xmlns="" xmlns:a14="http://schemas.microsoft.com/office/drawing/2010/main">
+              <a14:hiddenFill xmlns:a14="http://schemas.microsoft.com/office/drawing/2010/main" xmlns="">
                 <a:solidFill>
                   <a:srgbClr val="FFFFFF"/>
                 </a:solidFill>
@@ -3456,7 +3466,7 @@
           <a:noFill/>
           <a:extLst>
             <a:ext uri="{909E8E84-426E-40dd-AFC4-6F175D3DCCD1}">
-              <a14:hiddenFill xmlns="" xmlns:a14="http://schemas.microsoft.com/office/drawing/2010/main">
+              <a14:hiddenFill xmlns:a14="http://schemas.microsoft.com/office/drawing/2010/main" xmlns="">
                 <a:solidFill>
                   <a:srgbClr val="FFFFFF"/>
                 </a:solidFill>
@@ -3613,7 +3623,7 @@
           <a:noFill/>
           <a:extLst>
             <a:ext uri="{909E8E84-426E-40dd-AFC4-6F175D3DCCD1}">
-              <a14:hiddenFill xmlns="" xmlns:a14="http://schemas.microsoft.com/office/drawing/2010/main">
+              <a14:hiddenFill xmlns:a14="http://schemas.microsoft.com/office/drawing/2010/main" xmlns="">
                 <a:solidFill>
                   <a:srgbClr val="FFFFFF"/>
                 </a:solidFill>
@@ -3690,7 +3700,7 @@
           <a:noFill/>
           <a:extLst>
             <a:ext uri="{909E8E84-426E-40dd-AFC4-6F175D3DCCD1}">
-              <a14:hiddenFill xmlns="" xmlns:a14="http://schemas.microsoft.com/office/drawing/2010/main">
+              <a14:hiddenFill xmlns:a14="http://schemas.microsoft.com/office/drawing/2010/main" xmlns="">
                 <a:solidFill>
                   <a:srgbClr val="FFFFFF"/>
                 </a:solidFill>
@@ -3729,7 +3739,7 @@
           <a:noFill/>
           <a:extLst>
             <a:ext uri="{909E8E84-426E-40dd-AFC4-6F175D3DCCD1}">
-              <a14:hiddenFill xmlns="" xmlns:a14="http://schemas.microsoft.com/office/drawing/2010/main">
+              <a14:hiddenFill xmlns:a14="http://schemas.microsoft.com/office/drawing/2010/main" xmlns="">
                 <a:solidFill>
                   <a:srgbClr val="FFFFFF"/>
                 </a:solidFill>
@@ -3915,7 +3925,7 @@
           <a:noFill/>
           <a:extLst>
             <a:ext uri="{909E8E84-426E-40dd-AFC4-6F175D3DCCD1}">
-              <a14:hiddenFill xmlns="" xmlns:a14="http://schemas.microsoft.com/office/drawing/2010/main">
+              <a14:hiddenFill xmlns:a14="http://schemas.microsoft.com/office/drawing/2010/main" xmlns="">
                 <a:solidFill>
                   <a:srgbClr val="FFFFFF"/>
                 </a:solidFill>
@@ -4130,7 +4140,7 @@
           <a:noFill/>
           <a:extLst>
             <a:ext uri="{909E8E84-426E-40dd-AFC4-6F175D3DCCD1}">
-              <a14:hiddenFill xmlns="" xmlns:a14="http://schemas.microsoft.com/office/drawing/2010/main">
+              <a14:hiddenFill xmlns:a14="http://schemas.microsoft.com/office/drawing/2010/main" xmlns="">
                 <a:solidFill>
                   <a:srgbClr val="FFFFFF"/>
                 </a:solidFill>
@@ -4280,7 +4290,7 @@
           <a:noFill/>
           <a:extLst>
             <a:ext uri="{909E8E84-426E-40dd-AFC4-6F175D3DCCD1}">
-              <a14:hiddenFill xmlns="" xmlns:a14="http://schemas.microsoft.com/office/drawing/2010/main">
+              <a14:hiddenFill xmlns:a14="http://schemas.microsoft.com/office/drawing/2010/main" xmlns="">
                 <a:solidFill>
                   <a:srgbClr val="FFFFFF"/>
                 </a:solidFill>
@@ -4357,7 +4367,7 @@
           <a:noFill/>
           <a:extLst>
             <a:ext uri="{909E8E84-426E-40dd-AFC4-6F175D3DCCD1}">
-              <a14:hiddenFill xmlns="" xmlns:a14="http://schemas.microsoft.com/office/drawing/2010/main">
+              <a14:hiddenFill xmlns:a14="http://schemas.microsoft.com/office/drawing/2010/main" xmlns="">
                 <a:solidFill>
                   <a:srgbClr val="FFFFFF"/>
                 </a:solidFill>
@@ -4573,7 +4583,7 @@
           <a:noFill/>
           <a:extLst>
             <a:ext uri="{909E8E84-426E-40dd-AFC4-6F175D3DCCD1}">
-              <a14:hiddenFill xmlns="" xmlns:a14="http://schemas.microsoft.com/office/drawing/2010/main">
+              <a14:hiddenFill xmlns:a14="http://schemas.microsoft.com/office/drawing/2010/main" xmlns="">
                 <a:solidFill>
                   <a:srgbClr val="FFFFFF"/>
                 </a:solidFill>
@@ -4723,7 +4733,7 @@
           <a:noFill/>
           <a:extLst>
             <a:ext uri="{909E8E84-426E-40dd-AFC4-6F175D3DCCD1}">
-              <a14:hiddenFill xmlns="" xmlns:a14="http://schemas.microsoft.com/office/drawing/2010/main">
+              <a14:hiddenFill xmlns:a14="http://schemas.microsoft.com/office/drawing/2010/main" xmlns="">
                 <a:solidFill>
                   <a:srgbClr val="FFFFFF"/>
                 </a:solidFill>
@@ -4800,7 +4810,7 @@
           <a:noFill/>
           <a:extLst>
             <a:ext uri="{909E8E84-426E-40dd-AFC4-6F175D3DCCD1}">
-              <a14:hiddenFill xmlns="" xmlns:a14="http://schemas.microsoft.com/office/drawing/2010/main">
+              <a14:hiddenFill xmlns:a14="http://schemas.microsoft.com/office/drawing/2010/main" xmlns="">
                 <a:solidFill>
                   <a:srgbClr val="FFFFFF"/>
                 </a:solidFill>
@@ -4947,7 +4957,7 @@
           <a:noFill/>
           <a:extLst>
             <a:ext uri="{909E8E84-426E-40dd-AFC4-6F175D3DCCD1}">
-              <a14:hiddenFill xmlns="" xmlns:a14="http://schemas.microsoft.com/office/drawing/2010/main">
+              <a14:hiddenFill xmlns:a14="http://schemas.microsoft.com/office/drawing/2010/main" xmlns="">
                 <a:solidFill>
                   <a:srgbClr val="FFFFFF"/>
                 </a:solidFill>
@@ -9054,7 +9064,7 @@
           <p:cNvPr id="2" name="Title 1">
             <a:extLst>
               <a:ext uri="{FF2B5EF4-FFF2-40B4-BE49-F238E27FC236}">
-                <a16:creationId xmlns:a16="http://schemas.microsoft.com/office/drawing/2014/main" id="{24CC2CD7-2C6F-40C6-A804-DD7A36C5B32F}"/>
+                <a16:creationId xmlns:a16="http://schemas.microsoft.com/office/drawing/2014/main" id="{F1982618-43DB-48A1-9CF8-7B367D2B56D7}"/>
               </a:ext>
             </a:extLst>
           </p:cNvPr>
@@ -9072,67 +9082,53 @@
           <a:p>
             <a:r>
               <a:rPr lang="en-US" dirty="0"/>
-              <a:t>Local Operations</a:t>
-            </a:r>
-          </a:p>
-        </p:txBody>
-      </p:sp>
-      <p:sp>
-        <p:nvSpPr>
-          <p:cNvPr id="3" name="Content Placeholder 2">
+              <a:t>Merging</a:t>
+            </a:r>
+          </a:p>
+        </p:txBody>
+      </p:sp>
+      <p:pic>
+        <p:nvPicPr>
+          <p:cNvPr id="5" name="Content Placeholder 4">
             <a:extLst>
               <a:ext uri="{FF2B5EF4-FFF2-40B4-BE49-F238E27FC236}">
-                <a16:creationId xmlns:a16="http://schemas.microsoft.com/office/drawing/2014/main" id="{5B1783C5-7E91-459F-8CA1-5C8BCAC5C446}"/>
+                <a16:creationId xmlns:a16="http://schemas.microsoft.com/office/drawing/2014/main" id="{D3F26FBB-643D-4556-9863-0587724DC48C}"/>
               </a:ext>
             </a:extLst>
           </p:cNvPr>
-          <p:cNvSpPr>
-            <a:spLocks noGrp="1"/>
-          </p:cNvSpPr>
+          <p:cNvPicPr>
+            <a:picLocks noGrp="1" noChangeAspect="1"/>
+          </p:cNvPicPr>
           <p:nvPr>
             <p:ph idx="1"/>
           </p:nvPr>
-        </p:nvSpPr>
-        <p:spPr/>
-        <p:txBody>
-          <a:bodyPr/>
-          <a:lstStyle/>
-          <a:p>
-            <a:r>
-              <a:rPr lang="en-US" dirty="0"/>
-              <a:t>Git keeps the full repo on your local computer</a:t>
-            </a:r>
-          </a:p>
-          <a:p>
-            <a:r>
-              <a:rPr lang="en-US" dirty="0"/>
-              <a:t>Commits, Log operations, branching\merging – it’s all local</a:t>
-            </a:r>
-          </a:p>
-          <a:p>
-            <a:r>
-              <a:rPr lang="en-US" dirty="0"/>
-              <a:t>Only the initial checkout, and synchronizing your branch is done remotely!</a:t>
-            </a:r>
-          </a:p>
-          <a:p>
-            <a:r>
-              <a:rPr lang="en-US" dirty="0"/>
-              <a:t>(Well, pull requests too, sort of, but that’s a deeper topic!)</a:t>
-            </a:r>
-          </a:p>
-          <a:p>
-            <a:r>
-              <a:rPr lang="en-US" dirty="0"/>
-              <a:t>This means you can work offline, in a distributed scenario. No file locks, checking the central server, or being blocked by bad internet access!</a:t>
-            </a:r>
-          </a:p>
-        </p:txBody>
-      </p:sp>
+        </p:nvPicPr>
+        <p:blipFill>
+          <a:blip r:embed="rId2">
+            <a:extLst>
+              <a:ext uri="{28A0092B-C50C-407E-A947-70E740481C1C}">
+                <a14:useLocalDpi xmlns:a14="http://schemas.microsoft.com/office/drawing/2010/main" val="0"/>
+              </a:ext>
+              <a:ext uri="{96DAC541-7B7A-43D3-8B79-37D633B846F1}">
+                <asvg:svgBlip xmlns:asvg="http://schemas.microsoft.com/office/drawing/2016/SVG/main" r:embed="rId3"/>
+              </a:ext>
+            </a:extLst>
+          </a:blip>
+          <a:stretch>
+            <a:fillRect/>
+          </a:stretch>
+        </p:blipFill>
+        <p:spPr>
+          <a:xfrm>
+            <a:off x="2848733" y="1825625"/>
+            <a:ext cx="6494534" cy="4351338"/>
+          </a:xfrm>
+        </p:spPr>
+      </p:pic>
     </p:spTree>
     <p:extLst>
       <p:ext uri="{BB962C8B-B14F-4D97-AF65-F5344CB8AC3E}">
-        <p14:creationId xmlns:p14="http://schemas.microsoft.com/office/powerpoint/2010/main" val="1988009388"/>
+        <p14:creationId xmlns:p14="http://schemas.microsoft.com/office/powerpoint/2010/main" val="3214448015"/>
       </p:ext>
     </p:extLst>
   </p:cSld>
@@ -9164,7 +9160,7 @@
           <p:cNvPr id="2" name="Title 1">
             <a:extLst>
               <a:ext uri="{FF2B5EF4-FFF2-40B4-BE49-F238E27FC236}">
-                <a16:creationId xmlns:a16="http://schemas.microsoft.com/office/drawing/2014/main" id="{2D3BA762-E4FA-4368-B751-764176300177}"/>
+                <a16:creationId xmlns:a16="http://schemas.microsoft.com/office/drawing/2014/main" id="{05B857E2-61DA-432C-BAD1-4CF4FC2D981F}"/>
               </a:ext>
             </a:extLst>
           </p:cNvPr>
@@ -9182,63 +9178,53 @@
           <a:p>
             <a:r>
               <a:rPr lang="en-US" dirty="0"/>
-              <a:t>Git has Integrity</a:t>
-            </a:r>
-          </a:p>
-        </p:txBody>
-      </p:sp>
-      <p:sp>
-        <p:nvSpPr>
-          <p:cNvPr id="3" name="Content Placeholder 2">
+              <a:t>Rebasing</a:t>
+            </a:r>
+          </a:p>
+        </p:txBody>
+      </p:sp>
+      <p:pic>
+        <p:nvPicPr>
+          <p:cNvPr id="5" name="Content Placeholder 4">
             <a:extLst>
               <a:ext uri="{FF2B5EF4-FFF2-40B4-BE49-F238E27FC236}">
-                <a16:creationId xmlns:a16="http://schemas.microsoft.com/office/drawing/2014/main" id="{AAB4FD9A-15F8-48E9-A693-489CB3730C2E}"/>
+                <a16:creationId xmlns:a16="http://schemas.microsoft.com/office/drawing/2014/main" id="{34782428-3BC1-4848-9801-D1FF8C8D058A}"/>
               </a:ext>
             </a:extLst>
           </p:cNvPr>
-          <p:cNvSpPr>
-            <a:spLocks noGrp="1"/>
-          </p:cNvSpPr>
+          <p:cNvPicPr>
+            <a:picLocks noGrp="1" noChangeAspect="1"/>
+          </p:cNvPicPr>
           <p:nvPr>
             <p:ph idx="1"/>
           </p:nvPr>
-        </p:nvSpPr>
-        <p:spPr/>
-        <p:txBody>
-          <a:bodyPr/>
-          <a:lstStyle/>
-          <a:p>
-            <a:r>
-              <a:rPr lang="en-US" dirty="0"/>
-              <a:t>The SHA-1 thing I mentioned earlier?</a:t>
-            </a:r>
-          </a:p>
-          <a:p>
-            <a:r>
-              <a:rPr lang="en-US" dirty="0"/>
-              <a:t>Git computes a SHA-1 Hash of the commit you just made, and it makes it so you can’t make changes to watched files without Git knowing about it.</a:t>
-            </a:r>
-          </a:p>
-          <a:p>
-            <a:r>
-              <a:rPr lang="en-US" dirty="0"/>
-              <a:t>How? I </a:t>
-            </a:r>
-            <a:r>
-              <a:rPr lang="en-US" dirty="0" err="1"/>
-              <a:t>dunno</a:t>
-            </a:r>
-            <a:r>
-              <a:rPr lang="en-US" dirty="0"/>
-              <a:t>. Magic probably.</a:t>
-            </a:r>
-          </a:p>
-        </p:txBody>
-      </p:sp>
+        </p:nvPicPr>
+        <p:blipFill>
+          <a:blip r:embed="rId2">
+            <a:extLst>
+              <a:ext uri="{28A0092B-C50C-407E-A947-70E740481C1C}">
+                <a14:useLocalDpi xmlns:a14="http://schemas.microsoft.com/office/drawing/2010/main" val="0"/>
+              </a:ext>
+              <a:ext uri="{96DAC541-7B7A-43D3-8B79-37D633B846F1}">
+                <asvg:svgBlip xmlns:asvg="http://schemas.microsoft.com/office/drawing/2016/SVG/main" r:embed="rId3"/>
+              </a:ext>
+            </a:extLst>
+          </a:blip>
+          <a:stretch>
+            <a:fillRect/>
+          </a:stretch>
+        </p:blipFill>
+        <p:spPr>
+          <a:xfrm>
+            <a:off x="2902357" y="1825625"/>
+            <a:ext cx="6387285" cy="4351338"/>
+          </a:xfrm>
+        </p:spPr>
+      </p:pic>
     </p:spTree>
     <p:extLst>
       <p:ext uri="{BB962C8B-B14F-4D97-AF65-F5344CB8AC3E}">
-        <p14:creationId xmlns:p14="http://schemas.microsoft.com/office/powerpoint/2010/main" val="2504312543"/>
+        <p14:creationId xmlns:p14="http://schemas.microsoft.com/office/powerpoint/2010/main" val="1290580419"/>
       </p:ext>
     </p:extLst>
   </p:cSld>
@@ -9270,7 +9256,7 @@
           <p:cNvPr id="2" name="Title 1">
             <a:extLst>
               <a:ext uri="{FF2B5EF4-FFF2-40B4-BE49-F238E27FC236}">
-                <a16:creationId xmlns:a16="http://schemas.microsoft.com/office/drawing/2014/main" id="{0FA6AEAC-E7B5-460D-AB9D-92BC4090C5B7}"/>
+                <a16:creationId xmlns:a16="http://schemas.microsoft.com/office/drawing/2014/main" id="{4B12FC63-BB25-4729-9D2F-FA753345DE7D}"/>
               </a:ext>
             </a:extLst>
           </p:cNvPr>
@@ -9288,7 +9274,7 @@
           <a:p>
             <a:r>
               <a:rPr lang="en-US" dirty="0"/>
-              <a:t>Git is recoverable</a:t>
+              <a:t>Best practice</a:t>
             </a:r>
           </a:p>
         </p:txBody>
@@ -9298,7 +9284,7 @@
           <p:cNvPr id="3" name="Content Placeholder 2">
             <a:extLst>
               <a:ext uri="{FF2B5EF4-FFF2-40B4-BE49-F238E27FC236}">
-                <a16:creationId xmlns:a16="http://schemas.microsoft.com/office/drawing/2014/main" id="{475C6E75-54FD-47E6-9EBF-F85A49A7907E}"/>
+                <a16:creationId xmlns:a16="http://schemas.microsoft.com/office/drawing/2014/main" id="{4D7FCE7B-CAEF-4602-AB9E-2A090CED56FE}"/>
               </a:ext>
             </a:extLst>
           </p:cNvPr>
@@ -9316,19 +9302,13 @@
           <a:p>
             <a:r>
               <a:rPr lang="en-US" dirty="0"/>
-              <a:t>Git generally only *adds* data.</a:t>
-            </a:r>
-          </a:p>
-          <a:p>
-            <a:r>
-              <a:rPr lang="en-US" dirty="0"/>
-              <a:t>There’s a couple things you can do that are un-undoable, probably, but I haven’t found them yet.</a:t>
-            </a:r>
-          </a:p>
-          <a:p>
-            <a:r>
-              <a:rPr lang="en-US" dirty="0"/>
-              <a:t>Once you commit a change, you can always go back and access it. If you mess something up, you can revert to a previous change-set, and you’re good to go!</a:t>
+              <a:t>Don’t ever rebase onto a public branch</a:t>
+            </a:r>
+          </a:p>
+          <a:p>
+            <a:r>
+              <a:rPr lang="en-US" dirty="0"/>
+              <a:t>Honestly, probably stick to merge unless your team has clear guidelines on when to rebase</a:t>
             </a:r>
           </a:p>
         </p:txBody>
@@ -9336,7 +9316,7 @@
     </p:spTree>
     <p:extLst>
       <p:ext uri="{BB962C8B-B14F-4D97-AF65-F5344CB8AC3E}">
-        <p14:creationId xmlns:p14="http://schemas.microsoft.com/office/powerpoint/2010/main" val="189421915"/>
+        <p14:creationId xmlns:p14="http://schemas.microsoft.com/office/powerpoint/2010/main" val="1583342092"/>
       </p:ext>
     </p:extLst>
   </p:cSld>
@@ -9365,10 +9345,10 @@
       </p:grpSpPr>
       <p:sp>
         <p:nvSpPr>
-          <p:cNvPr id="2" name="Title 1">
+          <p:cNvPr id="4" name="Title 3">
             <a:extLst>
               <a:ext uri="{FF2B5EF4-FFF2-40B4-BE49-F238E27FC236}">
-                <a16:creationId xmlns:a16="http://schemas.microsoft.com/office/drawing/2014/main" id="{8A9629C9-9AD4-4A86-97C1-0BA5B0C19D94}"/>
+                <a16:creationId xmlns:a16="http://schemas.microsoft.com/office/drawing/2014/main" id="{953D25B8-FE41-473F-A945-9B5740425B60}"/>
               </a:ext>
             </a:extLst>
           </p:cNvPr>
@@ -9379,33 +9359,69 @@
             <p:ph type="title"/>
           </p:nvPr>
         </p:nvSpPr>
-        <p:spPr/>
+        <p:spPr>
+          <a:xfrm>
+            <a:off x="838200" y="365125"/>
+            <a:ext cx="10515600" cy="1325563"/>
+          </a:xfrm>
+        </p:spPr>
         <p:txBody>
           <a:bodyPr/>
           <a:lstStyle/>
           <a:p>
             <a:r>
               <a:rPr lang="en-US" dirty="0"/>
-              <a:t>Basic Workflow</a:t>
+              <a:t>Snapshots – Not Diffs</a:t>
+            </a:r>
+          </a:p>
+        </p:txBody>
+      </p:sp>
+      <p:sp>
+        <p:nvSpPr>
+          <p:cNvPr id="5" name="Content Placeholder 4">
+            <a:extLst>
+              <a:ext uri="{FF2B5EF4-FFF2-40B4-BE49-F238E27FC236}">
+                <a16:creationId xmlns:a16="http://schemas.microsoft.com/office/drawing/2014/main" id="{3FDCFACD-8BD8-4FC9-B119-8103F4E2A851}"/>
+              </a:ext>
+            </a:extLst>
+          </p:cNvPr>
+          <p:cNvSpPr>
+            <a:spLocks noGrp="1"/>
+          </p:cNvSpPr>
+          <p:nvPr>
+            <p:ph idx="1"/>
+          </p:nvPr>
+        </p:nvSpPr>
+        <p:spPr>
+          <a:xfrm>
+            <a:off x="838200" y="1555844"/>
+            <a:ext cx="10515600" cy="655093"/>
+          </a:xfrm>
+        </p:spPr>
+        <p:txBody>
+          <a:bodyPr/>
+          <a:lstStyle/>
+          <a:p>
+            <a:r>
+              <a:rPr lang="en-US" dirty="0"/>
+              <a:t>Most Version Control Systems (VCS) track differences.</a:t>
             </a:r>
           </a:p>
         </p:txBody>
       </p:sp>
       <p:pic>
         <p:nvPicPr>
-          <p:cNvPr id="3074" name="Picture 2" descr="Working tree, staging area, and Git directory.">
+          <p:cNvPr id="1026" name="Picture 2" descr="Storing data as changes to a base version of each file.">
             <a:extLst>
               <a:ext uri="{FF2B5EF4-FFF2-40B4-BE49-F238E27FC236}">
-                <a16:creationId xmlns:a16="http://schemas.microsoft.com/office/drawing/2014/main" id="{25F68965-AA38-4808-B661-2D8747F8E8E5}"/>
+                <a16:creationId xmlns:a16="http://schemas.microsoft.com/office/drawing/2014/main" id="{DAC1C573-FF74-41F7-8FF5-A6D336DDC122}"/>
               </a:ext>
             </a:extLst>
           </p:cNvPr>
           <p:cNvPicPr>
-            <a:picLocks noGrp="1" noChangeAspect="1" noChangeArrowheads="1"/>
+            <a:picLocks noChangeAspect="1" noChangeArrowheads="1"/>
           </p:cNvPicPr>
-          <p:nvPr>
-            <p:ph idx="1"/>
-          </p:nvPr>
+          <p:nvPr/>
         </p:nvPicPr>
         <p:blipFill>
           <a:blip r:embed="rId2">
@@ -9422,8 +9438,8 @@
         </p:blipFill>
         <p:spPr bwMode="auto">
           <a:xfrm>
-            <a:off x="2286000" y="1901031"/>
-            <a:ext cx="7620000" cy="4200525"/>
+            <a:off x="1520730" y="2210937"/>
+            <a:ext cx="9150540" cy="3545834"/>
           </a:xfrm>
           <a:prstGeom prst="rect">
             <a:avLst/>
@@ -9440,45 +9456,10 @@
           </a:extLst>
         </p:spPr>
       </p:pic>
-      <p:sp>
-        <p:nvSpPr>
-          <p:cNvPr id="3" name="TextBox 2">
-            <a:extLst>
-              <a:ext uri="{FF2B5EF4-FFF2-40B4-BE49-F238E27FC236}">
-                <a16:creationId xmlns:a16="http://schemas.microsoft.com/office/drawing/2014/main" id="{35177CA5-A56E-426F-B4F0-298FED920311}"/>
-              </a:ext>
-            </a:extLst>
-          </p:cNvPr>
-          <p:cNvSpPr txBox="1"/>
-          <p:nvPr/>
-        </p:nvSpPr>
-        <p:spPr>
-          <a:xfrm>
-            <a:off x="7566212" y="3244334"/>
-            <a:ext cx="1102659" cy="369332"/>
-          </a:xfrm>
-          <a:prstGeom prst="rect">
-            <a:avLst/>
-          </a:prstGeom>
-          <a:noFill/>
-        </p:spPr>
-        <p:txBody>
-          <a:bodyPr wrap="square" rtlCol="0">
-            <a:spAutoFit/>
-          </a:bodyPr>
-          <a:lstStyle/>
-          <a:p>
-            <a:r>
-              <a:rPr lang="en-US" dirty="0"/>
-              <a:t>(Clone)</a:t>
-            </a:r>
-          </a:p>
-        </p:txBody>
-      </p:sp>
     </p:spTree>
     <p:extLst>
       <p:ext uri="{BB962C8B-B14F-4D97-AF65-F5344CB8AC3E}">
-        <p14:creationId xmlns:p14="http://schemas.microsoft.com/office/powerpoint/2010/main" val="1617573897"/>
+        <p14:creationId xmlns:p14="http://schemas.microsoft.com/office/powerpoint/2010/main" val="3472819714"/>
       </p:ext>
     </p:extLst>
   </p:cSld>
@@ -9510,7 +9491,7 @@
           <p:cNvPr id="2" name="Title 1">
             <a:extLst>
               <a:ext uri="{FF2B5EF4-FFF2-40B4-BE49-F238E27FC236}">
-                <a16:creationId xmlns:a16="http://schemas.microsoft.com/office/drawing/2014/main" id="{7FC8900C-5155-4F12-9845-2CC9027CCBCA}"/>
+                <a16:creationId xmlns:a16="http://schemas.microsoft.com/office/drawing/2014/main" id="{308775A3-9078-47B1-BCA5-76A8080AAD80}"/>
               </a:ext>
             </a:extLst>
           </p:cNvPr>
@@ -9528,7 +9509,7 @@
           <a:p>
             <a:r>
               <a:rPr lang="en-US" dirty="0"/>
-              <a:t>Three States</a:t>
+              <a:t>Snapshot – Not Diffs</a:t>
             </a:r>
           </a:p>
         </p:txBody>
@@ -9538,7 +9519,7 @@
           <p:cNvPr id="3" name="Content Placeholder 2">
             <a:extLst>
               <a:ext uri="{FF2B5EF4-FFF2-40B4-BE49-F238E27FC236}">
-                <a16:creationId xmlns:a16="http://schemas.microsoft.com/office/drawing/2014/main" id="{41415508-FBBE-4D83-AA4F-B5A08A348B02}"/>
+                <a16:creationId xmlns:a16="http://schemas.microsoft.com/office/drawing/2014/main" id="{D92A0E7A-AE89-46F3-A617-829ACAB1F1EE}"/>
               </a:ext>
             </a:extLst>
           </p:cNvPr>
@@ -9549,62 +9530,74 @@
             <p:ph idx="1"/>
           </p:nvPr>
         </p:nvSpPr>
-        <p:spPr/>
+        <p:spPr>
+          <a:xfrm>
+            <a:off x="838200" y="1825625"/>
+            <a:ext cx="10515600" cy="658268"/>
+          </a:xfrm>
+        </p:spPr>
         <p:txBody>
           <a:bodyPr/>
           <a:lstStyle/>
           <a:p>
             <a:r>
               <a:rPr lang="en-US" dirty="0"/>
-              <a:t>Modified</a:t>
-            </a:r>
-          </a:p>
-          <a:p>
-            <a:pPr lvl="1"/>
-            <a:r>
-              <a:rPr lang="en-US" dirty="0"/>
-              <a:t>You’ve made a change to one or more files.</a:t>
-            </a:r>
-          </a:p>
-          <a:p>
-            <a:r>
-              <a:rPr lang="en-US" dirty="0"/>
-              <a:t>Staged</a:t>
-            </a:r>
-          </a:p>
-          <a:p>
-            <a:pPr lvl="1"/>
-            <a:r>
-              <a:rPr lang="en-US" dirty="0"/>
-              <a:t>You’ve gone through and selected the files you want to commit</a:t>
-            </a:r>
-          </a:p>
-          <a:p>
-            <a:pPr lvl="1"/>
-            <a:r>
-              <a:rPr lang="en-US" dirty="0"/>
-              <a:t>You don’t HAVE to commit everything in one go!</a:t>
-            </a:r>
-          </a:p>
-          <a:p>
-            <a:r>
-              <a:rPr lang="en-US" dirty="0"/>
-              <a:t>Committed</a:t>
-            </a:r>
-          </a:p>
-          <a:p>
-            <a:pPr lvl="1"/>
-            <a:r>
-              <a:rPr lang="en-US" dirty="0"/>
-              <a:t>Committing is the part that is recorded to Git. It’s now part of the log and can be seen in the history.</a:t>
-            </a:r>
-          </a:p>
-        </p:txBody>
-      </p:sp>
+              <a:t>Git tracks a snapshot of the file – only tracking changed files.</a:t>
+            </a:r>
+          </a:p>
+        </p:txBody>
+      </p:sp>
+      <p:pic>
+        <p:nvPicPr>
+          <p:cNvPr id="2050" name="Picture 2" descr="Git stores data as snapshots of the project over time.">
+            <a:extLst>
+              <a:ext uri="{FF2B5EF4-FFF2-40B4-BE49-F238E27FC236}">
+                <a16:creationId xmlns:a16="http://schemas.microsoft.com/office/drawing/2014/main" id="{7CF41BA9-04C2-482D-85CC-047C6AF0864A}"/>
+              </a:ext>
+            </a:extLst>
+          </p:cNvPr>
+          <p:cNvPicPr>
+            <a:picLocks noChangeAspect="1" noChangeArrowheads="1"/>
+          </p:cNvPicPr>
+          <p:nvPr/>
+        </p:nvPicPr>
+        <p:blipFill>
+          <a:blip r:embed="rId2">
+            <a:extLst>
+              <a:ext uri="{28A0092B-C50C-407E-A947-70E740481C1C}">
+                <a14:useLocalDpi xmlns:a14="http://schemas.microsoft.com/office/drawing/2010/main" val="0"/>
+              </a:ext>
+            </a:extLst>
+          </a:blip>
+          <a:srcRect/>
+          <a:stretch>
+            <a:fillRect/>
+          </a:stretch>
+        </p:blipFill>
+        <p:spPr bwMode="auto">
+          <a:xfrm>
+            <a:off x="1460236" y="2715905"/>
+            <a:ext cx="9271528" cy="3534770"/>
+          </a:xfrm>
+          <a:prstGeom prst="rect">
+            <a:avLst/>
+          </a:prstGeom>
+          <a:noFill/>
+          <a:extLst>
+            <a:ext uri="{909E8E84-426E-40DD-AFC4-6F175D3DCCD1}">
+              <a14:hiddenFill xmlns:a14="http://schemas.microsoft.com/office/drawing/2010/main">
+                <a:solidFill>
+                  <a:srgbClr val="FFFFFF"/>
+                </a:solidFill>
+              </a14:hiddenFill>
+            </a:ext>
+          </a:extLst>
+        </p:spPr>
+      </p:pic>
     </p:spTree>
     <p:extLst>
       <p:ext uri="{BB962C8B-B14F-4D97-AF65-F5344CB8AC3E}">
-        <p14:creationId xmlns:p14="http://schemas.microsoft.com/office/powerpoint/2010/main" val="4231516819"/>
+        <p14:creationId xmlns:p14="http://schemas.microsoft.com/office/powerpoint/2010/main" val="2467824290"/>
       </p:ext>
     </p:extLst>
   </p:cSld>
@@ -9636,7 +9629,7 @@
           <p:cNvPr id="2" name="Title 1">
             <a:extLst>
               <a:ext uri="{FF2B5EF4-FFF2-40B4-BE49-F238E27FC236}">
-                <a16:creationId xmlns:a16="http://schemas.microsoft.com/office/drawing/2014/main" id="{6374560B-CBBB-4D34-81B8-BCEC16AC23A1}"/>
+                <a16:creationId xmlns:a16="http://schemas.microsoft.com/office/drawing/2014/main" id="{24CC2CD7-2C6F-40C6-A804-DD7A36C5B32F}"/>
               </a:ext>
             </a:extLst>
           </p:cNvPr>
@@ -9654,15 +9647,7 @@
           <a:p>
             <a:r>
               <a:rPr lang="en-US" dirty="0"/>
-              <a:t>Not </a:t>
-            </a:r>
-            <a:r>
-              <a:rPr lang="en-US" i="1" dirty="0"/>
-              <a:t>quite </a:t>
-            </a:r>
-            <a:r>
-              <a:rPr lang="en-US" dirty="0"/>
-              <a:t>done - probably</a:t>
+              <a:t>Local Operations</a:t>
             </a:r>
           </a:p>
         </p:txBody>
@@ -9672,7 +9657,7 @@
           <p:cNvPr id="3" name="Content Placeholder 2">
             <a:extLst>
               <a:ext uri="{FF2B5EF4-FFF2-40B4-BE49-F238E27FC236}">
-                <a16:creationId xmlns:a16="http://schemas.microsoft.com/office/drawing/2014/main" id="{3917125C-2BDC-4B04-B75A-31F80461EF98}"/>
+                <a16:creationId xmlns:a16="http://schemas.microsoft.com/office/drawing/2014/main" id="{5B1783C5-7E91-459F-8CA1-5C8BCAC5C446}"/>
               </a:ext>
             </a:extLst>
           </p:cNvPr>
@@ -9690,28 +9675,31 @@
           <a:p>
             <a:r>
               <a:rPr lang="en-US" dirty="0"/>
-              <a:t>In most cases, you still need to synchronize your code with a shared repository.</a:t>
-            </a:r>
-          </a:p>
-          <a:p>
-            <a:r>
-              <a:rPr lang="en-US" dirty="0"/>
-              <a:t>This is known as a “Push”</a:t>
-            </a:r>
-          </a:p>
-          <a:p>
-            <a:r>
-              <a:rPr lang="en-US" dirty="0"/>
-              <a:t>Getting code from the central repo is known as a “Pull”</a:t>
-            </a:r>
-          </a:p>
-          <a:p>
-            <a:endParaRPr lang="en-US" dirty="0"/>
-          </a:p>
-          <a:p>
-            <a:r>
-              <a:rPr lang="en-US" dirty="0"/>
-              <a:t>If you both “Pull” and “Push” – you have “synced” your code.</a:t>
+              <a:t>Git keeps the full repo on your local computer</a:t>
+            </a:r>
+          </a:p>
+          <a:p>
+            <a:r>
+              <a:rPr lang="en-US" dirty="0"/>
+              <a:t>Commits, Log operations, branching\merging – it’s all local</a:t>
+            </a:r>
+          </a:p>
+          <a:p>
+            <a:r>
+              <a:rPr lang="en-US" dirty="0"/>
+              <a:t>Only the initial checkout, and synchronizing your branch is done remotely!</a:t>
+            </a:r>
+          </a:p>
+          <a:p>
+            <a:r>
+              <a:rPr lang="en-US" dirty="0"/>
+              <a:t>(Well, pull requests too, sort of, but that’s a deeper topic!)</a:t>
+            </a:r>
+          </a:p>
+          <a:p>
+            <a:r>
+              <a:rPr lang="en-US" dirty="0"/>
+              <a:t>This means you can work offline, in a distributed scenario. No file locks, checking the central server, or being blocked by bad internet access!</a:t>
             </a:r>
           </a:p>
         </p:txBody>
@@ -9719,7 +9707,7 @@
     </p:spTree>
     <p:extLst>
       <p:ext uri="{BB962C8B-B14F-4D97-AF65-F5344CB8AC3E}">
-        <p14:creationId xmlns:p14="http://schemas.microsoft.com/office/powerpoint/2010/main" val="4155925949"/>
+        <p14:creationId xmlns:p14="http://schemas.microsoft.com/office/powerpoint/2010/main" val="1988009388"/>
       </p:ext>
     </p:extLst>
   </p:cSld>
@@ -9751,7 +9739,7 @@
           <p:cNvPr id="2" name="Title 1">
             <a:extLst>
               <a:ext uri="{FF2B5EF4-FFF2-40B4-BE49-F238E27FC236}">
-                <a16:creationId xmlns:a16="http://schemas.microsoft.com/office/drawing/2014/main" id="{9232E434-9413-4B36-99F6-6127E6ACA56E}"/>
+                <a16:creationId xmlns:a16="http://schemas.microsoft.com/office/drawing/2014/main" id="{2D3BA762-E4FA-4368-B751-764176300177}"/>
               </a:ext>
             </a:extLst>
           </p:cNvPr>
@@ -9769,17 +9757,17 @@
           <a:p>
             <a:r>
               <a:rPr lang="en-US" dirty="0"/>
-              <a:t>Hosted Git Repos</a:t>
-            </a:r>
-          </a:p>
-        </p:txBody>
-      </p:sp>
-      <p:sp>
-        <p:nvSpPr>
-          <p:cNvPr id="3" name="Text Placeholder 2">
+              <a:t>Git has Integrity</a:t>
+            </a:r>
+          </a:p>
+        </p:txBody>
+      </p:sp>
+      <p:sp>
+        <p:nvSpPr>
+          <p:cNvPr id="3" name="Content Placeholder 2">
             <a:extLst>
               <a:ext uri="{FF2B5EF4-FFF2-40B4-BE49-F238E27FC236}">
-                <a16:creationId xmlns:a16="http://schemas.microsoft.com/office/drawing/2014/main" id="{980E02D7-15CA-454F-A487-78BF648CF9F0}"/>
+                <a16:creationId xmlns:a16="http://schemas.microsoft.com/office/drawing/2014/main" id="{AAB4FD9A-15F8-48E9-A693-489CB3730C2E}"/>
               </a:ext>
             </a:extLst>
           </p:cNvPr>
@@ -9787,7 +9775,7 @@
             <a:spLocks noGrp="1"/>
           </p:cNvSpPr>
           <p:nvPr>
-            <p:ph type="body" idx="1"/>
+            <p:ph idx="1"/>
           </p:nvPr>
         </p:nvSpPr>
         <p:spPr/>
@@ -9797,7 +9785,27 @@
           <a:p>
             <a:r>
               <a:rPr lang="en-US" dirty="0"/>
-              <a:t>Sharing the code!</a:t>
+              <a:t>The SHA-1 thing I mentioned earlier?</a:t>
+            </a:r>
+          </a:p>
+          <a:p>
+            <a:r>
+              <a:rPr lang="en-US" dirty="0"/>
+              <a:t>Git computes a SHA-1 Hash of the commit you just made, and it makes it so you can’t make changes to watched files without Git knowing about it.</a:t>
+            </a:r>
+          </a:p>
+          <a:p>
+            <a:r>
+              <a:rPr lang="en-US" dirty="0"/>
+              <a:t>How? I </a:t>
+            </a:r>
+            <a:r>
+              <a:rPr lang="en-US" dirty="0" err="1"/>
+              <a:t>dunno</a:t>
+            </a:r>
+            <a:r>
+              <a:rPr lang="en-US" dirty="0"/>
+              <a:t>. Magic probably.</a:t>
             </a:r>
           </a:p>
         </p:txBody>
@@ -9805,7 +9813,7 @@
     </p:spTree>
     <p:extLst>
       <p:ext uri="{BB962C8B-B14F-4D97-AF65-F5344CB8AC3E}">
-        <p14:creationId xmlns:p14="http://schemas.microsoft.com/office/powerpoint/2010/main" val="784079646"/>
+        <p14:creationId xmlns:p14="http://schemas.microsoft.com/office/powerpoint/2010/main" val="2504312543"/>
       </p:ext>
     </p:extLst>
   </p:cSld>
@@ -9837,7 +9845,7 @@
           <p:cNvPr id="2" name="Title 1">
             <a:extLst>
               <a:ext uri="{FF2B5EF4-FFF2-40B4-BE49-F238E27FC236}">
-                <a16:creationId xmlns:a16="http://schemas.microsoft.com/office/drawing/2014/main" id="{5B9111D1-EBA9-469A-A5AC-94959A3B7E01}"/>
+                <a16:creationId xmlns:a16="http://schemas.microsoft.com/office/drawing/2014/main" id="{0FA6AEAC-E7B5-460D-AB9D-92BC4090C5B7}"/>
               </a:ext>
             </a:extLst>
           </p:cNvPr>
@@ -9855,7 +9863,7 @@
           <a:p>
             <a:r>
               <a:rPr lang="en-US" dirty="0"/>
-              <a:t>Repos</a:t>
+              <a:t>Git is recoverable</a:t>
             </a:r>
           </a:p>
         </p:txBody>
@@ -9865,7 +9873,7 @@
           <p:cNvPr id="3" name="Content Placeholder 2">
             <a:extLst>
               <a:ext uri="{FF2B5EF4-FFF2-40B4-BE49-F238E27FC236}">
-                <a16:creationId xmlns:a16="http://schemas.microsoft.com/office/drawing/2014/main" id="{66A1847F-81AF-4B9B-96B0-C1825FDCDF8F}"/>
+                <a16:creationId xmlns:a16="http://schemas.microsoft.com/office/drawing/2014/main" id="{475C6E75-54FD-47E6-9EBF-F85A49A7907E}"/>
               </a:ext>
             </a:extLst>
           </p:cNvPr>
@@ -9878,92 +9886,32 @@
         </p:nvSpPr>
         <p:spPr/>
         <p:txBody>
-          <a:bodyPr>
-            <a:normAutofit lnSpcReduction="10000"/>
-          </a:bodyPr>
+          <a:bodyPr/>
           <a:lstStyle/>
           <a:p>
             <a:r>
               <a:rPr lang="en-US" dirty="0"/>
-              <a:t>Big 3</a:t>
-            </a:r>
-          </a:p>
-          <a:p>
-            <a:r>
-              <a:rPr lang="en-US" dirty="0"/>
-              <a:t>Azure </a:t>
-            </a:r>
-            <a:r>
-              <a:rPr lang="en-US" dirty="0" err="1"/>
-              <a:t>Devops</a:t>
-            </a:r>
-            <a:endParaRPr lang="en-US" dirty="0"/>
-          </a:p>
-          <a:p>
-            <a:pPr lvl="1"/>
-            <a:r>
-              <a:rPr lang="en-US" dirty="0"/>
-              <a:t>Known for closed source projects</a:t>
-            </a:r>
-          </a:p>
-          <a:p>
-            <a:pPr lvl="1"/>
-            <a:r>
-              <a:rPr lang="en-US" dirty="0"/>
-              <a:t>High-End CI/CD functionality</a:t>
-            </a:r>
-          </a:p>
-          <a:p>
-            <a:pPr lvl="1"/>
-            <a:r>
-              <a:rPr lang="en-US" dirty="0"/>
-              <a:t>Exceptional project tracking via TFS</a:t>
-            </a:r>
-          </a:p>
-          <a:p>
-            <a:r>
-              <a:rPr lang="en-US" dirty="0"/>
-              <a:t>GitHub</a:t>
-            </a:r>
-          </a:p>
-          <a:p>
-            <a:pPr lvl="1"/>
-            <a:r>
-              <a:rPr lang="en-US" dirty="0"/>
-              <a:t>Known for open source projects</a:t>
-            </a:r>
-          </a:p>
-          <a:p>
-            <a:pPr lvl="1"/>
-            <a:r>
-              <a:rPr lang="en-US" dirty="0"/>
-              <a:t>Exceptional bug-tracking and messaging</a:t>
-            </a:r>
-          </a:p>
-          <a:p>
-            <a:pPr lvl="1"/>
-            <a:r>
-              <a:rPr lang="en-US" dirty="0"/>
-              <a:t>API works well with most CI/CD platforms, Team City, Jenkins, TFS, etc.</a:t>
-            </a:r>
-          </a:p>
-          <a:p>
-            <a:r>
-              <a:rPr lang="en-US" dirty="0" err="1"/>
-              <a:t>BitBucket</a:t>
-            </a:r>
-            <a:endParaRPr lang="en-US" dirty="0"/>
-          </a:p>
-          <a:p>
-            <a:pPr lvl="1"/>
-            <a:endParaRPr lang="en-US" dirty="0"/>
+              <a:t>Git generally only *adds* data.</a:t>
+            </a:r>
+          </a:p>
+          <a:p>
+            <a:r>
+              <a:rPr lang="en-US" dirty="0"/>
+              <a:t>There’s a couple things you can do that are un-undoable, probably, but I haven’t found them yet.</a:t>
+            </a:r>
+          </a:p>
+          <a:p>
+            <a:r>
+              <a:rPr lang="en-US" dirty="0"/>
+              <a:t>Once you commit a change, you can always go back and access it. If you mess something up, you can revert to a previous change-set, and you’re good to go!</a:t>
+            </a:r>
           </a:p>
         </p:txBody>
       </p:sp>
     </p:spTree>
     <p:extLst>
       <p:ext uri="{BB962C8B-B14F-4D97-AF65-F5344CB8AC3E}">
-        <p14:creationId xmlns:p14="http://schemas.microsoft.com/office/powerpoint/2010/main" val="662332301"/>
+        <p14:creationId xmlns:p14="http://schemas.microsoft.com/office/powerpoint/2010/main" val="189421915"/>
       </p:ext>
     </p:extLst>
   </p:cSld>
@@ -9995,7 +9943,7 @@
           <p:cNvPr id="2" name="Title 1">
             <a:extLst>
               <a:ext uri="{FF2B5EF4-FFF2-40B4-BE49-F238E27FC236}">
-                <a16:creationId xmlns:a16="http://schemas.microsoft.com/office/drawing/2014/main" id="{29093CCA-7953-439D-9E03-48C7A94BACAD}"/>
+                <a16:creationId xmlns:a16="http://schemas.microsoft.com/office/drawing/2014/main" id="{8A9629C9-9AD4-4A86-97C1-0BA5B0C19D94}"/>
               </a:ext>
             </a:extLst>
           </p:cNvPr>
@@ -10013,101 +9961,99 @@
           <a:p>
             <a:r>
               <a:rPr lang="en-US" dirty="0"/>
-              <a:t>Azure </a:t>
-            </a:r>
-            <a:r>
-              <a:rPr lang="en-US" dirty="0" err="1"/>
-              <a:t>Devops</a:t>
-            </a:r>
-            <a:endParaRPr lang="en-US" dirty="0"/>
-          </a:p>
-        </p:txBody>
-      </p:sp>
-      <p:sp>
-        <p:nvSpPr>
-          <p:cNvPr id="3" name="Content Placeholder 2">
+              <a:t>Basic Workflow</a:t>
+            </a:r>
+          </a:p>
+        </p:txBody>
+      </p:sp>
+      <p:pic>
+        <p:nvPicPr>
+          <p:cNvPr id="3074" name="Picture 2" descr="Working tree, staging area, and Git directory.">
             <a:extLst>
               <a:ext uri="{FF2B5EF4-FFF2-40B4-BE49-F238E27FC236}">
-                <a16:creationId xmlns:a16="http://schemas.microsoft.com/office/drawing/2014/main" id="{5552C562-13BC-49D0-9EF3-1406A4C3C4E4}"/>
+                <a16:creationId xmlns:a16="http://schemas.microsoft.com/office/drawing/2014/main" id="{25F68965-AA38-4808-B661-2D8747F8E8E5}"/>
               </a:ext>
             </a:extLst>
           </p:cNvPr>
-          <p:cNvSpPr>
-            <a:spLocks noGrp="1"/>
-          </p:cNvSpPr>
+          <p:cNvPicPr>
+            <a:picLocks noGrp="1" noChangeAspect="1" noChangeArrowheads="1"/>
+          </p:cNvPicPr>
           <p:nvPr>
             <p:ph idx="1"/>
           </p:nvPr>
-        </p:nvSpPr>
-        <p:spPr/>
-        <p:txBody>
-          <a:bodyPr>
-            <a:normAutofit fontScale="92500"/>
+        </p:nvPicPr>
+        <p:blipFill>
+          <a:blip r:embed="rId2">
+            <a:extLst>
+              <a:ext uri="{28A0092B-C50C-407E-A947-70E740481C1C}">
+                <a14:useLocalDpi xmlns:a14="http://schemas.microsoft.com/office/drawing/2010/main" val="0"/>
+              </a:ext>
+            </a:extLst>
+          </a:blip>
+          <a:srcRect/>
+          <a:stretch>
+            <a:fillRect/>
+          </a:stretch>
+        </p:blipFill>
+        <p:spPr bwMode="auto">
+          <a:xfrm>
+            <a:off x="2286000" y="1901031"/>
+            <a:ext cx="7620000" cy="4200525"/>
+          </a:xfrm>
+          <a:prstGeom prst="rect">
+            <a:avLst/>
+          </a:prstGeom>
+          <a:noFill/>
+          <a:extLst>
+            <a:ext uri="{909E8E84-426E-40DD-AFC4-6F175D3DCCD1}">
+              <a14:hiddenFill xmlns:a14="http://schemas.microsoft.com/office/drawing/2010/main">
+                <a:solidFill>
+                  <a:srgbClr val="FFFFFF"/>
+                </a:solidFill>
+              </a14:hiddenFill>
+            </a:ext>
+          </a:extLst>
+        </p:spPr>
+      </p:pic>
+      <p:sp>
+        <p:nvSpPr>
+          <p:cNvPr id="3" name="TextBox 2">
+            <a:extLst>
+              <a:ext uri="{FF2B5EF4-FFF2-40B4-BE49-F238E27FC236}">
+                <a16:creationId xmlns:a16="http://schemas.microsoft.com/office/drawing/2014/main" id="{35177CA5-A56E-426F-B4F0-298FED920311}"/>
+              </a:ext>
+            </a:extLst>
+          </p:cNvPr>
+          <p:cNvSpPr txBox="1"/>
+          <p:nvPr/>
+        </p:nvSpPr>
+        <p:spPr>
+          <a:xfrm>
+            <a:off x="7566212" y="3244334"/>
+            <a:ext cx="1102659" cy="369332"/>
+          </a:xfrm>
+          <a:prstGeom prst="rect">
+            <a:avLst/>
+          </a:prstGeom>
+          <a:noFill/>
+        </p:spPr>
+        <p:txBody>
+          <a:bodyPr wrap="square" rtlCol="0">
+            <a:spAutoFit/>
           </a:bodyPr>
           <a:lstStyle/>
           <a:p>
             <a:r>
               <a:rPr lang="en-US" dirty="0"/>
-              <a:t>Free up to 5 users</a:t>
-            </a:r>
-          </a:p>
-          <a:p>
-            <a:r>
-              <a:rPr lang="en-US" dirty="0"/>
-              <a:t>Unlimited private repos</a:t>
-            </a:r>
-          </a:p>
-          <a:p>
-            <a:r>
-              <a:rPr lang="en-US" strike="sngStrike" dirty="0"/>
-              <a:t>No public repositories! </a:t>
-            </a:r>
-            <a:r>
-              <a:rPr lang="en-US" dirty="0"/>
-              <a:t>Public Repositories are in preview as of this writing.</a:t>
-            </a:r>
-            <a:endParaRPr lang="en-US" strike="sngStrike" dirty="0"/>
-          </a:p>
-          <a:p>
-            <a:r>
-              <a:rPr lang="en-US" dirty="0"/>
-              <a:t>CI/CD pipeline is well developed – no Team City necessary, Octopus Deploy is debatable.</a:t>
-            </a:r>
-          </a:p>
-          <a:p>
-            <a:r>
-              <a:rPr lang="en-US" dirty="0"/>
-              <a:t>Azure is well integrated – great for websites, services, mobile, </a:t>
-            </a:r>
-            <a:r>
-              <a:rPr lang="en-US" dirty="0" err="1"/>
-              <a:t>etc</a:t>
-            </a:r>
-            <a:endParaRPr lang="en-US" dirty="0"/>
-          </a:p>
-          <a:p>
-            <a:r>
-              <a:rPr lang="en-US" dirty="0"/>
-              <a:t>Great choice for small business!</a:t>
-            </a:r>
-          </a:p>
-          <a:p>
-            <a:r>
-              <a:rPr lang="en-US" dirty="0"/>
-              <a:t>Learning Curve: Experience with MS products makes this easy-</a:t>
-            </a:r>
-            <a:r>
-              <a:rPr lang="en-US" dirty="0" err="1"/>
-              <a:t>ish</a:t>
-            </a:r>
-            <a:endParaRPr lang="en-US" dirty="0"/>
+              <a:t>(Clone)</a:t>
+            </a:r>
           </a:p>
         </p:txBody>
       </p:sp>
     </p:spTree>
     <p:extLst>
       <p:ext uri="{BB962C8B-B14F-4D97-AF65-F5344CB8AC3E}">
-        <p14:creationId xmlns:p14="http://schemas.microsoft.com/office/powerpoint/2010/main" val="951745335"/>
+        <p14:creationId xmlns:p14="http://schemas.microsoft.com/office/powerpoint/2010/main" val="1617573897"/>
       </p:ext>
     </p:extLst>
   </p:cSld>
@@ -10139,7 +10085,7 @@
           <p:cNvPr id="2" name="Title 1">
             <a:extLst>
               <a:ext uri="{FF2B5EF4-FFF2-40B4-BE49-F238E27FC236}">
-                <a16:creationId xmlns:a16="http://schemas.microsoft.com/office/drawing/2014/main" id="{9F5EE912-1E0A-470C-AB7B-2F2CCC87BB2A}"/>
+                <a16:creationId xmlns:a16="http://schemas.microsoft.com/office/drawing/2014/main" id="{7FC8900C-5155-4F12-9845-2CC9027CCBCA}"/>
               </a:ext>
             </a:extLst>
           </p:cNvPr>
@@ -10157,7 +10103,7 @@
           <a:p>
             <a:r>
               <a:rPr lang="en-US" dirty="0"/>
-              <a:t>Github</a:t>
+              <a:t>Three States</a:t>
             </a:r>
           </a:p>
         </p:txBody>
@@ -10167,7 +10113,7 @@
           <p:cNvPr id="3" name="Content Placeholder 2">
             <a:extLst>
               <a:ext uri="{FF2B5EF4-FFF2-40B4-BE49-F238E27FC236}">
-                <a16:creationId xmlns:a16="http://schemas.microsoft.com/office/drawing/2014/main" id="{64252670-4F73-4792-B175-6F43FDE66830}"/>
+                <a16:creationId xmlns:a16="http://schemas.microsoft.com/office/drawing/2014/main" id="{41415508-FBBE-4D83-AA4F-B5A08A348B02}"/>
               </a:ext>
             </a:extLst>
           </p:cNvPr>
@@ -10180,74 +10126,52 @@
         </p:nvSpPr>
         <p:spPr/>
         <p:txBody>
-          <a:bodyPr>
-            <a:normAutofit lnSpcReduction="10000"/>
-          </a:bodyPr>
+          <a:bodyPr/>
           <a:lstStyle/>
           <a:p>
             <a:r>
               <a:rPr lang="en-US" dirty="0"/>
-              <a:t>Most widely used hosting platform</a:t>
-            </a:r>
-          </a:p>
-          <a:p>
-            <a:r>
-              <a:rPr lang="en-US" dirty="0"/>
-              <a:t>Unlimited public repositories</a:t>
-            </a:r>
-          </a:p>
-          <a:p>
-            <a:r>
-              <a:rPr lang="en-US" dirty="0"/>
-              <a:t>$7/month personal account with unlimited private repositories</a:t>
-            </a:r>
-          </a:p>
-          <a:p>
-            <a:r>
-              <a:rPr lang="en-US" dirty="0"/>
-              <a:t>Enterprise plans allow on-premises hosted solutions.</a:t>
-            </a:r>
-          </a:p>
-          <a:p>
-            <a:r>
-              <a:rPr lang="en-US" dirty="0"/>
-              <a:t>Learning Curve: Experience with Git helps make this easy-</a:t>
-            </a:r>
-            <a:r>
-              <a:rPr lang="en-US" dirty="0" err="1"/>
-              <a:t>ish</a:t>
-            </a:r>
-            <a:endParaRPr lang="en-US" dirty="0"/>
-          </a:p>
-          <a:p>
-            <a:endParaRPr lang="en-US" dirty="0"/>
-          </a:p>
-          <a:p>
-            <a:r>
-              <a:rPr lang="en-US" b="1" dirty="0"/>
-              <a:t>EVERY DEVELOPER SHOULD HAVE A GITHUB PROFILE</a:t>
-            </a:r>
-            <a:endParaRPr lang="en-US" dirty="0"/>
+              <a:t>Modified</a:t>
+            </a:r>
           </a:p>
           <a:p>
             <a:pPr lvl="1"/>
             <a:r>
               <a:rPr lang="en-US" dirty="0"/>
-              <a:t>Host code you’re proud of</a:t>
+              <a:t>You’ve made a change to one or more files.</a:t>
+            </a:r>
+          </a:p>
+          <a:p>
+            <a:r>
+              <a:rPr lang="en-US" dirty="0"/>
+              <a:t>Staged</a:t>
             </a:r>
           </a:p>
           <a:p>
             <a:pPr lvl="1"/>
             <a:r>
               <a:rPr lang="en-US" dirty="0"/>
-              <a:t>Fork someone else’s code and make a change</a:t>
+              <a:t>You’ve gone through and selected the files you want to commit</a:t>
             </a:r>
           </a:p>
           <a:p>
             <a:pPr lvl="1"/>
             <a:r>
               <a:rPr lang="en-US" dirty="0"/>
-              <a:t>It’s as good as or better than a resume!</a:t>
+              <a:t>You don’t HAVE to commit everything in one go!</a:t>
+            </a:r>
+          </a:p>
+          <a:p>
+            <a:r>
+              <a:rPr lang="en-US" dirty="0"/>
+              <a:t>Committed</a:t>
+            </a:r>
+          </a:p>
+          <a:p>
+            <a:pPr lvl="1"/>
+            <a:r>
+              <a:rPr lang="en-US" dirty="0"/>
+              <a:t>Committing is the part that is recorded to Git. It’s now part of the log and can be seen in the history.</a:t>
             </a:r>
           </a:p>
         </p:txBody>
@@ -10255,7 +10179,7 @@
     </p:spTree>
     <p:extLst>
       <p:ext uri="{BB962C8B-B14F-4D97-AF65-F5344CB8AC3E}">
-        <p14:creationId xmlns:p14="http://schemas.microsoft.com/office/powerpoint/2010/main" val="3303160553"/>
+        <p14:creationId xmlns:p14="http://schemas.microsoft.com/office/powerpoint/2010/main" val="4231516819"/>
       </p:ext>
     </p:extLst>
   </p:cSld>
@@ -10460,7 +10384,7 @@
           <p:cNvPr id="2" name="Title 1">
             <a:extLst>
               <a:ext uri="{FF2B5EF4-FFF2-40B4-BE49-F238E27FC236}">
-                <a16:creationId xmlns:a16="http://schemas.microsoft.com/office/drawing/2014/main" id="{4EAC3CEE-55B5-498F-B337-F6698845AD6D}"/>
+                <a16:creationId xmlns:a16="http://schemas.microsoft.com/office/drawing/2014/main" id="{6374560B-CBBB-4D34-81B8-BCEC16AC23A1}"/>
               </a:ext>
             </a:extLst>
           </p:cNvPr>
@@ -10477,10 +10401,17 @@
           <a:lstStyle/>
           <a:p>
             <a:r>
-              <a:rPr lang="en-US" dirty="0" err="1"/>
-              <a:t>BitBucket</a:t>
-            </a:r>
-            <a:endParaRPr lang="en-US" dirty="0"/>
+              <a:rPr lang="en-US" dirty="0"/>
+              <a:t>Not </a:t>
+            </a:r>
+            <a:r>
+              <a:rPr lang="en-US" i="1" dirty="0"/>
+              <a:t>quite </a:t>
+            </a:r>
+            <a:r>
+              <a:rPr lang="en-US" dirty="0"/>
+              <a:t>done - probably</a:t>
+            </a:r>
           </a:p>
         </p:txBody>
       </p:sp>
@@ -10489,7 +10420,7 @@
           <p:cNvPr id="3" name="Content Placeholder 2">
             <a:extLst>
               <a:ext uri="{FF2B5EF4-FFF2-40B4-BE49-F238E27FC236}">
-                <a16:creationId xmlns:a16="http://schemas.microsoft.com/office/drawing/2014/main" id="{A230217E-4487-403E-9114-3429E27BD4A2}"/>
+                <a16:creationId xmlns:a16="http://schemas.microsoft.com/office/drawing/2014/main" id="{3917125C-2BDC-4B04-B75A-31F80461EF98}"/>
               </a:ext>
             </a:extLst>
           </p:cNvPr>
@@ -10507,36 +10438,36 @@
           <a:p>
             <a:r>
               <a:rPr lang="en-US" dirty="0"/>
-              <a:t>Free up to 5 users</a:t>
-            </a:r>
-          </a:p>
-          <a:p>
-            <a:r>
-              <a:rPr lang="en-US" dirty="0"/>
-              <a:t>Unlimited public repositories</a:t>
-            </a:r>
-          </a:p>
-          <a:p>
-            <a:r>
-              <a:rPr lang="en-US" dirty="0"/>
-              <a:t>Unlimited private repositories</a:t>
-            </a:r>
-          </a:p>
-          <a:p>
-            <a:r>
-              <a:rPr lang="en-US" dirty="0"/>
-              <a:t>Pricing beyond 5 users is roughly $1/month/user</a:t>
+              <a:t>In most cases, you still need to synchronize your code with a shared repository.</a:t>
+            </a:r>
+          </a:p>
+          <a:p>
+            <a:r>
+              <a:rPr lang="en-US" dirty="0"/>
+              <a:t>This is known as a “Push”</a:t>
+            </a:r>
+          </a:p>
+          <a:p>
+            <a:r>
+              <a:rPr lang="en-US" dirty="0"/>
+              <a:t>Getting code from the central repo is known as a “Pull”</a:t>
             </a:r>
           </a:p>
           <a:p>
             <a:endParaRPr lang="en-US" dirty="0"/>
+          </a:p>
+          <a:p>
+            <a:r>
+              <a:rPr lang="en-US" dirty="0"/>
+              <a:t>If you both “Pull” and “Push” – you have “synced” your code.</a:t>
+            </a:r>
           </a:p>
         </p:txBody>
       </p:sp>
     </p:spTree>
     <p:extLst>
       <p:ext uri="{BB962C8B-B14F-4D97-AF65-F5344CB8AC3E}">
-        <p14:creationId xmlns:p14="http://schemas.microsoft.com/office/powerpoint/2010/main" val="2402215412"/>
+        <p14:creationId xmlns:p14="http://schemas.microsoft.com/office/powerpoint/2010/main" val="4155925949"/>
       </p:ext>
     </p:extLst>
   </p:cSld>
@@ -10549,6 +10480,14 @@
 <file path=ppt/slides/slide21.xml><?xml version="1.0" encoding="utf-8"?>
 <p:sld xmlns:a="http://schemas.openxmlformats.org/drawingml/2006/main" xmlns:r="http://schemas.openxmlformats.org/officeDocument/2006/relationships" xmlns:p="http://schemas.openxmlformats.org/presentationml/2006/main">
   <p:cSld>
+    <p:bg>
+      <p:bgPr>
+        <a:solidFill>
+          <a:schemeClr val="bg1"/>
+        </a:solidFill>
+        <a:effectLst/>
+      </p:bgPr>
+    </p:bg>
     <p:spTree>
       <p:nvGrpSpPr>
         <p:cNvPr id="1" name=""/>
@@ -10565,10 +10504,140 @@
       </p:grpSpPr>
       <p:sp>
         <p:nvSpPr>
+          <p:cNvPr id="8" name="Rectangle 7">
+            <a:extLst>
+              <a:ext uri="{FF2B5EF4-FFF2-40B4-BE49-F238E27FC236}">
+                <a16:creationId xmlns:a16="http://schemas.microsoft.com/office/drawing/2014/main" id="{23962611-DFD5-4092-AAFD-559E3DFCE2C9}"/>
+              </a:ext>
+              <a:ext uri="{C183D7F6-B498-43B3-948B-1728B52AA6E4}">
+                <adec:decorative xmlns:adec="http://schemas.microsoft.com/office/drawing/2017/decorative" val="1"/>
+              </a:ext>
+            </a:extLst>
+          </p:cNvPr>
+          <p:cNvSpPr>
+            <a:spLocks noGrp="1" noRot="1" noChangeAspect="1" noMove="1" noResize="1" noEditPoints="1" noAdjustHandles="1" noChangeArrowheads="1" noChangeShapeType="1" noTextEdit="1"/>
+          </p:cNvSpPr>
+          <p:nvPr>
+            <p:extLst>
+              <p:ext uri="{386F3935-93C4-4BCD-93E2-E3B085C9AB24}">
+                <p16:designElem xmlns:p16="http://schemas.microsoft.com/office/powerpoint/2015/main" val="1"/>
+              </p:ext>
+            </p:extLst>
+          </p:nvPr>
+        </p:nvSpPr>
+        <p:spPr>
+          <a:xfrm>
+            <a:off x="475488" y="0"/>
+            <a:ext cx="10910292" cy="6858000"/>
+          </a:xfrm>
+          <a:prstGeom prst="rect">
+            <a:avLst/>
+          </a:prstGeom>
+          <a:gradFill>
+            <a:gsLst>
+              <a:gs pos="0">
+                <a:schemeClr val="accent1">
+                  <a:lumMod val="90000"/>
+                </a:schemeClr>
+              </a:gs>
+              <a:gs pos="25000">
+                <a:schemeClr val="accent1">
+                  <a:lumMod val="90000"/>
+                </a:schemeClr>
+              </a:gs>
+              <a:gs pos="94000">
+                <a:schemeClr val="bg2">
+                  <a:lumMod val="25000"/>
+                </a:schemeClr>
+              </a:gs>
+              <a:gs pos="100000">
+                <a:schemeClr val="bg2">
+                  <a:lumMod val="25000"/>
+                </a:schemeClr>
+              </a:gs>
+            </a:gsLst>
+            <a:lin ang="4200000" scaled="0"/>
+          </a:gradFill>
+          <a:ln>
+            <a:noFill/>
+          </a:ln>
+        </p:spPr>
+        <p:style>
+          <a:lnRef idx="2">
+            <a:schemeClr val="accent1">
+              <a:shade val="50000"/>
+            </a:schemeClr>
+          </a:lnRef>
+          <a:fillRef idx="1">
+            <a:schemeClr val="accent1"/>
+          </a:fillRef>
+          <a:effectRef idx="0">
+            <a:schemeClr val="accent1"/>
+          </a:effectRef>
+          <a:fontRef idx="minor">
+            <a:schemeClr val="lt1"/>
+          </a:fontRef>
+        </p:style>
+        <p:txBody>
+          <a:bodyPr rtlCol="0" anchor="ctr"/>
+          <a:lstStyle/>
+          <a:p>
+            <a:pPr algn="ctr"/>
+            <a:endParaRPr lang="en-US"/>
+          </a:p>
+        </p:txBody>
+      </p:sp>
+      <p:pic>
+        <p:nvPicPr>
+          <p:cNvPr id="10" name="Picture 9">
+            <a:extLst>
+              <a:ext uri="{FF2B5EF4-FFF2-40B4-BE49-F238E27FC236}">
+                <a16:creationId xmlns:a16="http://schemas.microsoft.com/office/drawing/2014/main" id="{2270F1FA-0425-408F-9861-80BF5AFB276D}"/>
+              </a:ext>
+              <a:ext uri="{C183D7F6-B498-43B3-948B-1728B52AA6E4}">
+                <adec:decorative xmlns:adec="http://schemas.microsoft.com/office/drawing/2017/decorative" val="1"/>
+              </a:ext>
+            </a:extLst>
+          </p:cNvPr>
+          <p:cNvPicPr>
+            <a:picLocks noGrp="1" noRot="1" noChangeAspect="1" noMove="1" noResize="1" noEditPoints="1" noAdjustHandles="1" noChangeArrowheads="1" noChangeShapeType="1" noCrop="1"/>
+          </p:cNvPicPr>
+          <p:nvPr>
+            <p:extLst>
+              <p:ext uri="{386F3935-93C4-4BCD-93E2-E3B085C9AB24}">
+                <p16:designElem xmlns:p16="http://schemas.microsoft.com/office/powerpoint/2015/main" val="1"/>
+              </p:ext>
+            </p:extLst>
+          </p:nvPr>
+        </p:nvPicPr>
+        <p:blipFill>
+          <a:blip r:embed="rId2">
+            <a:extLst>
+              <a:ext uri="{28A0092B-C50C-407E-A947-70E740481C1C}">
+                <a14:useLocalDpi xmlns:a14="http://schemas.microsoft.com/office/drawing/2010/main" val="0"/>
+              </a:ext>
+            </a:extLst>
+          </a:blip>
+          <a:stretch>
+            <a:fillRect/>
+          </a:stretch>
+        </p:blipFill>
+        <p:spPr>
+          <a:xfrm>
+            <a:off x="0" y="0"/>
+            <a:ext cx="12192000" cy="6858000"/>
+          </a:xfrm>
+          <a:prstGeom prst="rect">
+            <a:avLst/>
+          </a:prstGeom>
+        </p:spPr>
+      </p:pic>
+      <p:sp>
+        <p:nvSpPr>
           <p:cNvPr id="2" name="Title 1">
             <a:extLst>
               <a:ext uri="{FF2B5EF4-FFF2-40B4-BE49-F238E27FC236}">
-                <a16:creationId xmlns:a16="http://schemas.microsoft.com/office/drawing/2014/main" id="{6174851A-8287-468C-9577-53577DE4E1C5}"/>
+                <a16:creationId xmlns:a16="http://schemas.microsoft.com/office/drawing/2014/main" id="{9232E434-9413-4B36-99F6-6127E6ACA56E}"/>
               </a:ext>
             </a:extLst>
           </p:cNvPr>
@@ -10579,24 +10648,39 @@
             <p:ph type="title"/>
           </p:nvPr>
         </p:nvSpPr>
-        <p:spPr/>
-        <p:txBody>
-          <a:bodyPr/>
+        <p:spPr>
+          <a:xfrm>
+            <a:off x="3045368" y="2043663"/>
+            <a:ext cx="6105194" cy="2031055"/>
+          </a:xfrm>
+        </p:spPr>
+        <p:txBody>
+          <a:bodyPr vert="horz" lIns="91440" tIns="45720" rIns="91440" bIns="45720" rtlCol="0" anchor="b">
+            <a:normAutofit/>
+          </a:bodyPr>
           <a:lstStyle/>
           <a:p>
-            <a:r>
-              <a:rPr lang="en-US" dirty="0"/>
-              <a:t>Host roundup</a:t>
-            </a:r>
-          </a:p>
-        </p:txBody>
-      </p:sp>
-      <p:sp>
-        <p:nvSpPr>
-          <p:cNvPr id="3" name="Content Placeholder 2">
+            <a:pPr algn="ctr"/>
+            <a:r>
+              <a:rPr lang="en-US" kern="1200">
+                <a:solidFill>
+                  <a:srgbClr val="FFFFFF"/>
+                </a:solidFill>
+                <a:latin typeface="+mj-lt"/>
+                <a:ea typeface="+mj-ea"/>
+                <a:cs typeface="+mj-cs"/>
+              </a:rPr>
+              <a:t>Hosted Git Repos</a:t>
+            </a:r>
+          </a:p>
+        </p:txBody>
+      </p:sp>
+      <p:sp>
+        <p:nvSpPr>
+          <p:cNvPr id="3" name="Text Placeholder 2">
             <a:extLst>
               <a:ext uri="{FF2B5EF4-FFF2-40B4-BE49-F238E27FC236}">
-                <a16:creationId xmlns:a16="http://schemas.microsoft.com/office/drawing/2014/main" id="{A031299B-ADFE-4523-8946-52288916B63F}"/>
+                <a16:creationId xmlns:a16="http://schemas.microsoft.com/office/drawing/2014/main" id="{980E02D7-15CA-454F-A487-78BF648CF9F0}"/>
               </a:ext>
             </a:extLst>
           </p:cNvPr>
@@ -10604,50 +10688,32 @@
             <a:spLocks noGrp="1"/>
           </p:cNvSpPr>
           <p:nvPr>
-            <p:ph idx="1"/>
-          </p:nvPr>
-        </p:nvSpPr>
-        <p:spPr/>
-        <p:txBody>
-          <a:bodyPr/>
+            <p:ph type="body" idx="1"/>
+          </p:nvPr>
+        </p:nvSpPr>
+        <p:spPr>
+          <a:xfrm>
+            <a:off x="3045368" y="4074718"/>
+            <a:ext cx="6105194" cy="682079"/>
+          </a:xfrm>
+        </p:spPr>
+        <p:txBody>
+          <a:bodyPr vert="horz" lIns="91440" tIns="45720" rIns="91440" bIns="45720" rtlCol="0">
+            <a:normAutofit/>
+          </a:bodyPr>
           <a:lstStyle/>
           <a:p>
-            <a:r>
-              <a:rPr lang="en-US" dirty="0"/>
-              <a:t>Choose Github for your open-source, publicly-viewable projects</a:t>
-            </a:r>
-          </a:p>
-          <a:p>
-            <a:r>
-              <a:rPr lang="en-US" dirty="0"/>
-              <a:t>Choose Azure </a:t>
-            </a:r>
-            <a:r>
-              <a:rPr lang="en-US" dirty="0" err="1"/>
-              <a:t>Devops</a:t>
-            </a:r>
-            <a:r>
-              <a:rPr lang="en-US" dirty="0"/>
-              <a:t> for company projects, or for running the CI/CD builds on your GitHub repo (Yes, you can do BOTH!)</a:t>
-            </a:r>
-          </a:p>
-          <a:p>
-            <a:r>
-              <a:rPr lang="en-US" dirty="0" err="1"/>
-              <a:t>BitBucket</a:t>
-            </a:r>
-            <a:r>
-              <a:rPr lang="en-US" dirty="0"/>
-              <a:t> offers a nice alternative to Github, but is not as well known. Mileage may vary.</a:t>
-            </a:r>
-          </a:p>
-          <a:p>
-            <a:endParaRPr lang="en-US" dirty="0"/>
-          </a:p>
-          <a:p>
-            <a:r>
-              <a:rPr lang="en-US" dirty="0"/>
-              <a:t>AWS is offering some interesting new options</a:t>
+            <a:pPr algn="ctr"/>
+            <a:r>
+              <a:rPr lang="en-US" kern="1200">
+                <a:solidFill>
+                  <a:srgbClr val="FFFFFF"/>
+                </a:solidFill>
+                <a:latin typeface="+mn-lt"/>
+                <a:ea typeface="+mn-ea"/>
+                <a:cs typeface="+mn-cs"/>
+              </a:rPr>
+              <a:t>Sharing the code!</a:t>
             </a:r>
           </a:p>
         </p:txBody>
@@ -10655,7 +10721,7 @@
     </p:spTree>
     <p:extLst>
       <p:ext uri="{BB962C8B-B14F-4D97-AF65-F5344CB8AC3E}">
-        <p14:creationId xmlns:p14="http://schemas.microsoft.com/office/powerpoint/2010/main" val="2372600824"/>
+        <p14:creationId xmlns:p14="http://schemas.microsoft.com/office/powerpoint/2010/main" val="784079646"/>
       </p:ext>
     </p:extLst>
   </p:cSld>
@@ -10668,6 +10734,14 @@
 <file path=ppt/slides/slide22.xml><?xml version="1.0" encoding="utf-8"?>
 <p:sld xmlns:a="http://schemas.openxmlformats.org/drawingml/2006/main" xmlns:r="http://schemas.openxmlformats.org/officeDocument/2006/relationships" xmlns:p="http://schemas.openxmlformats.org/presentationml/2006/main">
   <p:cSld>
+    <p:bg>
+      <p:bgPr>
+        <a:solidFill>
+          <a:schemeClr val="bg1"/>
+        </a:solidFill>
+        <a:effectLst/>
+      </p:bgPr>
+    </p:bg>
     <p:spTree>
       <p:nvGrpSpPr>
         <p:cNvPr id="1" name=""/>
@@ -10682,12 +10756,202 @@
           <a:chExt cx="0" cy="0"/>
         </a:xfrm>
       </p:grpSpPr>
+      <p:sp useBgFill="1">
+        <p:nvSpPr>
+          <p:cNvPr id="8" name="Rectangle 7">
+            <a:extLst>
+              <a:ext uri="{FF2B5EF4-FFF2-40B4-BE49-F238E27FC236}">
+                <a16:creationId xmlns:a16="http://schemas.microsoft.com/office/drawing/2014/main" id="{3B854194-185D-494D-905C-7C7CB2E30F6E}"/>
+              </a:ext>
+              <a:ext uri="{C183D7F6-B498-43B3-948B-1728B52AA6E4}">
+                <adec:decorative xmlns:adec="http://schemas.microsoft.com/office/drawing/2017/decorative" val="1"/>
+              </a:ext>
+            </a:extLst>
+          </p:cNvPr>
+          <p:cNvSpPr>
+            <a:spLocks noGrp="1" noRot="1" noChangeAspect="1" noMove="1" noResize="1" noEditPoints="1" noAdjustHandles="1" noChangeArrowheads="1" noChangeShapeType="1" noTextEdit="1"/>
+          </p:cNvSpPr>
+          <p:nvPr>
+            <p:extLst>
+              <p:ext uri="{386F3935-93C4-4BCD-93E2-E3B085C9AB24}">
+                <p16:designElem xmlns:p16="http://schemas.microsoft.com/office/powerpoint/2015/main" val="1"/>
+              </p:ext>
+            </p:extLst>
+          </p:nvPr>
+        </p:nvSpPr>
+        <p:spPr>
+          <a:xfrm>
+            <a:off x="1" y="0"/>
+            <a:ext cx="6082110" cy="6858000"/>
+          </a:xfrm>
+          <a:prstGeom prst="rect">
+            <a:avLst/>
+          </a:prstGeom>
+          <a:ln>
+            <a:noFill/>
+          </a:ln>
+        </p:spPr>
+        <p:style>
+          <a:lnRef idx="2">
+            <a:schemeClr val="accent1">
+              <a:shade val="50000"/>
+            </a:schemeClr>
+          </a:lnRef>
+          <a:fillRef idx="1">
+            <a:schemeClr val="accent1"/>
+          </a:fillRef>
+          <a:effectRef idx="0">
+            <a:schemeClr val="accent1"/>
+          </a:effectRef>
+          <a:fontRef idx="minor">
+            <a:schemeClr val="lt1"/>
+          </a:fontRef>
+        </p:style>
+        <p:txBody>
+          <a:bodyPr rtlCol="0" anchor="ctr"/>
+          <a:lstStyle/>
+          <a:p>
+            <a:pPr algn="ctr"/>
+            <a:endParaRPr lang="en-US"/>
+          </a:p>
+        </p:txBody>
+      </p:sp>
+      <p:sp>
+        <p:nvSpPr>
+          <p:cNvPr id="10" name="Rectangle 9">
+            <a:extLst>
+              <a:ext uri="{FF2B5EF4-FFF2-40B4-BE49-F238E27FC236}">
+                <a16:creationId xmlns:a16="http://schemas.microsoft.com/office/drawing/2014/main" id="{B4F5FA0D-0104-4987-8241-EFF7C85B88DE}"/>
+              </a:ext>
+              <a:ext uri="{C183D7F6-B498-43B3-948B-1728B52AA6E4}">
+                <adec:decorative xmlns:adec="http://schemas.microsoft.com/office/drawing/2017/decorative" val="1"/>
+              </a:ext>
+            </a:extLst>
+          </p:cNvPr>
+          <p:cNvSpPr>
+            <a:spLocks noGrp="1" noRot="1" noChangeAspect="1" noMove="1" noResize="1" noEditPoints="1" noAdjustHandles="1" noChangeArrowheads="1" noChangeShapeType="1" noTextEdit="1"/>
+          </p:cNvSpPr>
+          <p:nvPr>
+            <p:extLst>
+              <p:ext uri="{386F3935-93C4-4BCD-93E2-E3B085C9AB24}">
+                <p16:designElem xmlns:p16="http://schemas.microsoft.com/office/powerpoint/2015/main" val="1"/>
+              </p:ext>
+            </p:extLst>
+          </p:nvPr>
+        </p:nvSpPr>
+        <p:spPr>
+          <a:xfrm>
+            <a:off x="1" y="0"/>
+            <a:ext cx="12191998" cy="6858000"/>
+          </a:xfrm>
+          <a:prstGeom prst="rect">
+            <a:avLst/>
+          </a:prstGeom>
+          <a:gradFill>
+            <a:gsLst>
+              <a:gs pos="0">
+                <a:schemeClr val="accent1">
+                  <a:lumMod val="90000"/>
+                </a:schemeClr>
+              </a:gs>
+              <a:gs pos="25000">
+                <a:schemeClr val="accent1">
+                  <a:lumMod val="90000"/>
+                </a:schemeClr>
+              </a:gs>
+              <a:gs pos="94000">
+                <a:schemeClr val="bg2">
+                  <a:lumMod val="25000"/>
+                </a:schemeClr>
+              </a:gs>
+              <a:gs pos="100000">
+                <a:schemeClr val="bg2">
+                  <a:lumMod val="25000"/>
+                </a:schemeClr>
+              </a:gs>
+            </a:gsLst>
+            <a:lin ang="4200000" scaled="0"/>
+          </a:gradFill>
+          <a:ln>
+            <a:noFill/>
+          </a:ln>
+        </p:spPr>
+        <p:style>
+          <a:lnRef idx="2">
+            <a:schemeClr val="accent1">
+              <a:shade val="50000"/>
+            </a:schemeClr>
+          </a:lnRef>
+          <a:fillRef idx="1">
+            <a:schemeClr val="accent1"/>
+          </a:fillRef>
+          <a:effectRef idx="0">
+            <a:schemeClr val="accent1"/>
+          </a:effectRef>
+          <a:fontRef idx="minor">
+            <a:schemeClr val="lt1"/>
+          </a:fontRef>
+        </p:style>
+        <p:txBody>
+          <a:bodyPr rtlCol="0" anchor="ctr"/>
+          <a:lstStyle/>
+          <a:p>
+            <a:pPr algn="ctr"/>
+            <a:endParaRPr lang="en-US"/>
+          </a:p>
+        </p:txBody>
+      </p:sp>
+      <p:pic>
+        <p:nvPicPr>
+          <p:cNvPr id="20" name="Picture 11">
+            <a:extLst>
+              <a:ext uri="{FF2B5EF4-FFF2-40B4-BE49-F238E27FC236}">
+                <a16:creationId xmlns:a16="http://schemas.microsoft.com/office/drawing/2014/main" id="{2897127E-6CEF-446C-BE87-93B7C46E49D1}"/>
+              </a:ext>
+              <a:ext uri="{C183D7F6-B498-43B3-948B-1728B52AA6E4}">
+                <adec:decorative xmlns:adec="http://schemas.microsoft.com/office/drawing/2017/decorative" val="1"/>
+              </a:ext>
+            </a:extLst>
+          </p:cNvPr>
+          <p:cNvPicPr>
+            <a:picLocks noGrp="1" noRot="1" noChangeAspect="1" noMove="1" noResize="1" noEditPoints="1" noAdjustHandles="1" noChangeArrowheads="1" noChangeShapeType="1" noCrop="1"/>
+          </p:cNvPicPr>
+          <p:nvPr>
+            <p:extLst>
+              <p:ext uri="{386F3935-93C4-4BCD-93E2-E3B085C9AB24}">
+                <p16:designElem xmlns:p16="http://schemas.microsoft.com/office/powerpoint/2015/main" val="1"/>
+              </p:ext>
+            </p:extLst>
+          </p:nvPr>
+        </p:nvPicPr>
+        <p:blipFill>
+          <a:blip r:embed="rId2">
+            <a:extLst>
+              <a:ext uri="{28A0092B-C50C-407E-A947-70E740481C1C}">
+                <a14:useLocalDpi xmlns:a14="http://schemas.microsoft.com/office/drawing/2010/main" val="0"/>
+              </a:ext>
+            </a:extLst>
+          </a:blip>
+          <a:stretch>
+            <a:fillRect/>
+          </a:stretch>
+        </p:blipFill>
+        <p:spPr>
+          <a:xfrm>
+            <a:off x="0" y="0"/>
+            <a:ext cx="12192000" cy="6858000"/>
+          </a:xfrm>
+          <a:prstGeom prst="rect">
+            <a:avLst/>
+          </a:prstGeom>
+        </p:spPr>
+      </p:pic>
       <p:sp>
         <p:nvSpPr>
           <p:cNvPr id="2" name="Title 1">
             <a:extLst>
               <a:ext uri="{FF2B5EF4-FFF2-40B4-BE49-F238E27FC236}">
-                <a16:creationId xmlns:a16="http://schemas.microsoft.com/office/drawing/2014/main" id="{009C8563-8243-4BD7-A153-2AF7C9C016E2}"/>
+                <a16:creationId xmlns:a16="http://schemas.microsoft.com/office/drawing/2014/main" id="{5B9111D1-EBA9-469A-A5AC-94959A3B7E01}"/>
               </a:ext>
             </a:extLst>
           </p:cNvPr>
@@ -10698,24 +10962,35 @@
             <p:ph type="title"/>
           </p:nvPr>
         </p:nvSpPr>
-        <p:spPr/>
-        <p:txBody>
-          <a:bodyPr/>
+        <p:spPr>
+          <a:xfrm>
+            <a:off x="640079" y="2053641"/>
+            <a:ext cx="3669161" cy="2760098"/>
+          </a:xfrm>
+        </p:spPr>
+        <p:txBody>
+          <a:bodyPr>
+            <a:normAutofit/>
+          </a:bodyPr>
           <a:lstStyle/>
           <a:p>
             <a:r>
-              <a:rPr lang="en-US" dirty="0"/>
-              <a:t>Branching and Merging</a:t>
-            </a:r>
-          </a:p>
-        </p:txBody>
-      </p:sp>
-      <p:sp>
-        <p:nvSpPr>
-          <p:cNvPr id="3" name="Text Placeholder 2">
+              <a:rPr lang="en-US">
+                <a:solidFill>
+                  <a:srgbClr val="FFFFFF"/>
+                </a:solidFill>
+              </a:rPr>
+              <a:t>Repos</a:t>
+            </a:r>
+          </a:p>
+        </p:txBody>
+      </p:sp>
+      <p:sp>
+        <p:nvSpPr>
+          <p:cNvPr id="3" name="Content Placeholder 2">
             <a:extLst>
               <a:ext uri="{FF2B5EF4-FFF2-40B4-BE49-F238E27FC236}">
-                <a16:creationId xmlns:a16="http://schemas.microsoft.com/office/drawing/2014/main" id="{182F19D3-529A-4D24-A8A1-8F63D0085728}"/>
+                <a16:creationId xmlns:a16="http://schemas.microsoft.com/office/drawing/2014/main" id="{66A1847F-81AF-4B9B-96B0-C1825FDCDF8F}"/>
               </a:ext>
             </a:extLst>
           </p:cNvPr>
@@ -10723,25 +10998,140 @@
             <a:spLocks noGrp="1"/>
           </p:cNvSpPr>
           <p:nvPr>
-            <p:ph type="body" idx="1"/>
-          </p:nvPr>
-        </p:nvSpPr>
-        <p:spPr/>
-        <p:txBody>
-          <a:bodyPr/>
+            <p:ph idx="1"/>
+          </p:nvPr>
+        </p:nvSpPr>
+        <p:spPr>
+          <a:xfrm>
+            <a:off x="6090574" y="801866"/>
+            <a:ext cx="5306084" cy="5230634"/>
+          </a:xfrm>
+        </p:spPr>
+        <p:txBody>
+          <a:bodyPr anchor="ctr">
+            <a:normAutofit/>
+          </a:bodyPr>
           <a:lstStyle/>
           <a:p>
             <a:r>
-              <a:rPr lang="en-US" dirty="0"/>
-              <a:t>How to stay sane</a:t>
-            </a:r>
+              <a:rPr lang="en-US" sz="2200">
+                <a:solidFill>
+                  <a:srgbClr val="000000"/>
+                </a:solidFill>
+              </a:rPr>
+              <a:t>Big 3</a:t>
+            </a:r>
+          </a:p>
+          <a:p>
+            <a:r>
+              <a:rPr lang="en-US" sz="2200">
+                <a:solidFill>
+                  <a:srgbClr val="000000"/>
+                </a:solidFill>
+              </a:rPr>
+              <a:t>Azure Devops</a:t>
+            </a:r>
+          </a:p>
+          <a:p>
+            <a:pPr lvl="1"/>
+            <a:r>
+              <a:rPr lang="en-US" sz="2200">
+                <a:solidFill>
+                  <a:srgbClr val="000000"/>
+                </a:solidFill>
+              </a:rPr>
+              <a:t>Known for closed source projects</a:t>
+            </a:r>
+          </a:p>
+          <a:p>
+            <a:pPr lvl="1"/>
+            <a:r>
+              <a:rPr lang="en-US" sz="2200">
+                <a:solidFill>
+                  <a:srgbClr val="000000"/>
+                </a:solidFill>
+              </a:rPr>
+              <a:t>High-End CI/CD functionality</a:t>
+            </a:r>
+          </a:p>
+          <a:p>
+            <a:pPr lvl="1"/>
+            <a:r>
+              <a:rPr lang="en-US" sz="2200">
+                <a:solidFill>
+                  <a:srgbClr val="000000"/>
+                </a:solidFill>
+              </a:rPr>
+              <a:t>Exceptional project tracking via TFS</a:t>
+            </a:r>
+          </a:p>
+          <a:p>
+            <a:r>
+              <a:rPr lang="en-US" sz="2200">
+                <a:solidFill>
+                  <a:srgbClr val="000000"/>
+                </a:solidFill>
+              </a:rPr>
+              <a:t>GitHub</a:t>
+            </a:r>
+          </a:p>
+          <a:p>
+            <a:pPr lvl="1"/>
+            <a:r>
+              <a:rPr lang="en-US" sz="2200">
+                <a:solidFill>
+                  <a:srgbClr val="000000"/>
+                </a:solidFill>
+              </a:rPr>
+              <a:t>Known for open source projects</a:t>
+            </a:r>
+          </a:p>
+          <a:p>
+            <a:pPr lvl="1"/>
+            <a:r>
+              <a:rPr lang="en-US" sz="2200">
+                <a:solidFill>
+                  <a:srgbClr val="000000"/>
+                </a:solidFill>
+              </a:rPr>
+              <a:t>Exceptional bug-tracking and messaging</a:t>
+            </a:r>
+          </a:p>
+          <a:p>
+            <a:pPr lvl="1"/>
+            <a:r>
+              <a:rPr lang="en-US" sz="2200">
+                <a:solidFill>
+                  <a:srgbClr val="000000"/>
+                </a:solidFill>
+              </a:rPr>
+              <a:t>API works well with most CI/CD platforms, Team City, Jenkins, TFS, etc.</a:t>
+            </a:r>
+          </a:p>
+          <a:p>
+            <a:r>
+              <a:rPr lang="en-US" sz="2200">
+                <a:solidFill>
+                  <a:srgbClr val="000000"/>
+                </a:solidFill>
+              </a:rPr>
+              <a:t>BitBucket</a:t>
+            </a:r>
+          </a:p>
+          <a:p>
+            <a:pPr lvl="1"/>
+            <a:endParaRPr lang="en-US" sz="2200">
+              <a:solidFill>
+                <a:srgbClr val="000000"/>
+              </a:solidFill>
+            </a:endParaRPr>
           </a:p>
         </p:txBody>
       </p:sp>
     </p:spTree>
     <p:extLst>
       <p:ext uri="{BB962C8B-B14F-4D97-AF65-F5344CB8AC3E}">
-        <p14:creationId xmlns:p14="http://schemas.microsoft.com/office/powerpoint/2010/main" val="3084031404"/>
+        <p14:creationId xmlns:p14="http://schemas.microsoft.com/office/powerpoint/2010/main" val="662332301"/>
       </p:ext>
     </p:extLst>
   </p:cSld>
@@ -10754,6 +11144,14 @@
 <file path=ppt/slides/slide23.xml><?xml version="1.0" encoding="utf-8"?>
 <p:sld xmlns:a="http://schemas.openxmlformats.org/drawingml/2006/main" xmlns:r="http://schemas.openxmlformats.org/officeDocument/2006/relationships" xmlns:p="http://schemas.openxmlformats.org/presentationml/2006/main">
   <p:cSld>
+    <p:bg>
+      <p:bgPr>
+        <a:solidFill>
+          <a:schemeClr val="bg1"/>
+        </a:solidFill>
+        <a:effectLst/>
+      </p:bgPr>
+    </p:bg>
     <p:spTree>
       <p:nvGrpSpPr>
         <p:cNvPr id="1" name=""/>
@@ -10768,48 +11166,172 @@
           <a:chExt cx="0" cy="0"/>
         </a:xfrm>
       </p:grpSpPr>
-      <p:sp>
-        <p:nvSpPr>
-          <p:cNvPr id="4" name="Title 3">
+      <p:sp useBgFill="1">
+        <p:nvSpPr>
+          <p:cNvPr id="8" name="Rectangle 7">
             <a:extLst>
               <a:ext uri="{FF2B5EF4-FFF2-40B4-BE49-F238E27FC236}">
-                <a16:creationId xmlns:a16="http://schemas.microsoft.com/office/drawing/2014/main" id="{B4D0A662-C37A-473D-A246-0D681A71BA66}"/>
+                <a16:creationId xmlns:a16="http://schemas.microsoft.com/office/drawing/2014/main" id="{3B854194-185D-494D-905C-7C7CB2E30F6E}"/>
+              </a:ext>
+              <a:ext uri="{C183D7F6-B498-43B3-948B-1728B52AA6E4}">
+                <adec:decorative xmlns:adec="http://schemas.microsoft.com/office/drawing/2017/decorative" val="1"/>
               </a:ext>
             </a:extLst>
           </p:cNvPr>
           <p:cNvSpPr>
-            <a:spLocks noGrp="1"/>
-          </p:cNvSpPr>
-          <p:nvPr>
-            <p:ph type="title"/>
-          </p:nvPr>
-        </p:nvSpPr>
-        <p:spPr/>
-        <p:txBody>
-          <a:bodyPr/>
+            <a:spLocks noGrp="1" noRot="1" noChangeAspect="1" noMove="1" noResize="1" noEditPoints="1" noAdjustHandles="1" noChangeArrowheads="1" noChangeShapeType="1" noTextEdit="1"/>
+          </p:cNvSpPr>
+          <p:nvPr>
+            <p:extLst>
+              <p:ext uri="{386F3935-93C4-4BCD-93E2-E3B085C9AB24}">
+                <p16:designElem xmlns:p16="http://schemas.microsoft.com/office/powerpoint/2015/main" val="1"/>
+              </p:ext>
+            </p:extLst>
+          </p:nvPr>
+        </p:nvSpPr>
+        <p:spPr>
+          <a:xfrm>
+            <a:off x="1" y="0"/>
+            <a:ext cx="6082110" cy="6858000"/>
+          </a:xfrm>
+          <a:prstGeom prst="rect">
+            <a:avLst/>
+          </a:prstGeom>
+          <a:ln>
+            <a:noFill/>
+          </a:ln>
+        </p:spPr>
+        <p:style>
+          <a:lnRef idx="2">
+            <a:schemeClr val="accent1">
+              <a:shade val="50000"/>
+            </a:schemeClr>
+          </a:lnRef>
+          <a:fillRef idx="1">
+            <a:schemeClr val="accent1"/>
+          </a:fillRef>
+          <a:effectRef idx="0">
+            <a:schemeClr val="accent1"/>
+          </a:effectRef>
+          <a:fontRef idx="minor">
+            <a:schemeClr val="lt1"/>
+          </a:fontRef>
+        </p:style>
+        <p:txBody>
+          <a:bodyPr rtlCol="0" anchor="ctr"/>
           <a:lstStyle/>
           <a:p>
-            <a:r>
-              <a:rPr lang="en-US" dirty="0"/>
-              <a:t>Gitflow</a:t>
-            </a:r>
+            <a:pPr algn="ctr"/>
+            <a:endParaRPr lang="en-US"/>
+          </a:p>
+        </p:txBody>
+      </p:sp>
+      <p:sp>
+        <p:nvSpPr>
+          <p:cNvPr id="10" name="Rectangle 9">
+            <a:extLst>
+              <a:ext uri="{FF2B5EF4-FFF2-40B4-BE49-F238E27FC236}">
+                <a16:creationId xmlns:a16="http://schemas.microsoft.com/office/drawing/2014/main" id="{B4F5FA0D-0104-4987-8241-EFF7C85B88DE}"/>
+              </a:ext>
+              <a:ext uri="{C183D7F6-B498-43B3-948B-1728B52AA6E4}">
+                <adec:decorative xmlns:adec="http://schemas.microsoft.com/office/drawing/2017/decorative" val="1"/>
+              </a:ext>
+            </a:extLst>
+          </p:cNvPr>
+          <p:cNvSpPr>
+            <a:spLocks noGrp="1" noRot="1" noChangeAspect="1" noMove="1" noResize="1" noEditPoints="1" noAdjustHandles="1" noChangeArrowheads="1" noChangeShapeType="1" noTextEdit="1"/>
+          </p:cNvSpPr>
+          <p:nvPr>
+            <p:extLst>
+              <p:ext uri="{386F3935-93C4-4BCD-93E2-E3B085C9AB24}">
+                <p16:designElem xmlns:p16="http://schemas.microsoft.com/office/powerpoint/2015/main" val="1"/>
+              </p:ext>
+            </p:extLst>
+          </p:nvPr>
+        </p:nvSpPr>
+        <p:spPr>
+          <a:xfrm>
+            <a:off x="1" y="0"/>
+            <a:ext cx="12191998" cy="6858000"/>
+          </a:xfrm>
+          <a:prstGeom prst="rect">
+            <a:avLst/>
+          </a:prstGeom>
+          <a:gradFill>
+            <a:gsLst>
+              <a:gs pos="0">
+                <a:schemeClr val="accent1">
+                  <a:lumMod val="90000"/>
+                </a:schemeClr>
+              </a:gs>
+              <a:gs pos="25000">
+                <a:schemeClr val="accent1">
+                  <a:lumMod val="90000"/>
+                </a:schemeClr>
+              </a:gs>
+              <a:gs pos="94000">
+                <a:schemeClr val="bg2">
+                  <a:lumMod val="25000"/>
+                </a:schemeClr>
+              </a:gs>
+              <a:gs pos="100000">
+                <a:schemeClr val="bg2">
+                  <a:lumMod val="25000"/>
+                </a:schemeClr>
+              </a:gs>
+            </a:gsLst>
+            <a:lin ang="4200000" scaled="0"/>
+          </a:gradFill>
+          <a:ln>
+            <a:noFill/>
+          </a:ln>
+        </p:spPr>
+        <p:style>
+          <a:lnRef idx="2">
+            <a:schemeClr val="accent1">
+              <a:shade val="50000"/>
+            </a:schemeClr>
+          </a:lnRef>
+          <a:fillRef idx="1">
+            <a:schemeClr val="accent1"/>
+          </a:fillRef>
+          <a:effectRef idx="0">
+            <a:schemeClr val="accent1"/>
+          </a:effectRef>
+          <a:fontRef idx="minor">
+            <a:schemeClr val="lt1"/>
+          </a:fontRef>
+        </p:style>
+        <p:txBody>
+          <a:bodyPr rtlCol="0" anchor="ctr"/>
+          <a:lstStyle/>
+          <a:p>
+            <a:pPr algn="ctr"/>
+            <a:endParaRPr lang="en-US"/>
           </a:p>
         </p:txBody>
       </p:sp>
       <p:pic>
         <p:nvPicPr>
-          <p:cNvPr id="7" name="Content Placeholder 6">
+          <p:cNvPr id="12" name="Picture 11">
             <a:extLst>
               <a:ext uri="{FF2B5EF4-FFF2-40B4-BE49-F238E27FC236}">
-                <a16:creationId xmlns:a16="http://schemas.microsoft.com/office/drawing/2014/main" id="{EEB5084E-8EDB-474F-8DAC-73F4A7AF336D}"/>
+                <a16:creationId xmlns:a16="http://schemas.microsoft.com/office/drawing/2014/main" id="{2897127E-6CEF-446C-BE87-93B7C46E49D1}"/>
+              </a:ext>
+              <a:ext uri="{C183D7F6-B498-43B3-948B-1728B52AA6E4}">
+                <adec:decorative xmlns:adec="http://schemas.microsoft.com/office/drawing/2017/decorative" val="1"/>
               </a:ext>
             </a:extLst>
           </p:cNvPr>
           <p:cNvPicPr>
-            <a:picLocks noGrp="1" noChangeAspect="1"/>
+            <a:picLocks noGrp="1" noRot="1" noChangeAspect="1" noMove="1" noResize="1" noEditPoints="1" noAdjustHandles="1" noChangeArrowheads="1" noChangeShapeType="1" noCrop="1"/>
           </p:cNvPicPr>
           <p:nvPr>
-            <p:ph idx="1"/>
+            <p:extLst>
+              <p:ext uri="{386F3935-93C4-4BCD-93E2-E3B085C9AB24}">
+                <p16:designElem xmlns:p16="http://schemas.microsoft.com/office/powerpoint/2015/main" val="1"/>
+              </p:ext>
+            </p:extLst>
           </p:nvPr>
         </p:nvPicPr>
         <p:blipFill>
@@ -10818,39 +11340,177 @@
               <a:ext uri="{28A0092B-C50C-407E-A947-70E740481C1C}">
                 <a14:useLocalDpi xmlns:a14="http://schemas.microsoft.com/office/drawing/2010/main" val="0"/>
               </a:ext>
-              <a:ext uri="{96DAC541-7B7A-43D3-8B79-37D633B846F1}">
-                <asvg:svgBlip xmlns:asvg="http://schemas.microsoft.com/office/drawing/2016/SVG/main" r:embed="rId3"/>
-              </a:ext>
             </a:extLst>
           </a:blip>
           <a:stretch>
             <a:fillRect/>
           </a:stretch>
         </p:blipFill>
-        <p:spPr bwMode="auto">
-          <a:xfrm>
-            <a:off x="3063709" y="1825625"/>
-            <a:ext cx="6064582" cy="4351338"/>
+        <p:spPr>
+          <a:xfrm>
+            <a:off x="0" y="0"/>
+            <a:ext cx="12192000" cy="6858000"/>
           </a:xfrm>
           <a:prstGeom prst="rect">
             <a:avLst/>
           </a:prstGeom>
-          <a:noFill/>
-          <a:extLst>
-            <a:ext uri="{909E8E84-426E-40DD-AFC4-6F175D3DCCD1}">
-              <a14:hiddenFill xmlns:a14="http://schemas.microsoft.com/office/drawing/2010/main">
+        </p:spPr>
+      </p:pic>
+      <p:sp>
+        <p:nvSpPr>
+          <p:cNvPr id="2" name="Title 1">
+            <a:extLst>
+              <a:ext uri="{FF2B5EF4-FFF2-40B4-BE49-F238E27FC236}">
+                <a16:creationId xmlns:a16="http://schemas.microsoft.com/office/drawing/2014/main" id="{29093CCA-7953-439D-9E03-48C7A94BACAD}"/>
+              </a:ext>
+            </a:extLst>
+          </p:cNvPr>
+          <p:cNvSpPr>
+            <a:spLocks noGrp="1"/>
+          </p:cNvSpPr>
+          <p:nvPr>
+            <p:ph type="title"/>
+          </p:nvPr>
+        </p:nvSpPr>
+        <p:spPr>
+          <a:xfrm>
+            <a:off x="640079" y="2053641"/>
+            <a:ext cx="3669161" cy="2760098"/>
+          </a:xfrm>
+        </p:spPr>
+        <p:txBody>
+          <a:bodyPr>
+            <a:normAutofit/>
+          </a:bodyPr>
+          <a:lstStyle/>
+          <a:p>
+            <a:r>
+              <a:rPr lang="en-US">
                 <a:solidFill>
                   <a:srgbClr val="FFFFFF"/>
                 </a:solidFill>
-              </a14:hiddenFill>
-            </a:ext>
-          </a:extLst>
-        </p:spPr>
-      </p:pic>
+              </a:rPr>
+              <a:t>Azure Devops</a:t>
+            </a:r>
+          </a:p>
+        </p:txBody>
+      </p:sp>
+      <p:sp>
+        <p:nvSpPr>
+          <p:cNvPr id="3" name="Content Placeholder 2">
+            <a:extLst>
+              <a:ext uri="{FF2B5EF4-FFF2-40B4-BE49-F238E27FC236}">
+                <a16:creationId xmlns:a16="http://schemas.microsoft.com/office/drawing/2014/main" id="{5552C562-13BC-49D0-9EF3-1406A4C3C4E4}"/>
+              </a:ext>
+            </a:extLst>
+          </p:cNvPr>
+          <p:cNvSpPr>
+            <a:spLocks noGrp="1"/>
+          </p:cNvSpPr>
+          <p:nvPr>
+            <p:ph idx="1"/>
+          </p:nvPr>
+        </p:nvSpPr>
+        <p:spPr>
+          <a:xfrm>
+            <a:off x="6090574" y="801866"/>
+            <a:ext cx="5306084" cy="5230634"/>
+          </a:xfrm>
+        </p:spPr>
+        <p:txBody>
+          <a:bodyPr anchor="ctr">
+            <a:normAutofit/>
+          </a:bodyPr>
+          <a:lstStyle/>
+          <a:p>
+            <a:r>
+              <a:rPr lang="en-US" sz="2400">
+                <a:solidFill>
+                  <a:srgbClr val="000000"/>
+                </a:solidFill>
+              </a:rPr>
+              <a:t>Free up to 5 users</a:t>
+            </a:r>
+          </a:p>
+          <a:p>
+            <a:r>
+              <a:rPr lang="en-US" sz="2400">
+                <a:solidFill>
+                  <a:srgbClr val="000000"/>
+                </a:solidFill>
+              </a:rPr>
+              <a:t>Unlimited private repos</a:t>
+            </a:r>
+          </a:p>
+          <a:p>
+            <a:r>
+              <a:rPr lang="en-US" sz="2400" strike="sngStrike">
+                <a:solidFill>
+                  <a:srgbClr val="000000"/>
+                </a:solidFill>
+              </a:rPr>
+              <a:t>No public repositories! </a:t>
+            </a:r>
+            <a:r>
+              <a:rPr lang="en-US" sz="2400">
+                <a:solidFill>
+                  <a:srgbClr val="000000"/>
+                </a:solidFill>
+              </a:rPr>
+              <a:t>Public Repositories are in preview as of this writing.</a:t>
+            </a:r>
+            <a:endParaRPr lang="en-US" sz="2400" strike="sngStrike">
+              <a:solidFill>
+                <a:srgbClr val="000000"/>
+              </a:solidFill>
+            </a:endParaRPr>
+          </a:p>
+          <a:p>
+            <a:r>
+              <a:rPr lang="en-US" sz="2400">
+                <a:solidFill>
+                  <a:srgbClr val="000000"/>
+                </a:solidFill>
+              </a:rPr>
+              <a:t>CI/CD pipeline is well developed – no Team City necessary, Octopus Deploy is debatable.</a:t>
+            </a:r>
+          </a:p>
+          <a:p>
+            <a:r>
+              <a:rPr lang="en-US" sz="2400">
+                <a:solidFill>
+                  <a:srgbClr val="000000"/>
+                </a:solidFill>
+              </a:rPr>
+              <a:t>Azure is well integrated – great for websites, services, mobile, etc</a:t>
+            </a:r>
+          </a:p>
+          <a:p>
+            <a:r>
+              <a:rPr lang="en-US" sz="2400">
+                <a:solidFill>
+                  <a:srgbClr val="000000"/>
+                </a:solidFill>
+              </a:rPr>
+              <a:t>Great choice for small business!</a:t>
+            </a:r>
+          </a:p>
+          <a:p>
+            <a:r>
+              <a:rPr lang="en-US" sz="2400">
+                <a:solidFill>
+                  <a:srgbClr val="000000"/>
+                </a:solidFill>
+              </a:rPr>
+              <a:t>Learning Curve: Experience with MS products makes this easy-ish</a:t>
+            </a:r>
+          </a:p>
+        </p:txBody>
+      </p:sp>
     </p:spTree>
     <p:extLst>
       <p:ext uri="{BB962C8B-B14F-4D97-AF65-F5344CB8AC3E}">
-        <p14:creationId xmlns:p14="http://schemas.microsoft.com/office/powerpoint/2010/main" val="2377605413"/>
+        <p14:creationId xmlns:p14="http://schemas.microsoft.com/office/powerpoint/2010/main" val="951745335"/>
       </p:ext>
     </p:extLst>
   </p:cSld>
@@ -10863,6 +11523,14 @@
 <file path=ppt/slides/slide24.xml><?xml version="1.0" encoding="utf-8"?>
 <p:sld xmlns:a="http://schemas.openxmlformats.org/drawingml/2006/main" xmlns:r="http://schemas.openxmlformats.org/officeDocument/2006/relationships" xmlns:p="http://schemas.openxmlformats.org/presentationml/2006/main">
   <p:cSld>
+    <p:bg>
+      <p:bgPr>
+        <a:solidFill>
+          <a:schemeClr val="bg1"/>
+        </a:solidFill>
+        <a:effectLst/>
+      </p:bgPr>
+    </p:bg>
     <p:spTree>
       <p:nvGrpSpPr>
         <p:cNvPr id="1" name=""/>
@@ -10877,48 +11545,172 @@
           <a:chExt cx="0" cy="0"/>
         </a:xfrm>
       </p:grpSpPr>
-      <p:sp>
-        <p:nvSpPr>
-          <p:cNvPr id="2" name="Title 1">
+      <p:sp useBgFill="1">
+        <p:nvSpPr>
+          <p:cNvPr id="8" name="Rectangle 7">
             <a:extLst>
               <a:ext uri="{FF2B5EF4-FFF2-40B4-BE49-F238E27FC236}">
-                <a16:creationId xmlns:a16="http://schemas.microsoft.com/office/drawing/2014/main" id="{CC4A54E6-05F8-4D89-971E-BC053D209B94}"/>
+                <a16:creationId xmlns:a16="http://schemas.microsoft.com/office/drawing/2014/main" id="{3B854194-185D-494D-905C-7C7CB2E30F6E}"/>
+              </a:ext>
+              <a:ext uri="{C183D7F6-B498-43B3-948B-1728B52AA6E4}">
+                <adec:decorative xmlns:adec="http://schemas.microsoft.com/office/drawing/2017/decorative" val="1"/>
               </a:ext>
             </a:extLst>
           </p:cNvPr>
           <p:cNvSpPr>
-            <a:spLocks noGrp="1"/>
-          </p:cNvSpPr>
-          <p:nvPr>
-            <p:ph type="title"/>
-          </p:nvPr>
-        </p:nvSpPr>
-        <p:spPr/>
-        <p:txBody>
-          <a:bodyPr/>
+            <a:spLocks noGrp="1" noRot="1" noChangeAspect="1" noMove="1" noResize="1" noEditPoints="1" noAdjustHandles="1" noChangeArrowheads="1" noChangeShapeType="1" noTextEdit="1"/>
+          </p:cNvSpPr>
+          <p:nvPr>
+            <p:extLst>
+              <p:ext uri="{386F3935-93C4-4BCD-93E2-E3B085C9AB24}">
+                <p16:designElem xmlns:p16="http://schemas.microsoft.com/office/powerpoint/2015/main" val="1"/>
+              </p:ext>
+            </p:extLst>
+          </p:nvPr>
+        </p:nvSpPr>
+        <p:spPr>
+          <a:xfrm>
+            <a:off x="1" y="0"/>
+            <a:ext cx="6082110" cy="6858000"/>
+          </a:xfrm>
+          <a:prstGeom prst="rect">
+            <a:avLst/>
+          </a:prstGeom>
+          <a:ln>
+            <a:noFill/>
+          </a:ln>
+        </p:spPr>
+        <p:style>
+          <a:lnRef idx="2">
+            <a:schemeClr val="accent1">
+              <a:shade val="50000"/>
+            </a:schemeClr>
+          </a:lnRef>
+          <a:fillRef idx="1">
+            <a:schemeClr val="accent1"/>
+          </a:fillRef>
+          <a:effectRef idx="0">
+            <a:schemeClr val="accent1"/>
+          </a:effectRef>
+          <a:fontRef idx="minor">
+            <a:schemeClr val="lt1"/>
+          </a:fontRef>
+        </p:style>
+        <p:txBody>
+          <a:bodyPr rtlCol="0" anchor="ctr"/>
           <a:lstStyle/>
           <a:p>
-            <a:r>
-              <a:rPr lang="en-US" dirty="0"/>
-              <a:t>Github Flow</a:t>
-            </a:r>
+            <a:pPr algn="ctr"/>
+            <a:endParaRPr lang="en-US"/>
+          </a:p>
+        </p:txBody>
+      </p:sp>
+      <p:sp>
+        <p:nvSpPr>
+          <p:cNvPr id="14" name="Rectangle 9">
+            <a:extLst>
+              <a:ext uri="{FF2B5EF4-FFF2-40B4-BE49-F238E27FC236}">
+                <a16:creationId xmlns:a16="http://schemas.microsoft.com/office/drawing/2014/main" id="{B4F5FA0D-0104-4987-8241-EFF7C85B88DE}"/>
+              </a:ext>
+              <a:ext uri="{C183D7F6-B498-43B3-948B-1728B52AA6E4}">
+                <adec:decorative xmlns:adec="http://schemas.microsoft.com/office/drawing/2017/decorative" val="1"/>
+              </a:ext>
+            </a:extLst>
+          </p:cNvPr>
+          <p:cNvSpPr>
+            <a:spLocks noGrp="1" noRot="1" noChangeAspect="1" noMove="1" noResize="1" noEditPoints="1" noAdjustHandles="1" noChangeArrowheads="1" noChangeShapeType="1" noTextEdit="1"/>
+          </p:cNvSpPr>
+          <p:nvPr>
+            <p:extLst>
+              <p:ext uri="{386F3935-93C4-4BCD-93E2-E3B085C9AB24}">
+                <p16:designElem xmlns:p16="http://schemas.microsoft.com/office/powerpoint/2015/main" val="1"/>
+              </p:ext>
+            </p:extLst>
+          </p:nvPr>
+        </p:nvSpPr>
+        <p:spPr>
+          <a:xfrm>
+            <a:off x="1" y="0"/>
+            <a:ext cx="12191998" cy="6858000"/>
+          </a:xfrm>
+          <a:prstGeom prst="rect">
+            <a:avLst/>
+          </a:prstGeom>
+          <a:gradFill>
+            <a:gsLst>
+              <a:gs pos="0">
+                <a:schemeClr val="accent1">
+                  <a:lumMod val="90000"/>
+                </a:schemeClr>
+              </a:gs>
+              <a:gs pos="25000">
+                <a:schemeClr val="accent1">
+                  <a:lumMod val="90000"/>
+                </a:schemeClr>
+              </a:gs>
+              <a:gs pos="94000">
+                <a:schemeClr val="bg2">
+                  <a:lumMod val="25000"/>
+                </a:schemeClr>
+              </a:gs>
+              <a:gs pos="100000">
+                <a:schemeClr val="bg2">
+                  <a:lumMod val="25000"/>
+                </a:schemeClr>
+              </a:gs>
+            </a:gsLst>
+            <a:lin ang="4200000" scaled="0"/>
+          </a:gradFill>
+          <a:ln>
+            <a:noFill/>
+          </a:ln>
+        </p:spPr>
+        <p:style>
+          <a:lnRef idx="2">
+            <a:schemeClr val="accent1">
+              <a:shade val="50000"/>
+            </a:schemeClr>
+          </a:lnRef>
+          <a:fillRef idx="1">
+            <a:schemeClr val="accent1"/>
+          </a:fillRef>
+          <a:effectRef idx="0">
+            <a:schemeClr val="accent1"/>
+          </a:effectRef>
+          <a:fontRef idx="minor">
+            <a:schemeClr val="lt1"/>
+          </a:fontRef>
+        </p:style>
+        <p:txBody>
+          <a:bodyPr rtlCol="0" anchor="ctr"/>
+          <a:lstStyle/>
+          <a:p>
+            <a:pPr algn="ctr"/>
+            <a:endParaRPr lang="en-US"/>
           </a:p>
         </p:txBody>
       </p:sp>
       <p:pic>
         <p:nvPicPr>
-          <p:cNvPr id="5" name="Content Placeholder 4">
+          <p:cNvPr id="15" name="Picture 11">
             <a:extLst>
               <a:ext uri="{FF2B5EF4-FFF2-40B4-BE49-F238E27FC236}">
-                <a16:creationId xmlns:a16="http://schemas.microsoft.com/office/drawing/2014/main" id="{7A2BCEFD-3342-43C1-B40B-42DE90C5E3F6}"/>
+                <a16:creationId xmlns:a16="http://schemas.microsoft.com/office/drawing/2014/main" id="{2897127E-6CEF-446C-BE87-93B7C46E49D1}"/>
+              </a:ext>
+              <a:ext uri="{C183D7F6-B498-43B3-948B-1728B52AA6E4}">
+                <adec:decorative xmlns:adec="http://schemas.microsoft.com/office/drawing/2017/decorative" val="1"/>
               </a:ext>
             </a:extLst>
           </p:cNvPr>
           <p:cNvPicPr>
-            <a:picLocks noGrp="1" noChangeAspect="1"/>
+            <a:picLocks noGrp="1" noRot="1" noChangeAspect="1" noMove="1" noResize="1" noEditPoints="1" noAdjustHandles="1" noChangeArrowheads="1" noChangeShapeType="1" noCrop="1"/>
           </p:cNvPicPr>
           <p:nvPr>
-            <p:ph idx="1"/>
+            <p:extLst>
+              <p:ext uri="{386F3935-93C4-4BCD-93E2-E3B085C9AB24}">
+                <p16:designElem xmlns:p16="http://schemas.microsoft.com/office/powerpoint/2015/main" val="1"/>
+              </p:ext>
+            </p:extLst>
           </p:nvPr>
         </p:nvPicPr>
         <p:blipFill>
@@ -10935,15 +11727,191 @@
         </p:blipFill>
         <p:spPr>
           <a:xfrm>
-            <a:off x="838200" y="2678073"/>
-            <a:ext cx="10515600" cy="2646442"/>
-          </a:xfrm>
+            <a:off x="0" y="0"/>
+            <a:ext cx="12192000" cy="6858000"/>
+          </a:xfrm>
+          <a:prstGeom prst="rect">
+            <a:avLst/>
+          </a:prstGeom>
         </p:spPr>
       </p:pic>
+      <p:sp>
+        <p:nvSpPr>
+          <p:cNvPr id="2" name="Title 1">
+            <a:extLst>
+              <a:ext uri="{FF2B5EF4-FFF2-40B4-BE49-F238E27FC236}">
+                <a16:creationId xmlns:a16="http://schemas.microsoft.com/office/drawing/2014/main" id="{9F5EE912-1E0A-470C-AB7B-2F2CCC87BB2A}"/>
+              </a:ext>
+            </a:extLst>
+          </p:cNvPr>
+          <p:cNvSpPr>
+            <a:spLocks noGrp="1"/>
+          </p:cNvSpPr>
+          <p:nvPr>
+            <p:ph type="title"/>
+          </p:nvPr>
+        </p:nvSpPr>
+        <p:spPr>
+          <a:xfrm>
+            <a:off x="640079" y="2053641"/>
+            <a:ext cx="3669161" cy="2760098"/>
+          </a:xfrm>
+        </p:spPr>
+        <p:txBody>
+          <a:bodyPr>
+            <a:normAutofit/>
+          </a:bodyPr>
+          <a:lstStyle/>
+          <a:p>
+            <a:r>
+              <a:rPr lang="en-US">
+                <a:solidFill>
+                  <a:srgbClr val="FFFFFF"/>
+                </a:solidFill>
+              </a:rPr>
+              <a:t>Github</a:t>
+            </a:r>
+          </a:p>
+        </p:txBody>
+      </p:sp>
+      <p:sp>
+        <p:nvSpPr>
+          <p:cNvPr id="3" name="Content Placeholder 2">
+            <a:extLst>
+              <a:ext uri="{FF2B5EF4-FFF2-40B4-BE49-F238E27FC236}">
+                <a16:creationId xmlns:a16="http://schemas.microsoft.com/office/drawing/2014/main" id="{64252670-4F73-4792-B175-6F43FDE66830}"/>
+              </a:ext>
+            </a:extLst>
+          </p:cNvPr>
+          <p:cNvSpPr>
+            <a:spLocks noGrp="1"/>
+          </p:cNvSpPr>
+          <p:nvPr>
+            <p:ph idx="1"/>
+          </p:nvPr>
+        </p:nvSpPr>
+        <p:spPr>
+          <a:xfrm>
+            <a:off x="6090574" y="801866"/>
+            <a:ext cx="5306084" cy="5230634"/>
+          </a:xfrm>
+        </p:spPr>
+        <p:txBody>
+          <a:bodyPr anchor="ctr">
+            <a:normAutofit/>
+          </a:bodyPr>
+          <a:lstStyle/>
+          <a:p>
+            <a:r>
+              <a:rPr lang="en-US" sz="2000">
+                <a:solidFill>
+                  <a:srgbClr val="000000"/>
+                </a:solidFill>
+              </a:rPr>
+              <a:t>Most widely used hosting platform</a:t>
+            </a:r>
+          </a:p>
+          <a:p>
+            <a:r>
+              <a:rPr lang="en-US" sz="2000">
+                <a:solidFill>
+                  <a:srgbClr val="000000"/>
+                </a:solidFill>
+              </a:rPr>
+              <a:t>Unlimited public repositories</a:t>
+            </a:r>
+          </a:p>
+          <a:p>
+            <a:r>
+              <a:rPr lang="en-US" sz="2000">
+                <a:solidFill>
+                  <a:srgbClr val="000000"/>
+                </a:solidFill>
+              </a:rPr>
+              <a:t>$7/month personal account with unlimited private repositories</a:t>
+            </a:r>
+          </a:p>
+          <a:p>
+            <a:r>
+              <a:rPr lang="en-US" sz="2000">
+                <a:solidFill>
+                  <a:srgbClr val="000000"/>
+                </a:solidFill>
+              </a:rPr>
+              <a:t>Enterprise plans allow on-premises hosted solutions.</a:t>
+            </a:r>
+          </a:p>
+          <a:p>
+            <a:r>
+              <a:rPr lang="en-US" sz="2000">
+                <a:solidFill>
+                  <a:srgbClr val="000000"/>
+                </a:solidFill>
+              </a:rPr>
+              <a:t>Learning Curve: Experience with Git helps make this easy-ish</a:t>
+            </a:r>
+          </a:p>
+          <a:p>
+            <a:endParaRPr lang="en-US" sz="2000">
+              <a:solidFill>
+                <a:srgbClr val="000000"/>
+              </a:solidFill>
+            </a:endParaRPr>
+          </a:p>
+          <a:p>
+            <a:r>
+              <a:rPr lang="en-US" sz="2000" b="1">
+                <a:solidFill>
+                  <a:srgbClr val="000000"/>
+                </a:solidFill>
+              </a:rPr>
+              <a:t>EVERY DEVELOPER SHOULD HAVE A GITHUB PROFILE</a:t>
+            </a:r>
+            <a:endParaRPr lang="en-US" sz="2000">
+              <a:solidFill>
+                <a:srgbClr val="000000"/>
+              </a:solidFill>
+            </a:endParaRPr>
+          </a:p>
+          <a:p>
+            <a:pPr lvl="1"/>
+            <a:r>
+              <a:rPr lang="en-US" sz="2000">
+                <a:solidFill>
+                  <a:srgbClr val="000000"/>
+                </a:solidFill>
+              </a:rPr>
+              <a:t>Host code you’re proud of</a:t>
+            </a:r>
+          </a:p>
+          <a:p>
+            <a:pPr lvl="1"/>
+            <a:r>
+              <a:rPr lang="en-US" sz="2000">
+                <a:solidFill>
+                  <a:srgbClr val="000000"/>
+                </a:solidFill>
+              </a:rPr>
+              <a:t>Fork someone else’s code and make a change</a:t>
+            </a:r>
+          </a:p>
+          <a:p>
+            <a:pPr lvl="1"/>
+            <a:r>
+              <a:rPr lang="en-US" sz="2000">
+                <a:solidFill>
+                  <a:srgbClr val="000000"/>
+                </a:solidFill>
+              </a:rPr>
+              <a:t>It’s as good as or better than a resume!</a:t>
+            </a:r>
+          </a:p>
+        </p:txBody>
+      </p:sp>
     </p:spTree>
     <p:extLst>
       <p:ext uri="{BB962C8B-B14F-4D97-AF65-F5344CB8AC3E}">
-        <p14:creationId xmlns:p14="http://schemas.microsoft.com/office/powerpoint/2010/main" val="3213113248"/>
+        <p14:creationId xmlns:p14="http://schemas.microsoft.com/office/powerpoint/2010/main" val="3303160553"/>
       </p:ext>
     </p:extLst>
   </p:cSld>
@@ -10956,6 +11924,14 @@
 <file path=ppt/slides/slide25.xml><?xml version="1.0" encoding="utf-8"?>
 <p:sld xmlns:a="http://schemas.openxmlformats.org/drawingml/2006/main" xmlns:r="http://schemas.openxmlformats.org/officeDocument/2006/relationships" xmlns:p="http://schemas.openxmlformats.org/presentationml/2006/main">
   <p:cSld>
+    <p:bg>
+      <p:bgPr>
+        <a:solidFill>
+          <a:schemeClr val="bg1"/>
+        </a:solidFill>
+        <a:effectLst/>
+      </p:bgPr>
+    </p:bg>
     <p:spTree>
       <p:nvGrpSpPr>
         <p:cNvPr id="1" name=""/>
@@ -10970,12 +11946,202 @@
           <a:chExt cx="0" cy="0"/>
         </a:xfrm>
       </p:grpSpPr>
+      <p:sp useBgFill="1">
+        <p:nvSpPr>
+          <p:cNvPr id="8" name="Rectangle 7">
+            <a:extLst>
+              <a:ext uri="{FF2B5EF4-FFF2-40B4-BE49-F238E27FC236}">
+                <a16:creationId xmlns:a16="http://schemas.microsoft.com/office/drawing/2014/main" id="{3B854194-185D-494D-905C-7C7CB2E30F6E}"/>
+              </a:ext>
+              <a:ext uri="{C183D7F6-B498-43B3-948B-1728B52AA6E4}">
+                <adec:decorative xmlns:adec="http://schemas.microsoft.com/office/drawing/2017/decorative" val="1"/>
+              </a:ext>
+            </a:extLst>
+          </p:cNvPr>
+          <p:cNvSpPr>
+            <a:spLocks noGrp="1" noRot="1" noChangeAspect="1" noMove="1" noResize="1" noEditPoints="1" noAdjustHandles="1" noChangeArrowheads="1" noChangeShapeType="1" noTextEdit="1"/>
+          </p:cNvSpPr>
+          <p:nvPr>
+            <p:extLst>
+              <p:ext uri="{386F3935-93C4-4BCD-93E2-E3B085C9AB24}">
+                <p16:designElem xmlns:p16="http://schemas.microsoft.com/office/powerpoint/2015/main" val="1"/>
+              </p:ext>
+            </p:extLst>
+          </p:nvPr>
+        </p:nvSpPr>
+        <p:spPr>
+          <a:xfrm>
+            <a:off x="1" y="0"/>
+            <a:ext cx="6082110" cy="6858000"/>
+          </a:xfrm>
+          <a:prstGeom prst="rect">
+            <a:avLst/>
+          </a:prstGeom>
+          <a:ln>
+            <a:noFill/>
+          </a:ln>
+        </p:spPr>
+        <p:style>
+          <a:lnRef idx="2">
+            <a:schemeClr val="accent1">
+              <a:shade val="50000"/>
+            </a:schemeClr>
+          </a:lnRef>
+          <a:fillRef idx="1">
+            <a:schemeClr val="accent1"/>
+          </a:fillRef>
+          <a:effectRef idx="0">
+            <a:schemeClr val="accent1"/>
+          </a:effectRef>
+          <a:fontRef idx="minor">
+            <a:schemeClr val="lt1"/>
+          </a:fontRef>
+        </p:style>
+        <p:txBody>
+          <a:bodyPr rtlCol="0" anchor="ctr"/>
+          <a:lstStyle/>
+          <a:p>
+            <a:pPr algn="ctr"/>
+            <a:endParaRPr lang="en-US"/>
+          </a:p>
+        </p:txBody>
+      </p:sp>
+      <p:sp>
+        <p:nvSpPr>
+          <p:cNvPr id="10" name="Rectangle 9">
+            <a:extLst>
+              <a:ext uri="{FF2B5EF4-FFF2-40B4-BE49-F238E27FC236}">
+                <a16:creationId xmlns:a16="http://schemas.microsoft.com/office/drawing/2014/main" id="{B4F5FA0D-0104-4987-8241-EFF7C85B88DE}"/>
+              </a:ext>
+              <a:ext uri="{C183D7F6-B498-43B3-948B-1728B52AA6E4}">
+                <adec:decorative xmlns:adec="http://schemas.microsoft.com/office/drawing/2017/decorative" val="1"/>
+              </a:ext>
+            </a:extLst>
+          </p:cNvPr>
+          <p:cNvSpPr>
+            <a:spLocks noGrp="1" noRot="1" noChangeAspect="1" noMove="1" noResize="1" noEditPoints="1" noAdjustHandles="1" noChangeArrowheads="1" noChangeShapeType="1" noTextEdit="1"/>
+          </p:cNvSpPr>
+          <p:nvPr>
+            <p:extLst>
+              <p:ext uri="{386F3935-93C4-4BCD-93E2-E3B085C9AB24}">
+                <p16:designElem xmlns:p16="http://schemas.microsoft.com/office/powerpoint/2015/main" val="1"/>
+              </p:ext>
+            </p:extLst>
+          </p:nvPr>
+        </p:nvSpPr>
+        <p:spPr>
+          <a:xfrm>
+            <a:off x="1" y="0"/>
+            <a:ext cx="12191998" cy="6858000"/>
+          </a:xfrm>
+          <a:prstGeom prst="rect">
+            <a:avLst/>
+          </a:prstGeom>
+          <a:gradFill>
+            <a:gsLst>
+              <a:gs pos="0">
+                <a:schemeClr val="accent1">
+                  <a:lumMod val="90000"/>
+                </a:schemeClr>
+              </a:gs>
+              <a:gs pos="25000">
+                <a:schemeClr val="accent1">
+                  <a:lumMod val="90000"/>
+                </a:schemeClr>
+              </a:gs>
+              <a:gs pos="94000">
+                <a:schemeClr val="bg2">
+                  <a:lumMod val="25000"/>
+                </a:schemeClr>
+              </a:gs>
+              <a:gs pos="100000">
+                <a:schemeClr val="bg2">
+                  <a:lumMod val="25000"/>
+                </a:schemeClr>
+              </a:gs>
+            </a:gsLst>
+            <a:lin ang="4200000" scaled="0"/>
+          </a:gradFill>
+          <a:ln>
+            <a:noFill/>
+          </a:ln>
+        </p:spPr>
+        <p:style>
+          <a:lnRef idx="2">
+            <a:schemeClr val="accent1">
+              <a:shade val="50000"/>
+            </a:schemeClr>
+          </a:lnRef>
+          <a:fillRef idx="1">
+            <a:schemeClr val="accent1"/>
+          </a:fillRef>
+          <a:effectRef idx="0">
+            <a:schemeClr val="accent1"/>
+          </a:effectRef>
+          <a:fontRef idx="minor">
+            <a:schemeClr val="lt1"/>
+          </a:fontRef>
+        </p:style>
+        <p:txBody>
+          <a:bodyPr rtlCol="0" anchor="ctr"/>
+          <a:lstStyle/>
+          <a:p>
+            <a:pPr algn="ctr"/>
+            <a:endParaRPr lang="en-US"/>
+          </a:p>
+        </p:txBody>
+      </p:sp>
+      <p:pic>
+        <p:nvPicPr>
+          <p:cNvPr id="12" name="Picture 11">
+            <a:extLst>
+              <a:ext uri="{FF2B5EF4-FFF2-40B4-BE49-F238E27FC236}">
+                <a16:creationId xmlns:a16="http://schemas.microsoft.com/office/drawing/2014/main" id="{2897127E-6CEF-446C-BE87-93B7C46E49D1}"/>
+              </a:ext>
+              <a:ext uri="{C183D7F6-B498-43B3-948B-1728B52AA6E4}">
+                <adec:decorative xmlns:adec="http://schemas.microsoft.com/office/drawing/2017/decorative" val="1"/>
+              </a:ext>
+            </a:extLst>
+          </p:cNvPr>
+          <p:cNvPicPr>
+            <a:picLocks noGrp="1" noRot="1" noChangeAspect="1" noMove="1" noResize="1" noEditPoints="1" noAdjustHandles="1" noChangeArrowheads="1" noChangeShapeType="1" noCrop="1"/>
+          </p:cNvPicPr>
+          <p:nvPr>
+            <p:extLst>
+              <p:ext uri="{386F3935-93C4-4BCD-93E2-E3B085C9AB24}">
+                <p16:designElem xmlns:p16="http://schemas.microsoft.com/office/powerpoint/2015/main" val="1"/>
+              </p:ext>
+            </p:extLst>
+          </p:nvPr>
+        </p:nvPicPr>
+        <p:blipFill>
+          <a:blip r:embed="rId2">
+            <a:extLst>
+              <a:ext uri="{28A0092B-C50C-407E-A947-70E740481C1C}">
+                <a14:useLocalDpi xmlns:a14="http://schemas.microsoft.com/office/drawing/2010/main" val="0"/>
+              </a:ext>
+            </a:extLst>
+          </a:blip>
+          <a:stretch>
+            <a:fillRect/>
+          </a:stretch>
+        </p:blipFill>
+        <p:spPr>
+          <a:xfrm>
+            <a:off x="0" y="0"/>
+            <a:ext cx="12192000" cy="6858000"/>
+          </a:xfrm>
+          <a:prstGeom prst="rect">
+            <a:avLst/>
+          </a:prstGeom>
+        </p:spPr>
+      </p:pic>
       <p:sp>
         <p:nvSpPr>
           <p:cNvPr id="2" name="Title 1">
             <a:extLst>
               <a:ext uri="{FF2B5EF4-FFF2-40B4-BE49-F238E27FC236}">
-                <a16:creationId xmlns:a16="http://schemas.microsoft.com/office/drawing/2014/main" id="{F220168B-851B-448D-B065-1390D2D73C20}"/>
+                <a16:creationId xmlns:a16="http://schemas.microsoft.com/office/drawing/2014/main" id="{4EAC3CEE-55B5-498F-B337-F6698845AD6D}"/>
               </a:ext>
             </a:extLst>
           </p:cNvPr>
@@ -10986,24 +12152,35 @@
             <p:ph type="title"/>
           </p:nvPr>
         </p:nvSpPr>
-        <p:spPr/>
-        <p:txBody>
-          <a:bodyPr/>
+        <p:spPr>
+          <a:xfrm>
+            <a:off x="640079" y="2053641"/>
+            <a:ext cx="3669161" cy="2760098"/>
+          </a:xfrm>
+        </p:spPr>
+        <p:txBody>
+          <a:bodyPr>
+            <a:normAutofit/>
+          </a:bodyPr>
           <a:lstStyle/>
           <a:p>
             <a:r>
-              <a:rPr lang="en-US" dirty="0"/>
-              <a:t>Common UI Tools</a:t>
-            </a:r>
-          </a:p>
-        </p:txBody>
-      </p:sp>
-      <p:sp>
-        <p:nvSpPr>
-          <p:cNvPr id="3" name="Text Placeholder 2">
+              <a:rPr lang="en-US">
+                <a:solidFill>
+                  <a:srgbClr val="FFFFFF"/>
+                </a:solidFill>
+              </a:rPr>
+              <a:t>BitBucket</a:t>
+            </a:r>
+          </a:p>
+        </p:txBody>
+      </p:sp>
+      <p:sp>
+        <p:nvSpPr>
+          <p:cNvPr id="3" name="Content Placeholder 2">
             <a:extLst>
               <a:ext uri="{FF2B5EF4-FFF2-40B4-BE49-F238E27FC236}">
-                <a16:creationId xmlns:a16="http://schemas.microsoft.com/office/drawing/2014/main" id="{1471B88D-28C1-4B4E-A5A7-4BC5DECCA821}"/>
+                <a16:creationId xmlns:a16="http://schemas.microsoft.com/office/drawing/2014/main" id="{A230217E-4487-403E-9114-3429E27BD4A2}"/>
               </a:ext>
             </a:extLst>
           </p:cNvPr>
@@ -11011,22 +12188,73 @@
             <a:spLocks noGrp="1"/>
           </p:cNvSpPr>
           <p:nvPr>
-            <p:ph type="body" idx="1"/>
-          </p:nvPr>
-        </p:nvSpPr>
-        <p:spPr/>
-        <p:txBody>
-          <a:bodyPr/>
+            <p:ph idx="1"/>
+          </p:nvPr>
+        </p:nvSpPr>
+        <p:spPr>
+          <a:xfrm>
+            <a:off x="6090574" y="801866"/>
+            <a:ext cx="5306084" cy="5230634"/>
+          </a:xfrm>
+        </p:spPr>
+        <p:txBody>
+          <a:bodyPr anchor="ctr">
+            <a:normAutofit/>
+          </a:bodyPr>
           <a:lstStyle/>
           <a:p>
-            <a:endParaRPr lang="en-US"/>
+            <a:r>
+              <a:rPr lang="en-US" sz="2400">
+                <a:solidFill>
+                  <a:srgbClr val="000000"/>
+                </a:solidFill>
+              </a:rPr>
+              <a:t>Free up to 5 users</a:t>
+            </a:r>
+          </a:p>
+          <a:p>
+            <a:r>
+              <a:rPr lang="en-US" sz="2400">
+                <a:solidFill>
+                  <a:srgbClr val="000000"/>
+                </a:solidFill>
+              </a:rPr>
+              <a:t>Unlimited public repositories</a:t>
+            </a:r>
+          </a:p>
+          <a:p>
+            <a:r>
+              <a:rPr lang="en-US" sz="2400">
+                <a:solidFill>
+                  <a:srgbClr val="000000"/>
+                </a:solidFill>
+              </a:rPr>
+              <a:t>Unlimited private repositories</a:t>
+            </a:r>
+          </a:p>
+          <a:p>
+            <a:r>
+              <a:rPr lang="en-US" sz="2400">
+                <a:solidFill>
+                  <a:srgbClr val="000000"/>
+                </a:solidFill>
+              </a:rPr>
+              <a:t>Pricing beyond 5 users is roughly $1/month/user</a:t>
+            </a:r>
+          </a:p>
+          <a:p>
+            <a:endParaRPr lang="en-US" sz="2400">
+              <a:solidFill>
+                <a:srgbClr val="000000"/>
+              </a:solidFill>
+            </a:endParaRPr>
           </a:p>
         </p:txBody>
       </p:sp>
     </p:spTree>
     <p:extLst>
       <p:ext uri="{BB962C8B-B14F-4D97-AF65-F5344CB8AC3E}">
-        <p14:creationId xmlns:p14="http://schemas.microsoft.com/office/powerpoint/2010/main" val="384892571"/>
+        <p14:creationId xmlns:p14="http://schemas.microsoft.com/office/powerpoint/2010/main" val="2402215412"/>
       </p:ext>
     </p:extLst>
   </p:cSld>
@@ -11039,6 +12267,14 @@
 <file path=ppt/slides/slide26.xml><?xml version="1.0" encoding="utf-8"?>
 <p:sld xmlns:a="http://schemas.openxmlformats.org/drawingml/2006/main" xmlns:r="http://schemas.openxmlformats.org/officeDocument/2006/relationships" xmlns:p="http://schemas.openxmlformats.org/presentationml/2006/main">
   <p:cSld>
+    <p:bg>
+      <p:bgPr>
+        <a:solidFill>
+          <a:schemeClr val="bg1"/>
+        </a:solidFill>
+        <a:effectLst/>
+      </p:bgPr>
+    </p:bg>
     <p:spTree>
       <p:nvGrpSpPr>
         <p:cNvPr id="1" name=""/>
@@ -11055,68 +12291,253 @@
       </p:grpSpPr>
       <p:sp>
         <p:nvSpPr>
-          <p:cNvPr id="2" name="Title 1">
+          <p:cNvPr id="8" name="Rectangle 7">
             <a:extLst>
               <a:ext uri="{FF2B5EF4-FFF2-40B4-BE49-F238E27FC236}">
-                <a16:creationId xmlns:a16="http://schemas.microsoft.com/office/drawing/2014/main" id="{58877F43-7F96-4A05-9192-F72D5998C0FD}"/>
+                <a16:creationId xmlns:a16="http://schemas.microsoft.com/office/drawing/2014/main" id="{B4F5FA0D-0104-4987-8241-EFF7C85B88DE}"/>
+              </a:ext>
+              <a:ext uri="{C183D7F6-B498-43B3-948B-1728B52AA6E4}">
+                <adec:decorative xmlns:adec="http://schemas.microsoft.com/office/drawing/2017/decorative" val="1"/>
               </a:ext>
             </a:extLst>
           </p:cNvPr>
           <p:cNvSpPr>
-            <a:spLocks noGrp="1"/>
-          </p:cNvSpPr>
-          <p:nvPr>
-            <p:ph type="title"/>
-          </p:nvPr>
-        </p:nvSpPr>
-        <p:spPr/>
-        <p:txBody>
-          <a:bodyPr/>
+            <a:spLocks noGrp="1" noRot="1" noChangeAspect="1" noMove="1" noResize="1" noEditPoints="1" noAdjustHandles="1" noChangeArrowheads="1" noChangeShapeType="1" noTextEdit="1"/>
+          </p:cNvSpPr>
+          <p:nvPr>
+            <p:extLst>
+              <p:ext uri="{386F3935-93C4-4BCD-93E2-E3B085C9AB24}">
+                <p16:designElem xmlns:p16="http://schemas.microsoft.com/office/powerpoint/2015/main" val="1"/>
+              </p:ext>
+            </p:extLst>
+          </p:nvPr>
+        </p:nvSpPr>
+        <p:spPr>
+          <a:xfrm>
+            <a:off x="1" y="0"/>
+            <a:ext cx="6090572" cy="6858000"/>
+          </a:xfrm>
+          <a:prstGeom prst="rect">
+            <a:avLst/>
+          </a:prstGeom>
+          <a:gradFill>
+            <a:gsLst>
+              <a:gs pos="0">
+                <a:srgbClr val="E3411B">
+                  <a:lumMod val="90000"/>
+                </a:srgbClr>
+              </a:gs>
+              <a:gs pos="25000">
+                <a:srgbClr val="E3411B">
+                  <a:lumMod val="90000"/>
+                </a:srgbClr>
+              </a:gs>
+              <a:gs pos="94000">
+                <a:schemeClr val="bg2">
+                  <a:lumMod val="25000"/>
+                </a:schemeClr>
+              </a:gs>
+              <a:gs pos="100000">
+                <a:schemeClr val="bg2">
+                  <a:lumMod val="25000"/>
+                </a:schemeClr>
+              </a:gs>
+            </a:gsLst>
+            <a:lin ang="4200000" scaled="0"/>
+          </a:gradFill>
+          <a:ln>
+            <a:noFill/>
+          </a:ln>
+        </p:spPr>
+        <p:style>
+          <a:lnRef idx="2">
+            <a:schemeClr val="accent1">
+              <a:shade val="50000"/>
+            </a:schemeClr>
+          </a:lnRef>
+          <a:fillRef idx="1">
+            <a:schemeClr val="accent1"/>
+          </a:fillRef>
+          <a:effectRef idx="0">
+            <a:schemeClr val="accent1"/>
+          </a:effectRef>
+          <a:fontRef idx="minor">
+            <a:schemeClr val="lt1"/>
+          </a:fontRef>
+        </p:style>
+        <p:txBody>
+          <a:bodyPr rtlCol="0" anchor="ctr"/>
           <a:lstStyle/>
           <a:p>
-            <a:r>
-              <a:rPr lang="en-US" dirty="0"/>
-              <a:t>The Command Line</a:t>
-            </a:r>
+            <a:pPr algn="ctr"/>
+            <a:endParaRPr lang="en-US"/>
           </a:p>
         </p:txBody>
       </p:sp>
       <p:pic>
         <p:nvPicPr>
-          <p:cNvPr id="4" name="Content Placeholder 3">
+          <p:cNvPr id="10" name="Picture 9">
             <a:extLst>
               <a:ext uri="{FF2B5EF4-FFF2-40B4-BE49-F238E27FC236}">
-                <a16:creationId xmlns:a16="http://schemas.microsoft.com/office/drawing/2014/main" id="{58CD5727-155C-4842-B31F-01A46BD28679}"/>
+                <a16:creationId xmlns:a16="http://schemas.microsoft.com/office/drawing/2014/main" id="{2897127E-6CEF-446C-BE87-93B7C46E49D1}"/>
+              </a:ext>
+              <a:ext uri="{C183D7F6-B498-43B3-948B-1728B52AA6E4}">
+                <adec:decorative xmlns:adec="http://schemas.microsoft.com/office/drawing/2017/decorative" val="1"/>
               </a:ext>
             </a:extLst>
           </p:cNvPr>
           <p:cNvPicPr>
-            <a:picLocks noGrp="1" noChangeAspect="1"/>
+            <a:picLocks noGrp="1" noRot="1" noChangeAspect="1" noMove="1" noResize="1" noEditPoints="1" noAdjustHandles="1" noChangeArrowheads="1" noChangeShapeType="1" noCrop="1"/>
           </p:cNvPicPr>
           <p:nvPr>
-            <p:ph idx="1"/>
+            <p:extLst>
+              <p:ext uri="{386F3935-93C4-4BCD-93E2-E3B085C9AB24}">
+                <p16:designElem xmlns:p16="http://schemas.microsoft.com/office/powerpoint/2015/main" val="1"/>
+              </p:ext>
+            </p:extLst>
           </p:nvPr>
         </p:nvPicPr>
         <p:blipFill>
-          <a:blip r:embed="rId2"/>
+          <a:blip r:embed="rId2">
+            <a:extLst>
+              <a:ext uri="{28A0092B-C50C-407E-A947-70E740481C1C}">
+                <a14:useLocalDpi xmlns:a14="http://schemas.microsoft.com/office/drawing/2010/main" val="0"/>
+              </a:ext>
+            </a:extLst>
+          </a:blip>
           <a:stretch>
             <a:fillRect/>
           </a:stretch>
         </p:blipFill>
         <p:spPr>
           <a:xfrm>
-            <a:off x="2032713" y="1881069"/>
-            <a:ext cx="8126574" cy="4240449"/>
+            <a:off x="0" y="0"/>
+            <a:ext cx="12192000" cy="6858000"/>
           </a:xfrm>
           <a:prstGeom prst="rect">
             <a:avLst/>
           </a:prstGeom>
         </p:spPr>
       </p:pic>
+      <p:sp>
+        <p:nvSpPr>
+          <p:cNvPr id="2" name="Title 1">
+            <a:extLst>
+              <a:ext uri="{FF2B5EF4-FFF2-40B4-BE49-F238E27FC236}">
+                <a16:creationId xmlns:a16="http://schemas.microsoft.com/office/drawing/2014/main" id="{6174851A-8287-468C-9577-53577DE4E1C5}"/>
+              </a:ext>
+            </a:extLst>
+          </p:cNvPr>
+          <p:cNvSpPr>
+            <a:spLocks noGrp="1"/>
+          </p:cNvSpPr>
+          <p:nvPr>
+            <p:ph type="title"/>
+          </p:nvPr>
+        </p:nvSpPr>
+        <p:spPr>
+          <a:xfrm>
+            <a:off x="640079" y="2053641"/>
+            <a:ext cx="3669161" cy="2760098"/>
+          </a:xfrm>
+        </p:spPr>
+        <p:txBody>
+          <a:bodyPr>
+            <a:normAutofit/>
+          </a:bodyPr>
+          <a:lstStyle/>
+          <a:p>
+            <a:r>
+              <a:rPr lang="en-US">
+                <a:solidFill>
+                  <a:srgbClr val="FFFFFF"/>
+                </a:solidFill>
+              </a:rPr>
+              <a:t>Host roundup</a:t>
+            </a:r>
+          </a:p>
+        </p:txBody>
+      </p:sp>
+      <p:sp>
+        <p:nvSpPr>
+          <p:cNvPr id="3" name="Content Placeholder 2">
+            <a:extLst>
+              <a:ext uri="{FF2B5EF4-FFF2-40B4-BE49-F238E27FC236}">
+                <a16:creationId xmlns:a16="http://schemas.microsoft.com/office/drawing/2014/main" id="{A031299B-ADFE-4523-8946-52288916B63F}"/>
+              </a:ext>
+            </a:extLst>
+          </p:cNvPr>
+          <p:cNvSpPr>
+            <a:spLocks noGrp="1"/>
+          </p:cNvSpPr>
+          <p:nvPr>
+            <p:ph idx="1"/>
+          </p:nvPr>
+        </p:nvSpPr>
+        <p:spPr>
+          <a:xfrm>
+            <a:off x="6090574" y="801866"/>
+            <a:ext cx="5306084" cy="5230634"/>
+          </a:xfrm>
+        </p:spPr>
+        <p:txBody>
+          <a:bodyPr anchor="ctr">
+            <a:normAutofit/>
+          </a:bodyPr>
+          <a:lstStyle/>
+          <a:p>
+            <a:r>
+              <a:rPr lang="en-US" sz="2400">
+                <a:solidFill>
+                  <a:srgbClr val="000000"/>
+                </a:solidFill>
+              </a:rPr>
+              <a:t>Choose Github for your open-source, publicly-viewable projects</a:t>
+            </a:r>
+          </a:p>
+          <a:p>
+            <a:r>
+              <a:rPr lang="en-US" sz="2400">
+                <a:solidFill>
+                  <a:srgbClr val="000000"/>
+                </a:solidFill>
+              </a:rPr>
+              <a:t>Choose Azure Devops for company projects, or for running the CI/CD builds on your GitHub repo (Yes, you can do BOTH!)</a:t>
+            </a:r>
+          </a:p>
+          <a:p>
+            <a:r>
+              <a:rPr lang="en-US" sz="2400">
+                <a:solidFill>
+                  <a:srgbClr val="000000"/>
+                </a:solidFill>
+              </a:rPr>
+              <a:t>BitBucket offers a nice alternative to Github, but is not as well known. Mileage may vary.</a:t>
+            </a:r>
+          </a:p>
+          <a:p>
+            <a:endParaRPr lang="en-US" sz="2400">
+              <a:solidFill>
+                <a:srgbClr val="000000"/>
+              </a:solidFill>
+            </a:endParaRPr>
+          </a:p>
+          <a:p>
+            <a:r>
+              <a:rPr lang="en-US" sz="2400">
+                <a:solidFill>
+                  <a:srgbClr val="000000"/>
+                </a:solidFill>
+              </a:rPr>
+              <a:t>AWS is offering some interesting new options</a:t>
+            </a:r>
+          </a:p>
+        </p:txBody>
+      </p:sp>
     </p:spTree>
     <p:extLst>
       <p:ext uri="{BB962C8B-B14F-4D97-AF65-F5344CB8AC3E}">
-        <p14:creationId xmlns:p14="http://schemas.microsoft.com/office/powerpoint/2010/main" val="1978598311"/>
+        <p14:creationId xmlns:p14="http://schemas.microsoft.com/office/powerpoint/2010/main" val="2372600824"/>
       </p:ext>
     </p:extLst>
   </p:cSld>
@@ -11148,7 +12569,7 @@
           <p:cNvPr id="2" name="Title 1">
             <a:extLst>
               <a:ext uri="{FF2B5EF4-FFF2-40B4-BE49-F238E27FC236}">
-                <a16:creationId xmlns:a16="http://schemas.microsoft.com/office/drawing/2014/main" id="{6F065B9B-DF9F-4EE1-A34B-B214540B13E1}"/>
+                <a16:creationId xmlns:a16="http://schemas.microsoft.com/office/drawing/2014/main" id="{009C8563-8243-4BD7-A153-2AF7C9C016E2}"/>
               </a:ext>
             </a:extLst>
           </p:cNvPr>
@@ -11166,17 +12587,17 @@
           <a:p>
             <a:r>
               <a:rPr lang="en-US" dirty="0"/>
-              <a:t>The Command Line</a:t>
-            </a:r>
-          </a:p>
-        </p:txBody>
-      </p:sp>
-      <p:sp>
-        <p:nvSpPr>
-          <p:cNvPr id="3" name="Content Placeholder 2">
+              <a:t>Branching and Merging</a:t>
+            </a:r>
+          </a:p>
+        </p:txBody>
+      </p:sp>
+      <p:sp>
+        <p:nvSpPr>
+          <p:cNvPr id="3" name="Text Placeholder 2">
             <a:extLst>
               <a:ext uri="{FF2B5EF4-FFF2-40B4-BE49-F238E27FC236}">
-                <a16:creationId xmlns:a16="http://schemas.microsoft.com/office/drawing/2014/main" id="{C45A14B0-644B-4112-AA76-B2906EAB6FFB}"/>
+                <a16:creationId xmlns:a16="http://schemas.microsoft.com/office/drawing/2014/main" id="{182F19D3-529A-4D24-A8A1-8F63D0085728}"/>
               </a:ext>
             </a:extLst>
           </p:cNvPr>
@@ -11184,7 +12605,7 @@
             <a:spLocks noGrp="1"/>
           </p:cNvSpPr>
           <p:nvPr>
-            <p:ph idx="1"/>
+            <p:ph type="body" idx="1"/>
           </p:nvPr>
         </p:nvSpPr>
         <p:spPr/>
@@ -11194,48 +12615,7 @@
           <a:p>
             <a:r>
               <a:rPr lang="en-US" dirty="0"/>
-              <a:t>Advantages</a:t>
-            </a:r>
-          </a:p>
-          <a:p>
-            <a:pPr lvl="1"/>
-            <a:r>
-              <a:rPr lang="en-US" dirty="0"/>
-              <a:t>Ubiquitous</a:t>
-            </a:r>
-          </a:p>
-          <a:p>
-            <a:pPr lvl="1"/>
-            <a:r>
-              <a:rPr lang="en-US" dirty="0"/>
-              <a:t>Easy to find solutions, answers, hints</a:t>
-            </a:r>
-          </a:p>
-          <a:p>
-            <a:pPr lvl="1"/>
-            <a:r>
-              <a:rPr lang="en-US" dirty="0"/>
-              <a:t>It’s always there</a:t>
-            </a:r>
-          </a:p>
-          <a:p>
-            <a:r>
-              <a:rPr lang="en-US" dirty="0"/>
-              <a:t>Disadvantages</a:t>
-            </a:r>
-          </a:p>
-          <a:p>
-            <a:pPr lvl="1"/>
-            <a:r>
-              <a:rPr lang="en-US" dirty="0"/>
-              <a:t>It’s the command line.</a:t>
-            </a:r>
-          </a:p>
-          <a:p>
-            <a:pPr lvl="1"/>
-            <a:r>
-              <a:rPr lang="en-US" dirty="0"/>
-              <a:t>Seriously though… it’s the command line.</a:t>
+              <a:t>How to stay sane</a:t>
             </a:r>
           </a:p>
         </p:txBody>
@@ -11243,7 +12623,7 @@
     </p:spTree>
     <p:extLst>
       <p:ext uri="{BB962C8B-B14F-4D97-AF65-F5344CB8AC3E}">
-        <p14:creationId xmlns:p14="http://schemas.microsoft.com/office/powerpoint/2010/main" val="2403642711"/>
+        <p14:creationId xmlns:p14="http://schemas.microsoft.com/office/powerpoint/2010/main" val="3084031404"/>
       </p:ext>
     </p:extLst>
   </p:cSld>
@@ -11272,10 +12652,10 @@
       </p:grpSpPr>
       <p:sp>
         <p:nvSpPr>
-          <p:cNvPr id="2" name="Title 1">
+          <p:cNvPr id="4" name="Title 3">
             <a:extLst>
               <a:ext uri="{FF2B5EF4-FFF2-40B4-BE49-F238E27FC236}">
-                <a16:creationId xmlns:a16="http://schemas.microsoft.com/office/drawing/2014/main" id="{52B9E538-2607-48E8-89B9-7E324991C43E}"/>
+                <a16:creationId xmlns:a16="http://schemas.microsoft.com/office/drawing/2014/main" id="{B4D0A662-C37A-473D-A246-0D681A71BA66}"/>
               </a:ext>
             </a:extLst>
           </p:cNvPr>
@@ -11293,17 +12673,17 @@
           <a:p>
             <a:r>
               <a:rPr lang="en-US" dirty="0"/>
-              <a:t>SourceTree</a:t>
+              <a:t>Gitflow</a:t>
             </a:r>
           </a:p>
         </p:txBody>
       </p:sp>
       <p:pic>
         <p:nvPicPr>
-          <p:cNvPr id="4" name="Content Placeholder 3">
+          <p:cNvPr id="7" name="Content Placeholder 6">
             <a:extLst>
               <a:ext uri="{FF2B5EF4-FFF2-40B4-BE49-F238E27FC236}">
-                <a16:creationId xmlns:a16="http://schemas.microsoft.com/office/drawing/2014/main" id="{170692BA-4A52-45A4-AD54-BDE3EB083DF2}"/>
+                <a16:creationId xmlns:a16="http://schemas.microsoft.com/office/drawing/2014/main" id="{EEB5084E-8EDB-474F-8DAC-73F4A7AF336D}"/>
               </a:ext>
             </a:extLst>
           </p:cNvPr>
@@ -11315,25 +12695,44 @@
           </p:nvPr>
         </p:nvPicPr>
         <p:blipFill>
-          <a:blip r:embed="rId2"/>
+          <a:blip r:embed="rId2">
+            <a:extLst>
+              <a:ext uri="{28A0092B-C50C-407E-A947-70E740481C1C}">
+                <a14:useLocalDpi xmlns:a14="http://schemas.microsoft.com/office/drawing/2010/main" val="0"/>
+              </a:ext>
+              <a:ext uri="{96DAC541-7B7A-43D3-8B79-37D633B846F1}">
+                <asvg:svgBlip xmlns:asvg="http://schemas.microsoft.com/office/drawing/2016/SVG/main" r:embed="rId3"/>
+              </a:ext>
+            </a:extLst>
+          </a:blip>
           <a:stretch>
             <a:fillRect/>
           </a:stretch>
         </p:blipFill>
-        <p:spPr>
-          <a:xfrm>
-            <a:off x="2228144" y="1825625"/>
-            <a:ext cx="7735711" cy="4351338"/>
+        <p:spPr bwMode="auto">
+          <a:xfrm>
+            <a:off x="3063709" y="1825625"/>
+            <a:ext cx="6064582" cy="4351338"/>
           </a:xfrm>
           <a:prstGeom prst="rect">
             <a:avLst/>
           </a:prstGeom>
+          <a:noFill/>
+          <a:extLst>
+            <a:ext uri="{909E8E84-426E-40DD-AFC4-6F175D3DCCD1}">
+              <a14:hiddenFill xmlns:a14="http://schemas.microsoft.com/office/drawing/2010/main">
+                <a:solidFill>
+                  <a:srgbClr val="FFFFFF"/>
+                </a:solidFill>
+              </a14:hiddenFill>
+            </a:ext>
+          </a:extLst>
         </p:spPr>
       </p:pic>
     </p:spTree>
     <p:extLst>
       <p:ext uri="{BB962C8B-B14F-4D97-AF65-F5344CB8AC3E}">
-        <p14:creationId xmlns:p14="http://schemas.microsoft.com/office/powerpoint/2010/main" val="932627191"/>
+        <p14:creationId xmlns:p14="http://schemas.microsoft.com/office/powerpoint/2010/main" val="2377605413"/>
       </p:ext>
     </p:extLst>
   </p:cSld>
@@ -11365,7 +12764,7 @@
           <p:cNvPr id="2" name="Title 1">
             <a:extLst>
               <a:ext uri="{FF2B5EF4-FFF2-40B4-BE49-F238E27FC236}">
-                <a16:creationId xmlns:a16="http://schemas.microsoft.com/office/drawing/2014/main" id="{47F9B615-73A8-454F-BA70-483057F276EF}"/>
+                <a16:creationId xmlns:a16="http://schemas.microsoft.com/office/drawing/2014/main" id="{CC4A54E6-05F8-4D89-971E-BC053D209B94}"/>
               </a:ext>
             </a:extLst>
           </p:cNvPr>
@@ -11383,88 +12782,50 @@
           <a:p>
             <a:r>
               <a:rPr lang="en-US" dirty="0"/>
-              <a:t>SourceTree</a:t>
-            </a:r>
-          </a:p>
-        </p:txBody>
-      </p:sp>
-      <p:sp>
-        <p:nvSpPr>
-          <p:cNvPr id="3" name="Content Placeholder 2">
+              <a:t>Github Flow</a:t>
+            </a:r>
+          </a:p>
+        </p:txBody>
+      </p:sp>
+      <p:pic>
+        <p:nvPicPr>
+          <p:cNvPr id="5" name="Content Placeholder 4">
             <a:extLst>
               <a:ext uri="{FF2B5EF4-FFF2-40B4-BE49-F238E27FC236}">
-                <a16:creationId xmlns:a16="http://schemas.microsoft.com/office/drawing/2014/main" id="{FFC99A81-2CCC-44FA-A25B-613AAA5F0C11}"/>
+                <a16:creationId xmlns:a16="http://schemas.microsoft.com/office/drawing/2014/main" id="{7A2BCEFD-3342-43C1-B40B-42DE90C5E3F6}"/>
               </a:ext>
             </a:extLst>
           </p:cNvPr>
-          <p:cNvSpPr>
-            <a:spLocks noGrp="1"/>
-          </p:cNvSpPr>
+          <p:cNvPicPr>
+            <a:picLocks noGrp="1" noChangeAspect="1"/>
+          </p:cNvPicPr>
           <p:nvPr>
             <p:ph idx="1"/>
           </p:nvPr>
-        </p:nvSpPr>
-        <p:spPr/>
-        <p:txBody>
-          <a:bodyPr/>
-          <a:lstStyle/>
-          <a:p>
-            <a:r>
-              <a:rPr lang="en-US" dirty="0"/>
-              <a:t>Advantages</a:t>
-            </a:r>
-          </a:p>
-          <a:p>
-            <a:pPr lvl="1"/>
-            <a:r>
-              <a:rPr lang="en-US" dirty="0"/>
-              <a:t>Common UI</a:t>
-            </a:r>
-          </a:p>
-          <a:p>
-            <a:pPr lvl="1"/>
-            <a:r>
-              <a:rPr lang="en-US" dirty="0"/>
-              <a:t>Easy to use</a:t>
-            </a:r>
-          </a:p>
-          <a:p>
-            <a:pPr lvl="1"/>
-            <a:r>
-              <a:rPr lang="en-US" dirty="0"/>
-              <a:t>Multi-Platform</a:t>
-            </a:r>
-          </a:p>
-          <a:p>
-            <a:r>
-              <a:rPr lang="en-US" dirty="0"/>
-              <a:t>Disadvantages</a:t>
-            </a:r>
-          </a:p>
-          <a:p>
-            <a:pPr lvl="1"/>
-            <a:r>
-              <a:rPr lang="en-US" dirty="0"/>
-              <a:t>Seems to update a LOT – this can be a pain</a:t>
-            </a:r>
-          </a:p>
-          <a:p>
-            <a:pPr lvl="1"/>
-            <a:r>
-              <a:rPr lang="en-US" dirty="0"/>
-              <a:t>Owned by Atlassian, requires </a:t>
-            </a:r>
-            <a:r>
-              <a:rPr lang="en-US"/>
-              <a:t>an account</a:t>
-            </a:r>
-          </a:p>
-        </p:txBody>
-      </p:sp>
+        </p:nvPicPr>
+        <p:blipFill>
+          <a:blip r:embed="rId2">
+            <a:extLst>
+              <a:ext uri="{28A0092B-C50C-407E-A947-70E740481C1C}">
+                <a14:useLocalDpi xmlns:a14="http://schemas.microsoft.com/office/drawing/2010/main" val="0"/>
+              </a:ext>
+            </a:extLst>
+          </a:blip>
+          <a:stretch>
+            <a:fillRect/>
+          </a:stretch>
+        </p:blipFill>
+        <p:spPr>
+          <a:xfrm>
+            <a:off x="838200" y="2678073"/>
+            <a:ext cx="10515600" cy="2646442"/>
+          </a:xfrm>
+        </p:spPr>
+      </p:pic>
     </p:spTree>
     <p:extLst>
       <p:ext uri="{BB962C8B-B14F-4D97-AF65-F5344CB8AC3E}">
-        <p14:creationId xmlns:p14="http://schemas.microsoft.com/office/powerpoint/2010/main" val="105811851"/>
+        <p14:creationId xmlns:p14="http://schemas.microsoft.com/office/powerpoint/2010/main" val="3213113248"/>
       </p:ext>
     </p:extLst>
   </p:cSld>
@@ -11608,6 +12969,527 @@
           <p:cNvPr id="2" name="Title 1">
             <a:extLst>
               <a:ext uri="{FF2B5EF4-FFF2-40B4-BE49-F238E27FC236}">
+                <a16:creationId xmlns:a16="http://schemas.microsoft.com/office/drawing/2014/main" id="{F220168B-851B-448D-B065-1390D2D73C20}"/>
+              </a:ext>
+            </a:extLst>
+          </p:cNvPr>
+          <p:cNvSpPr>
+            <a:spLocks noGrp="1"/>
+          </p:cNvSpPr>
+          <p:nvPr>
+            <p:ph type="title"/>
+          </p:nvPr>
+        </p:nvSpPr>
+        <p:spPr/>
+        <p:txBody>
+          <a:bodyPr/>
+          <a:lstStyle/>
+          <a:p>
+            <a:r>
+              <a:rPr lang="en-US" dirty="0"/>
+              <a:t>Common UI Tools</a:t>
+            </a:r>
+          </a:p>
+        </p:txBody>
+      </p:sp>
+      <p:sp>
+        <p:nvSpPr>
+          <p:cNvPr id="3" name="Text Placeholder 2">
+            <a:extLst>
+              <a:ext uri="{FF2B5EF4-FFF2-40B4-BE49-F238E27FC236}">
+                <a16:creationId xmlns:a16="http://schemas.microsoft.com/office/drawing/2014/main" id="{1471B88D-28C1-4B4E-A5A7-4BC5DECCA821}"/>
+              </a:ext>
+            </a:extLst>
+          </p:cNvPr>
+          <p:cNvSpPr>
+            <a:spLocks noGrp="1"/>
+          </p:cNvSpPr>
+          <p:nvPr>
+            <p:ph type="body" idx="1"/>
+          </p:nvPr>
+        </p:nvSpPr>
+        <p:spPr/>
+        <p:txBody>
+          <a:bodyPr/>
+          <a:lstStyle/>
+          <a:p>
+            <a:endParaRPr lang="en-US"/>
+          </a:p>
+        </p:txBody>
+      </p:sp>
+    </p:spTree>
+    <p:extLst>
+      <p:ext uri="{BB962C8B-B14F-4D97-AF65-F5344CB8AC3E}">
+        <p14:creationId xmlns:p14="http://schemas.microsoft.com/office/powerpoint/2010/main" val="384892571"/>
+      </p:ext>
+    </p:extLst>
+  </p:cSld>
+  <p:clrMapOvr>
+    <a:masterClrMapping/>
+  </p:clrMapOvr>
+</p:sld>
+</file>
+
+<file path=ppt/slides/slide31.xml><?xml version="1.0" encoding="utf-8"?>
+<p:sld xmlns:a="http://schemas.openxmlformats.org/drawingml/2006/main" xmlns:r="http://schemas.openxmlformats.org/officeDocument/2006/relationships" xmlns:p="http://schemas.openxmlformats.org/presentationml/2006/main">
+  <p:cSld>
+    <p:spTree>
+      <p:nvGrpSpPr>
+        <p:cNvPr id="1" name=""/>
+        <p:cNvGrpSpPr/>
+        <p:nvPr/>
+      </p:nvGrpSpPr>
+      <p:grpSpPr>
+        <a:xfrm>
+          <a:off x="0" y="0"/>
+          <a:ext cx="0" cy="0"/>
+          <a:chOff x="0" y="0"/>
+          <a:chExt cx="0" cy="0"/>
+        </a:xfrm>
+      </p:grpSpPr>
+      <p:sp>
+        <p:nvSpPr>
+          <p:cNvPr id="2" name="Title 1">
+            <a:extLst>
+              <a:ext uri="{FF2B5EF4-FFF2-40B4-BE49-F238E27FC236}">
+                <a16:creationId xmlns:a16="http://schemas.microsoft.com/office/drawing/2014/main" id="{58877F43-7F96-4A05-9192-F72D5998C0FD}"/>
+              </a:ext>
+            </a:extLst>
+          </p:cNvPr>
+          <p:cNvSpPr>
+            <a:spLocks noGrp="1"/>
+          </p:cNvSpPr>
+          <p:nvPr>
+            <p:ph type="title"/>
+          </p:nvPr>
+        </p:nvSpPr>
+        <p:spPr/>
+        <p:txBody>
+          <a:bodyPr/>
+          <a:lstStyle/>
+          <a:p>
+            <a:r>
+              <a:rPr lang="en-US" dirty="0"/>
+              <a:t>The Command Line</a:t>
+            </a:r>
+          </a:p>
+        </p:txBody>
+      </p:sp>
+      <p:pic>
+        <p:nvPicPr>
+          <p:cNvPr id="4" name="Content Placeholder 3">
+            <a:extLst>
+              <a:ext uri="{FF2B5EF4-FFF2-40B4-BE49-F238E27FC236}">
+                <a16:creationId xmlns:a16="http://schemas.microsoft.com/office/drawing/2014/main" id="{58CD5727-155C-4842-B31F-01A46BD28679}"/>
+              </a:ext>
+            </a:extLst>
+          </p:cNvPr>
+          <p:cNvPicPr>
+            <a:picLocks noGrp="1" noChangeAspect="1"/>
+          </p:cNvPicPr>
+          <p:nvPr>
+            <p:ph idx="1"/>
+          </p:nvPr>
+        </p:nvPicPr>
+        <p:blipFill>
+          <a:blip r:embed="rId2"/>
+          <a:stretch>
+            <a:fillRect/>
+          </a:stretch>
+        </p:blipFill>
+        <p:spPr>
+          <a:xfrm>
+            <a:off x="2032713" y="1881069"/>
+            <a:ext cx="8126574" cy="4240449"/>
+          </a:xfrm>
+          <a:prstGeom prst="rect">
+            <a:avLst/>
+          </a:prstGeom>
+        </p:spPr>
+      </p:pic>
+    </p:spTree>
+    <p:extLst>
+      <p:ext uri="{BB962C8B-B14F-4D97-AF65-F5344CB8AC3E}">
+        <p14:creationId xmlns:p14="http://schemas.microsoft.com/office/powerpoint/2010/main" val="1978598311"/>
+      </p:ext>
+    </p:extLst>
+  </p:cSld>
+  <p:clrMapOvr>
+    <a:masterClrMapping/>
+  </p:clrMapOvr>
+</p:sld>
+</file>
+
+<file path=ppt/slides/slide32.xml><?xml version="1.0" encoding="utf-8"?>
+<p:sld xmlns:a="http://schemas.openxmlformats.org/drawingml/2006/main" xmlns:r="http://schemas.openxmlformats.org/officeDocument/2006/relationships" xmlns:p="http://schemas.openxmlformats.org/presentationml/2006/main">
+  <p:cSld>
+    <p:spTree>
+      <p:nvGrpSpPr>
+        <p:cNvPr id="1" name=""/>
+        <p:cNvGrpSpPr/>
+        <p:nvPr/>
+      </p:nvGrpSpPr>
+      <p:grpSpPr>
+        <a:xfrm>
+          <a:off x="0" y="0"/>
+          <a:ext cx="0" cy="0"/>
+          <a:chOff x="0" y="0"/>
+          <a:chExt cx="0" cy="0"/>
+        </a:xfrm>
+      </p:grpSpPr>
+      <p:sp>
+        <p:nvSpPr>
+          <p:cNvPr id="2" name="Title 1">
+            <a:extLst>
+              <a:ext uri="{FF2B5EF4-FFF2-40B4-BE49-F238E27FC236}">
+                <a16:creationId xmlns:a16="http://schemas.microsoft.com/office/drawing/2014/main" id="{6F065B9B-DF9F-4EE1-A34B-B214540B13E1}"/>
+              </a:ext>
+            </a:extLst>
+          </p:cNvPr>
+          <p:cNvSpPr>
+            <a:spLocks noGrp="1"/>
+          </p:cNvSpPr>
+          <p:nvPr>
+            <p:ph type="title"/>
+          </p:nvPr>
+        </p:nvSpPr>
+        <p:spPr/>
+        <p:txBody>
+          <a:bodyPr/>
+          <a:lstStyle/>
+          <a:p>
+            <a:r>
+              <a:rPr lang="en-US" dirty="0"/>
+              <a:t>The Command Line</a:t>
+            </a:r>
+          </a:p>
+        </p:txBody>
+      </p:sp>
+      <p:sp>
+        <p:nvSpPr>
+          <p:cNvPr id="3" name="Content Placeholder 2">
+            <a:extLst>
+              <a:ext uri="{FF2B5EF4-FFF2-40B4-BE49-F238E27FC236}">
+                <a16:creationId xmlns:a16="http://schemas.microsoft.com/office/drawing/2014/main" id="{C45A14B0-644B-4112-AA76-B2906EAB6FFB}"/>
+              </a:ext>
+            </a:extLst>
+          </p:cNvPr>
+          <p:cNvSpPr>
+            <a:spLocks noGrp="1"/>
+          </p:cNvSpPr>
+          <p:nvPr>
+            <p:ph idx="1"/>
+          </p:nvPr>
+        </p:nvSpPr>
+        <p:spPr/>
+        <p:txBody>
+          <a:bodyPr/>
+          <a:lstStyle/>
+          <a:p>
+            <a:r>
+              <a:rPr lang="en-US" dirty="0"/>
+              <a:t>Advantages</a:t>
+            </a:r>
+          </a:p>
+          <a:p>
+            <a:pPr lvl="1"/>
+            <a:r>
+              <a:rPr lang="en-US" dirty="0"/>
+              <a:t>Ubiquitous</a:t>
+            </a:r>
+          </a:p>
+          <a:p>
+            <a:pPr lvl="1"/>
+            <a:r>
+              <a:rPr lang="en-US" dirty="0"/>
+              <a:t>Easy to find solutions, answers, hints</a:t>
+            </a:r>
+          </a:p>
+          <a:p>
+            <a:pPr lvl="1"/>
+            <a:r>
+              <a:rPr lang="en-US" dirty="0"/>
+              <a:t>It’s always there</a:t>
+            </a:r>
+          </a:p>
+          <a:p>
+            <a:r>
+              <a:rPr lang="en-US" dirty="0"/>
+              <a:t>Disadvantages</a:t>
+            </a:r>
+          </a:p>
+          <a:p>
+            <a:pPr lvl="1"/>
+            <a:r>
+              <a:rPr lang="en-US" dirty="0"/>
+              <a:t>It’s the command line.</a:t>
+            </a:r>
+          </a:p>
+          <a:p>
+            <a:pPr lvl="1"/>
+            <a:r>
+              <a:rPr lang="en-US" dirty="0"/>
+              <a:t>Seriously though… it’s the command line.</a:t>
+            </a:r>
+          </a:p>
+        </p:txBody>
+      </p:sp>
+    </p:spTree>
+    <p:extLst>
+      <p:ext uri="{BB962C8B-B14F-4D97-AF65-F5344CB8AC3E}">
+        <p14:creationId xmlns:p14="http://schemas.microsoft.com/office/powerpoint/2010/main" val="2403642711"/>
+      </p:ext>
+    </p:extLst>
+  </p:cSld>
+  <p:clrMapOvr>
+    <a:masterClrMapping/>
+  </p:clrMapOvr>
+</p:sld>
+</file>
+
+<file path=ppt/slides/slide33.xml><?xml version="1.0" encoding="utf-8"?>
+<p:sld xmlns:a="http://schemas.openxmlformats.org/drawingml/2006/main" xmlns:r="http://schemas.openxmlformats.org/officeDocument/2006/relationships" xmlns:p="http://schemas.openxmlformats.org/presentationml/2006/main">
+  <p:cSld>
+    <p:spTree>
+      <p:nvGrpSpPr>
+        <p:cNvPr id="1" name=""/>
+        <p:cNvGrpSpPr/>
+        <p:nvPr/>
+      </p:nvGrpSpPr>
+      <p:grpSpPr>
+        <a:xfrm>
+          <a:off x="0" y="0"/>
+          <a:ext cx="0" cy="0"/>
+          <a:chOff x="0" y="0"/>
+          <a:chExt cx="0" cy="0"/>
+        </a:xfrm>
+      </p:grpSpPr>
+      <p:sp>
+        <p:nvSpPr>
+          <p:cNvPr id="2" name="Title 1">
+            <a:extLst>
+              <a:ext uri="{FF2B5EF4-FFF2-40B4-BE49-F238E27FC236}">
+                <a16:creationId xmlns:a16="http://schemas.microsoft.com/office/drawing/2014/main" id="{52B9E538-2607-48E8-89B9-7E324991C43E}"/>
+              </a:ext>
+            </a:extLst>
+          </p:cNvPr>
+          <p:cNvSpPr>
+            <a:spLocks noGrp="1"/>
+          </p:cNvSpPr>
+          <p:nvPr>
+            <p:ph type="title"/>
+          </p:nvPr>
+        </p:nvSpPr>
+        <p:spPr/>
+        <p:txBody>
+          <a:bodyPr/>
+          <a:lstStyle/>
+          <a:p>
+            <a:r>
+              <a:rPr lang="en-US" dirty="0"/>
+              <a:t>SourceTree</a:t>
+            </a:r>
+          </a:p>
+        </p:txBody>
+      </p:sp>
+      <p:pic>
+        <p:nvPicPr>
+          <p:cNvPr id="4" name="Content Placeholder 3">
+            <a:extLst>
+              <a:ext uri="{FF2B5EF4-FFF2-40B4-BE49-F238E27FC236}">
+                <a16:creationId xmlns:a16="http://schemas.microsoft.com/office/drawing/2014/main" id="{170692BA-4A52-45A4-AD54-BDE3EB083DF2}"/>
+              </a:ext>
+            </a:extLst>
+          </p:cNvPr>
+          <p:cNvPicPr>
+            <a:picLocks noGrp="1" noChangeAspect="1"/>
+          </p:cNvPicPr>
+          <p:nvPr>
+            <p:ph idx="1"/>
+          </p:nvPr>
+        </p:nvPicPr>
+        <p:blipFill>
+          <a:blip r:embed="rId2"/>
+          <a:stretch>
+            <a:fillRect/>
+          </a:stretch>
+        </p:blipFill>
+        <p:spPr>
+          <a:xfrm>
+            <a:off x="2228144" y="1825625"/>
+            <a:ext cx="7735711" cy="4351338"/>
+          </a:xfrm>
+          <a:prstGeom prst="rect">
+            <a:avLst/>
+          </a:prstGeom>
+        </p:spPr>
+      </p:pic>
+    </p:spTree>
+    <p:extLst>
+      <p:ext uri="{BB962C8B-B14F-4D97-AF65-F5344CB8AC3E}">
+        <p14:creationId xmlns:p14="http://schemas.microsoft.com/office/powerpoint/2010/main" val="932627191"/>
+      </p:ext>
+    </p:extLst>
+  </p:cSld>
+  <p:clrMapOvr>
+    <a:masterClrMapping/>
+  </p:clrMapOvr>
+</p:sld>
+</file>
+
+<file path=ppt/slides/slide34.xml><?xml version="1.0" encoding="utf-8"?>
+<p:sld xmlns:a="http://schemas.openxmlformats.org/drawingml/2006/main" xmlns:r="http://schemas.openxmlformats.org/officeDocument/2006/relationships" xmlns:p="http://schemas.openxmlformats.org/presentationml/2006/main">
+  <p:cSld>
+    <p:spTree>
+      <p:nvGrpSpPr>
+        <p:cNvPr id="1" name=""/>
+        <p:cNvGrpSpPr/>
+        <p:nvPr/>
+      </p:nvGrpSpPr>
+      <p:grpSpPr>
+        <a:xfrm>
+          <a:off x="0" y="0"/>
+          <a:ext cx="0" cy="0"/>
+          <a:chOff x="0" y="0"/>
+          <a:chExt cx="0" cy="0"/>
+        </a:xfrm>
+      </p:grpSpPr>
+      <p:sp>
+        <p:nvSpPr>
+          <p:cNvPr id="2" name="Title 1">
+            <a:extLst>
+              <a:ext uri="{FF2B5EF4-FFF2-40B4-BE49-F238E27FC236}">
+                <a16:creationId xmlns:a16="http://schemas.microsoft.com/office/drawing/2014/main" id="{47F9B615-73A8-454F-BA70-483057F276EF}"/>
+              </a:ext>
+            </a:extLst>
+          </p:cNvPr>
+          <p:cNvSpPr>
+            <a:spLocks noGrp="1"/>
+          </p:cNvSpPr>
+          <p:nvPr>
+            <p:ph type="title"/>
+          </p:nvPr>
+        </p:nvSpPr>
+        <p:spPr/>
+        <p:txBody>
+          <a:bodyPr/>
+          <a:lstStyle/>
+          <a:p>
+            <a:r>
+              <a:rPr lang="en-US" dirty="0"/>
+              <a:t>SourceTree</a:t>
+            </a:r>
+          </a:p>
+        </p:txBody>
+      </p:sp>
+      <p:sp>
+        <p:nvSpPr>
+          <p:cNvPr id="3" name="Content Placeholder 2">
+            <a:extLst>
+              <a:ext uri="{FF2B5EF4-FFF2-40B4-BE49-F238E27FC236}">
+                <a16:creationId xmlns:a16="http://schemas.microsoft.com/office/drawing/2014/main" id="{FFC99A81-2CCC-44FA-A25B-613AAA5F0C11}"/>
+              </a:ext>
+            </a:extLst>
+          </p:cNvPr>
+          <p:cNvSpPr>
+            <a:spLocks noGrp="1"/>
+          </p:cNvSpPr>
+          <p:nvPr>
+            <p:ph idx="1"/>
+          </p:nvPr>
+        </p:nvSpPr>
+        <p:spPr/>
+        <p:txBody>
+          <a:bodyPr/>
+          <a:lstStyle/>
+          <a:p>
+            <a:r>
+              <a:rPr lang="en-US" dirty="0"/>
+              <a:t>Advantages</a:t>
+            </a:r>
+          </a:p>
+          <a:p>
+            <a:pPr lvl="1"/>
+            <a:r>
+              <a:rPr lang="en-US" dirty="0"/>
+              <a:t>Common UI</a:t>
+            </a:r>
+          </a:p>
+          <a:p>
+            <a:pPr lvl="1"/>
+            <a:r>
+              <a:rPr lang="en-US" dirty="0"/>
+              <a:t>Easy to use</a:t>
+            </a:r>
+          </a:p>
+          <a:p>
+            <a:pPr lvl="1"/>
+            <a:r>
+              <a:rPr lang="en-US" dirty="0"/>
+              <a:t>Multi-Platform</a:t>
+            </a:r>
+          </a:p>
+          <a:p>
+            <a:r>
+              <a:rPr lang="en-US" dirty="0"/>
+              <a:t>Disadvantages</a:t>
+            </a:r>
+          </a:p>
+          <a:p>
+            <a:pPr lvl="1"/>
+            <a:r>
+              <a:rPr lang="en-US" dirty="0"/>
+              <a:t>Seems to update a LOT – this can be a pain</a:t>
+            </a:r>
+          </a:p>
+          <a:p>
+            <a:pPr lvl="1"/>
+            <a:r>
+              <a:rPr lang="en-US" dirty="0"/>
+              <a:t>Owned by Atlassian, requires </a:t>
+            </a:r>
+            <a:r>
+              <a:rPr lang="en-US"/>
+              <a:t>an account</a:t>
+            </a:r>
+          </a:p>
+        </p:txBody>
+      </p:sp>
+    </p:spTree>
+    <p:extLst>
+      <p:ext uri="{BB962C8B-B14F-4D97-AF65-F5344CB8AC3E}">
+        <p14:creationId xmlns:p14="http://schemas.microsoft.com/office/powerpoint/2010/main" val="105811851"/>
+      </p:ext>
+    </p:extLst>
+  </p:cSld>
+  <p:clrMapOvr>
+    <a:masterClrMapping/>
+  </p:clrMapOvr>
+</p:sld>
+</file>
+
+<file path=ppt/slides/slide35.xml><?xml version="1.0" encoding="utf-8"?>
+<p:sld xmlns:a="http://schemas.openxmlformats.org/drawingml/2006/main" xmlns:r="http://schemas.openxmlformats.org/officeDocument/2006/relationships" xmlns:p="http://schemas.openxmlformats.org/presentationml/2006/main">
+  <p:cSld>
+    <p:spTree>
+      <p:nvGrpSpPr>
+        <p:cNvPr id="1" name=""/>
+        <p:cNvGrpSpPr/>
+        <p:nvPr/>
+      </p:nvGrpSpPr>
+      <p:grpSpPr>
+        <a:xfrm>
+          <a:off x="0" y="0"/>
+          <a:ext cx="0" cy="0"/>
+          <a:chOff x="0" y="0"/>
+          <a:chExt cx="0" cy="0"/>
+        </a:xfrm>
+      </p:grpSpPr>
+      <p:sp>
+        <p:nvSpPr>
+          <p:cNvPr id="2" name="Title 1">
+            <a:extLst>
+              <a:ext uri="{FF2B5EF4-FFF2-40B4-BE49-F238E27FC236}">
                 <a16:creationId xmlns:a16="http://schemas.microsoft.com/office/drawing/2014/main" id="{BF5778DD-3C07-454D-981B-E4BE4CA84837}"/>
               </a:ext>
             </a:extLst>
@@ -11723,7 +13605,7 @@
 </p:sld>
 </file>
 
-<file path=ppt/slides/slide31.xml><?xml version="1.0" encoding="utf-8"?>
+<file path=ppt/slides/slide36.xml><?xml version="1.0" encoding="utf-8"?>
 <p:sld xmlns:a="http://schemas.openxmlformats.org/drawingml/2006/main" xmlns:r="http://schemas.openxmlformats.org/officeDocument/2006/relationships" xmlns:p="http://schemas.openxmlformats.org/presentationml/2006/main">
   <p:cSld>
     <p:spTree>
@@ -12313,10 +14195,10 @@
       </p:grpSpPr>
       <p:sp>
         <p:nvSpPr>
-          <p:cNvPr id="4" name="Title 3">
+          <p:cNvPr id="2" name="Title 1">
             <a:extLst>
               <a:ext uri="{FF2B5EF4-FFF2-40B4-BE49-F238E27FC236}">
-                <a16:creationId xmlns:a16="http://schemas.microsoft.com/office/drawing/2014/main" id="{953D25B8-FE41-473F-A945-9B5740425B60}"/>
+                <a16:creationId xmlns:a16="http://schemas.microsoft.com/office/drawing/2014/main" id="{28425DF4-0F10-4E4E-B789-48D474CCCC54}"/>
               </a:ext>
             </a:extLst>
           </p:cNvPr>
@@ -12327,29 +14209,24 @@
             <p:ph type="title"/>
           </p:nvPr>
         </p:nvSpPr>
-        <p:spPr>
-          <a:xfrm>
-            <a:off x="838200" y="365125"/>
-            <a:ext cx="10515600" cy="1325563"/>
-          </a:xfrm>
-        </p:spPr>
+        <p:spPr/>
         <p:txBody>
           <a:bodyPr/>
           <a:lstStyle/>
           <a:p>
             <a:r>
               <a:rPr lang="en-US" dirty="0"/>
-              <a:t>Snapshots – Not Diffs</a:t>
-            </a:r>
-          </a:p>
-        </p:txBody>
-      </p:sp>
-      <p:sp>
-        <p:nvSpPr>
-          <p:cNvPr id="5" name="Content Placeholder 4">
+              <a:t>Terms</a:t>
+            </a:r>
+          </a:p>
+        </p:txBody>
+      </p:sp>
+      <p:sp>
+        <p:nvSpPr>
+          <p:cNvPr id="3" name="Content Placeholder 2">
             <a:extLst>
               <a:ext uri="{FF2B5EF4-FFF2-40B4-BE49-F238E27FC236}">
-                <a16:creationId xmlns:a16="http://schemas.microsoft.com/office/drawing/2014/main" id="{3FDCFACD-8BD8-4FC9-B119-8103F4E2A851}"/>
+                <a16:creationId xmlns:a16="http://schemas.microsoft.com/office/drawing/2014/main" id="{7F5E0436-080B-4045-9717-6ACDFEC420A4}"/>
               </a:ext>
             </a:extLst>
           </p:cNvPr>
@@ -12360,74 +14237,67 @@
             <p:ph idx="1"/>
           </p:nvPr>
         </p:nvSpPr>
-        <p:spPr>
-          <a:xfrm>
-            <a:off x="838200" y="1555844"/>
-            <a:ext cx="10515600" cy="655093"/>
-          </a:xfrm>
-        </p:spPr>
+        <p:spPr/>
         <p:txBody>
           <a:bodyPr/>
           <a:lstStyle/>
           <a:p>
             <a:r>
               <a:rPr lang="en-US" dirty="0"/>
-              <a:t>Most Version Control Systems (VCS) track differences.</a:t>
-            </a:r>
-          </a:p>
-        </p:txBody>
-      </p:sp>
-      <p:pic>
-        <p:nvPicPr>
-          <p:cNvPr id="1026" name="Picture 2" descr="Storing data as changes to a base version of each file.">
-            <a:extLst>
-              <a:ext uri="{FF2B5EF4-FFF2-40B4-BE49-F238E27FC236}">
-                <a16:creationId xmlns:a16="http://schemas.microsoft.com/office/drawing/2014/main" id="{DAC1C573-FF74-41F7-8FF5-A6D336DDC122}"/>
-              </a:ext>
-            </a:extLst>
-          </p:cNvPr>
-          <p:cNvPicPr>
-            <a:picLocks noChangeAspect="1" noChangeArrowheads="1"/>
-          </p:cNvPicPr>
-          <p:nvPr/>
-        </p:nvPicPr>
-        <p:blipFill>
-          <a:blip r:embed="rId2">
-            <a:extLst>
-              <a:ext uri="{28A0092B-C50C-407E-A947-70E740481C1C}">
-                <a14:useLocalDpi xmlns:a14="http://schemas.microsoft.com/office/drawing/2010/main" val="0"/>
-              </a:ext>
-            </a:extLst>
-          </a:blip>
-          <a:srcRect/>
-          <a:stretch>
-            <a:fillRect/>
-          </a:stretch>
-        </p:blipFill>
-        <p:spPr bwMode="auto">
-          <a:xfrm>
-            <a:off x="1520730" y="2210937"/>
-            <a:ext cx="9150540" cy="3545834"/>
-          </a:xfrm>
-          <a:prstGeom prst="rect">
-            <a:avLst/>
-          </a:prstGeom>
-          <a:noFill/>
-          <a:extLst>
-            <a:ext uri="{909E8E84-426E-40DD-AFC4-6F175D3DCCD1}">
-              <a14:hiddenFill xmlns:a14="http://schemas.microsoft.com/office/drawing/2010/main">
-                <a:solidFill>
-                  <a:srgbClr val="FFFFFF"/>
-                </a:solidFill>
-              </a14:hiddenFill>
-            </a:ext>
-          </a:extLst>
-        </p:spPr>
-      </p:pic>
+              <a:t>Merge</a:t>
+            </a:r>
+          </a:p>
+          <a:p>
+            <a:pPr lvl="1"/>
+            <a:r>
+              <a:rPr lang="en-US" dirty="0"/>
+              <a:t>A way of bringing the commits on one branch into another branch</a:t>
+            </a:r>
+          </a:p>
+          <a:p>
+            <a:pPr lvl="1"/>
+            <a:r>
+              <a:rPr lang="en-US" dirty="0"/>
+              <a:t>Results in a “Merge Commit”</a:t>
+            </a:r>
+          </a:p>
+          <a:p>
+            <a:pPr lvl="1"/>
+            <a:r>
+              <a:rPr lang="en-US" dirty="0"/>
+              <a:t>Generally the preferred way to synchronize branches</a:t>
+            </a:r>
+          </a:p>
+          <a:p>
+            <a:pPr lvl="1"/>
+            <a:endParaRPr lang="en-US" dirty="0"/>
+          </a:p>
+          <a:p>
+            <a:r>
+              <a:rPr lang="en-US" dirty="0"/>
+              <a:t>Rebase</a:t>
+            </a:r>
+          </a:p>
+          <a:p>
+            <a:pPr lvl="1"/>
+            <a:r>
+              <a:rPr lang="en-US" dirty="0"/>
+              <a:t>An alternative to merge</a:t>
+            </a:r>
+          </a:p>
+          <a:p>
+            <a:pPr lvl="1"/>
+            <a:r>
+              <a:rPr lang="en-US" dirty="0"/>
+              <a:t>Brings the tip of one branch to the end of the other</a:t>
+            </a:r>
+          </a:p>
+        </p:txBody>
+      </p:sp>
     </p:spTree>
     <p:extLst>
       <p:ext uri="{BB962C8B-B14F-4D97-AF65-F5344CB8AC3E}">
-        <p14:creationId xmlns:p14="http://schemas.microsoft.com/office/powerpoint/2010/main" val="3472819714"/>
+        <p14:creationId xmlns:p14="http://schemas.microsoft.com/office/powerpoint/2010/main" val="1901867814"/>
       </p:ext>
     </p:extLst>
   </p:cSld>
@@ -12459,7 +14329,7 @@
           <p:cNvPr id="2" name="Title 1">
             <a:extLst>
               <a:ext uri="{FF2B5EF4-FFF2-40B4-BE49-F238E27FC236}">
-                <a16:creationId xmlns:a16="http://schemas.microsoft.com/office/drawing/2014/main" id="{308775A3-9078-47B1-BCA5-76A8080AAD80}"/>
+                <a16:creationId xmlns:a16="http://schemas.microsoft.com/office/drawing/2014/main" id="{67F46049-50F4-43A1-A76E-4694D3D0BFBD}"/>
               </a:ext>
             </a:extLst>
           </p:cNvPr>
@@ -12477,57 +14347,26 @@
           <a:p>
             <a:r>
               <a:rPr lang="en-US" dirty="0"/>
-              <a:t>Snapshot – Not Diffs</a:t>
-            </a:r>
-          </a:p>
-        </p:txBody>
-      </p:sp>
-      <p:sp>
-        <p:nvSpPr>
-          <p:cNvPr id="3" name="Content Placeholder 2">
+              <a:t>Branching</a:t>
+            </a:r>
+          </a:p>
+        </p:txBody>
+      </p:sp>
+      <p:pic>
+        <p:nvPicPr>
+          <p:cNvPr id="5" name="Content Placeholder 4">
             <a:extLst>
               <a:ext uri="{FF2B5EF4-FFF2-40B4-BE49-F238E27FC236}">
-                <a16:creationId xmlns:a16="http://schemas.microsoft.com/office/drawing/2014/main" id="{D92A0E7A-AE89-46F3-A617-829ACAB1F1EE}"/>
-              </a:ext>
-            </a:extLst>
-          </p:cNvPr>
-          <p:cNvSpPr>
-            <a:spLocks noGrp="1"/>
-          </p:cNvSpPr>
-          <p:nvPr>
-            <p:ph idx="1"/>
-          </p:nvPr>
-        </p:nvSpPr>
-        <p:spPr>
-          <a:xfrm>
-            <a:off x="838200" y="1825625"/>
-            <a:ext cx="10515600" cy="658268"/>
-          </a:xfrm>
-        </p:spPr>
-        <p:txBody>
-          <a:bodyPr/>
-          <a:lstStyle/>
-          <a:p>
-            <a:r>
-              <a:rPr lang="en-US" dirty="0"/>
-              <a:t>Git tracks a snapshot of the file – only tracking changed files.</a:t>
-            </a:r>
-          </a:p>
-        </p:txBody>
-      </p:sp>
-      <p:pic>
-        <p:nvPicPr>
-          <p:cNvPr id="2050" name="Picture 2" descr="Git stores data as snapshots of the project over time.">
-            <a:extLst>
-              <a:ext uri="{FF2B5EF4-FFF2-40B4-BE49-F238E27FC236}">
-                <a16:creationId xmlns:a16="http://schemas.microsoft.com/office/drawing/2014/main" id="{7CF41BA9-04C2-482D-85CC-047C6AF0864A}"/>
+                <a16:creationId xmlns:a16="http://schemas.microsoft.com/office/drawing/2014/main" id="{0A755846-A235-48DD-8239-194A89C787FF}"/>
               </a:ext>
             </a:extLst>
           </p:cNvPr>
           <p:cNvPicPr>
-            <a:picLocks noChangeAspect="1" noChangeArrowheads="1"/>
+            <a:picLocks noGrp="1" noChangeAspect="1"/>
           </p:cNvPicPr>
-          <p:nvPr/>
+          <p:nvPr>
+            <p:ph idx="1"/>
+          </p:nvPr>
         </p:nvPicPr>
         <p:blipFill>
           <a:blip r:embed="rId2">
@@ -12535,37 +14374,26 @@
               <a:ext uri="{28A0092B-C50C-407E-A947-70E740481C1C}">
                 <a14:useLocalDpi xmlns:a14="http://schemas.microsoft.com/office/drawing/2010/main" val="0"/>
               </a:ext>
+              <a:ext uri="{96DAC541-7B7A-43D3-8B79-37D633B846F1}">
+                <asvg:svgBlip xmlns:asvg="http://schemas.microsoft.com/office/drawing/2016/SVG/main" r:embed="rId3"/>
+              </a:ext>
             </a:extLst>
           </a:blip>
-          <a:srcRect/>
           <a:stretch>
             <a:fillRect/>
           </a:stretch>
         </p:blipFill>
-        <p:spPr bwMode="auto">
-          <a:xfrm>
-            <a:off x="1460236" y="2715905"/>
-            <a:ext cx="9271528" cy="3534770"/>
-          </a:xfrm>
-          <a:prstGeom prst="rect">
-            <a:avLst/>
-          </a:prstGeom>
-          <a:noFill/>
-          <a:extLst>
-            <a:ext uri="{909E8E84-426E-40DD-AFC4-6F175D3DCCD1}">
-              <a14:hiddenFill xmlns:a14="http://schemas.microsoft.com/office/drawing/2010/main">
-                <a:solidFill>
-                  <a:srgbClr val="FFFFFF"/>
-                </a:solidFill>
-              </a14:hiddenFill>
-            </a:ext>
-          </a:extLst>
+        <p:spPr>
+          <a:xfrm>
+            <a:off x="2295705" y="1825625"/>
+            <a:ext cx="7600590" cy="4351338"/>
+          </a:xfrm>
         </p:spPr>
       </p:pic>
     </p:spTree>
     <p:extLst>
       <p:ext uri="{BB962C8B-B14F-4D97-AF65-F5344CB8AC3E}">
-        <p14:creationId xmlns:p14="http://schemas.microsoft.com/office/powerpoint/2010/main" val="2467824290"/>
+        <p14:creationId xmlns:p14="http://schemas.microsoft.com/office/powerpoint/2010/main" val="3394842086"/>
       </p:ext>
     </p:extLst>
   </p:cSld>

</xml_diff>

<commit_message>
add note about pull requests
</commit_message>
<xml_diff>
--- a/Slides/Git for the Normal Developer.pptx
+++ b/Slides/Git for the Normal Developer.pptx
@@ -1090,7 +1090,7 @@
           <a:noFill/>
           <a:extLst>
             <a:ext uri="{909E8E84-426E-40dd-AFC4-6F175D3DCCD1}">
-              <a14:hiddenFill xmlns="" xmlns:a14="http://schemas.microsoft.com/office/drawing/2010/main">
+              <a14:hiddenFill xmlns:a14="http://schemas.microsoft.com/office/drawing/2010/main" xmlns="">
                 <a:solidFill>
                   <a:srgbClr val="FFFFFF"/>
                 </a:solidFill>
@@ -1306,7 +1306,7 @@
           <a:noFill/>
           <a:extLst>
             <a:ext uri="{909E8E84-426E-40dd-AFC4-6F175D3DCCD1}">
-              <a14:hiddenFill xmlns="" xmlns:a14="http://schemas.microsoft.com/office/drawing/2010/main">
+              <a14:hiddenFill xmlns:a14="http://schemas.microsoft.com/office/drawing/2010/main" xmlns="">
                 <a:solidFill>
                   <a:srgbClr val="FFFFFF"/>
                 </a:solidFill>
@@ -1345,7 +1345,7 @@
           <a:noFill/>
           <a:extLst>
             <a:ext uri="{909E8E84-426E-40dd-AFC4-6F175D3DCCD1}">
-              <a14:hiddenFill xmlns="" xmlns:a14="http://schemas.microsoft.com/office/drawing/2010/main">
+              <a14:hiddenFill xmlns:a14="http://schemas.microsoft.com/office/drawing/2010/main" xmlns="">
                 <a:solidFill>
                   <a:srgbClr val="FFFFFF"/>
                 </a:solidFill>
@@ -1531,7 +1531,7 @@
           <a:noFill/>
           <a:extLst>
             <a:ext uri="{909E8E84-426E-40dd-AFC4-6F175D3DCCD1}">
-              <a14:hiddenFill xmlns="" xmlns:a14="http://schemas.microsoft.com/office/drawing/2010/main">
+              <a14:hiddenFill xmlns:a14="http://schemas.microsoft.com/office/drawing/2010/main" xmlns="">
                 <a:solidFill>
                   <a:srgbClr val="FFFFFF"/>
                 </a:solidFill>
@@ -1747,7 +1747,7 @@
           <a:noFill/>
           <a:extLst>
             <a:ext uri="{909E8E84-426E-40dd-AFC4-6F175D3DCCD1}">
-              <a14:hiddenFill xmlns="" xmlns:a14="http://schemas.microsoft.com/office/drawing/2010/main">
+              <a14:hiddenFill xmlns:a14="http://schemas.microsoft.com/office/drawing/2010/main" xmlns="">
                 <a:solidFill>
                   <a:srgbClr val="FFFFFF"/>
                 </a:solidFill>
@@ -1795,7 +1795,7 @@
           <a:noFill/>
           <a:extLst>
             <a:ext uri="{909E8E84-426E-40dd-AFC4-6F175D3DCCD1}">
-              <a14:hiddenFill xmlns="" xmlns:a14="http://schemas.microsoft.com/office/drawing/2010/main">
+              <a14:hiddenFill xmlns:a14="http://schemas.microsoft.com/office/drawing/2010/main" xmlns="">
                 <a:solidFill>
                   <a:srgbClr val="FFFFFF"/>
                 </a:solidFill>
@@ -1981,7 +1981,7 @@
           <a:noFill/>
           <a:extLst>
             <a:ext uri="{909E8E84-426E-40dd-AFC4-6F175D3DCCD1}">
-              <a14:hiddenFill xmlns="" xmlns:a14="http://schemas.microsoft.com/office/drawing/2010/main">
+              <a14:hiddenFill xmlns:a14="http://schemas.microsoft.com/office/drawing/2010/main" xmlns="">
                 <a:solidFill>
                   <a:srgbClr val="FFFFFF"/>
                 </a:solidFill>
@@ -2196,7 +2196,7 @@
           <a:noFill/>
           <a:extLst>
             <a:ext uri="{909E8E84-426E-40dd-AFC4-6F175D3DCCD1}">
-              <a14:hiddenFill xmlns="" xmlns:a14="http://schemas.microsoft.com/office/drawing/2010/main">
+              <a14:hiddenFill xmlns:a14="http://schemas.microsoft.com/office/drawing/2010/main" xmlns="">
                 <a:solidFill>
                   <a:srgbClr val="FFFFFF"/>
                 </a:solidFill>
@@ -2412,7 +2412,7 @@
           <a:noFill/>
           <a:extLst>
             <a:ext uri="{909E8E84-426E-40dd-AFC4-6F175D3DCCD1}">
-              <a14:hiddenFill xmlns="" xmlns:a14="http://schemas.microsoft.com/office/drawing/2010/main">
+              <a14:hiddenFill xmlns:a14="http://schemas.microsoft.com/office/drawing/2010/main" xmlns="">
                 <a:solidFill>
                   <a:srgbClr val="FFFFFF"/>
                 </a:solidFill>
@@ -2627,7 +2627,7 @@
           <a:noFill/>
           <a:extLst>
             <a:ext uri="{909E8E84-426E-40dd-AFC4-6F175D3DCCD1}">
-              <a14:hiddenFill xmlns="" xmlns:a14="http://schemas.microsoft.com/office/drawing/2010/main">
+              <a14:hiddenFill xmlns:a14="http://schemas.microsoft.com/office/drawing/2010/main" xmlns="">
                 <a:solidFill>
                   <a:srgbClr val="FFFFFF"/>
                 </a:solidFill>
@@ -2843,7 +2843,7 @@
           <a:noFill/>
           <a:extLst>
             <a:ext uri="{909E8E84-426E-40dd-AFC4-6F175D3DCCD1}">
-              <a14:hiddenFill xmlns="" xmlns:a14="http://schemas.microsoft.com/office/drawing/2010/main">
+              <a14:hiddenFill xmlns:a14="http://schemas.microsoft.com/office/drawing/2010/main" xmlns="">
                 <a:solidFill>
                   <a:srgbClr val="FFFFFF"/>
                 </a:solidFill>
@@ -3206,7 +3206,7 @@
           <a:noFill/>
           <a:extLst>
             <a:ext uri="{909E8E84-426E-40dd-AFC4-6F175D3DCCD1}">
-              <a14:hiddenFill xmlns="" xmlns:a14="http://schemas.microsoft.com/office/drawing/2010/main">
+              <a14:hiddenFill xmlns:a14="http://schemas.microsoft.com/office/drawing/2010/main" xmlns="">
                 <a:solidFill>
                   <a:srgbClr val="FFFFFF"/>
                 </a:solidFill>
@@ -3245,7 +3245,7 @@
           <a:noFill/>
           <a:extLst>
             <a:ext uri="{909E8E84-426E-40dd-AFC4-6F175D3DCCD1}">
-              <a14:hiddenFill xmlns="" xmlns:a14="http://schemas.microsoft.com/office/drawing/2010/main">
+              <a14:hiddenFill xmlns:a14="http://schemas.microsoft.com/office/drawing/2010/main" xmlns="">
                 <a:solidFill>
                   <a:srgbClr val="FFFFFF"/>
                 </a:solidFill>
@@ -3284,7 +3284,7 @@
           <a:noFill/>
           <a:extLst>
             <a:ext uri="{909E8E84-426E-40dd-AFC4-6F175D3DCCD1}">
-              <a14:hiddenFill xmlns="" xmlns:a14="http://schemas.microsoft.com/office/drawing/2010/main">
+              <a14:hiddenFill xmlns:a14="http://schemas.microsoft.com/office/drawing/2010/main" xmlns="">
                 <a:solidFill>
                   <a:srgbClr val="FFFFFF"/>
                 </a:solidFill>
@@ -3470,7 +3470,7 @@
           <a:noFill/>
           <a:extLst>
             <a:ext uri="{909E8E84-426E-40dd-AFC4-6F175D3DCCD1}">
-              <a14:hiddenFill xmlns="" xmlns:a14="http://schemas.microsoft.com/office/drawing/2010/main">
+              <a14:hiddenFill xmlns:a14="http://schemas.microsoft.com/office/drawing/2010/main" xmlns="">
                 <a:solidFill>
                   <a:srgbClr val="FFFFFF"/>
                 </a:solidFill>
@@ -3627,7 +3627,7 @@
           <a:noFill/>
           <a:extLst>
             <a:ext uri="{909E8E84-426E-40dd-AFC4-6F175D3DCCD1}">
-              <a14:hiddenFill xmlns="" xmlns:a14="http://schemas.microsoft.com/office/drawing/2010/main">
+              <a14:hiddenFill xmlns:a14="http://schemas.microsoft.com/office/drawing/2010/main" xmlns="">
                 <a:solidFill>
                   <a:srgbClr val="FFFFFF"/>
                 </a:solidFill>
@@ -3704,7 +3704,7 @@
           <a:noFill/>
           <a:extLst>
             <a:ext uri="{909E8E84-426E-40dd-AFC4-6F175D3DCCD1}">
-              <a14:hiddenFill xmlns="" xmlns:a14="http://schemas.microsoft.com/office/drawing/2010/main">
+              <a14:hiddenFill xmlns:a14="http://schemas.microsoft.com/office/drawing/2010/main" xmlns="">
                 <a:solidFill>
                   <a:srgbClr val="FFFFFF"/>
                 </a:solidFill>
@@ -3743,7 +3743,7 @@
           <a:noFill/>
           <a:extLst>
             <a:ext uri="{909E8E84-426E-40dd-AFC4-6F175D3DCCD1}">
-              <a14:hiddenFill xmlns="" xmlns:a14="http://schemas.microsoft.com/office/drawing/2010/main">
+              <a14:hiddenFill xmlns:a14="http://schemas.microsoft.com/office/drawing/2010/main" xmlns="">
                 <a:solidFill>
                   <a:srgbClr val="FFFFFF"/>
                 </a:solidFill>
@@ -3929,7 +3929,7 @@
           <a:noFill/>
           <a:extLst>
             <a:ext uri="{909E8E84-426E-40dd-AFC4-6F175D3DCCD1}">
-              <a14:hiddenFill xmlns="" xmlns:a14="http://schemas.microsoft.com/office/drawing/2010/main">
+              <a14:hiddenFill xmlns:a14="http://schemas.microsoft.com/office/drawing/2010/main" xmlns="">
                 <a:solidFill>
                   <a:srgbClr val="FFFFFF"/>
                 </a:solidFill>
@@ -4144,7 +4144,7 @@
           <a:noFill/>
           <a:extLst>
             <a:ext uri="{909E8E84-426E-40dd-AFC4-6F175D3DCCD1}">
-              <a14:hiddenFill xmlns="" xmlns:a14="http://schemas.microsoft.com/office/drawing/2010/main">
+              <a14:hiddenFill xmlns:a14="http://schemas.microsoft.com/office/drawing/2010/main" xmlns="">
                 <a:solidFill>
                   <a:srgbClr val="FFFFFF"/>
                 </a:solidFill>
@@ -4294,7 +4294,7 @@
           <a:noFill/>
           <a:extLst>
             <a:ext uri="{909E8E84-426E-40dd-AFC4-6F175D3DCCD1}">
-              <a14:hiddenFill xmlns="" xmlns:a14="http://schemas.microsoft.com/office/drawing/2010/main">
+              <a14:hiddenFill xmlns:a14="http://schemas.microsoft.com/office/drawing/2010/main" xmlns="">
                 <a:solidFill>
                   <a:srgbClr val="FFFFFF"/>
                 </a:solidFill>
@@ -4371,7 +4371,7 @@
           <a:noFill/>
           <a:extLst>
             <a:ext uri="{909E8E84-426E-40dd-AFC4-6F175D3DCCD1}">
-              <a14:hiddenFill xmlns="" xmlns:a14="http://schemas.microsoft.com/office/drawing/2010/main">
+              <a14:hiddenFill xmlns:a14="http://schemas.microsoft.com/office/drawing/2010/main" xmlns="">
                 <a:solidFill>
                   <a:srgbClr val="FFFFFF"/>
                 </a:solidFill>
@@ -4587,7 +4587,7 @@
           <a:noFill/>
           <a:extLst>
             <a:ext uri="{909E8E84-426E-40dd-AFC4-6F175D3DCCD1}">
-              <a14:hiddenFill xmlns="" xmlns:a14="http://schemas.microsoft.com/office/drawing/2010/main">
+              <a14:hiddenFill xmlns:a14="http://schemas.microsoft.com/office/drawing/2010/main" xmlns="">
                 <a:solidFill>
                   <a:srgbClr val="FFFFFF"/>
                 </a:solidFill>
@@ -4737,7 +4737,7 @@
           <a:noFill/>
           <a:extLst>
             <a:ext uri="{909E8E84-426E-40dd-AFC4-6F175D3DCCD1}">
-              <a14:hiddenFill xmlns="" xmlns:a14="http://schemas.microsoft.com/office/drawing/2010/main">
+              <a14:hiddenFill xmlns:a14="http://schemas.microsoft.com/office/drawing/2010/main" xmlns="">
                 <a:solidFill>
                   <a:srgbClr val="FFFFFF"/>
                 </a:solidFill>
@@ -4814,7 +4814,7 @@
           <a:noFill/>
           <a:extLst>
             <a:ext uri="{909E8E84-426E-40dd-AFC4-6F175D3DCCD1}">
-              <a14:hiddenFill xmlns="" xmlns:a14="http://schemas.microsoft.com/office/drawing/2010/main">
+              <a14:hiddenFill xmlns:a14="http://schemas.microsoft.com/office/drawing/2010/main" xmlns="">
                 <a:solidFill>
                   <a:srgbClr val="FFFFFF"/>
                 </a:solidFill>
@@ -4961,7 +4961,7 @@
           <a:noFill/>
           <a:extLst>
             <a:ext uri="{909E8E84-426E-40dd-AFC4-6F175D3DCCD1}">
-              <a14:hiddenFill xmlns="" xmlns:a14="http://schemas.microsoft.com/office/drawing/2010/main">
+              <a14:hiddenFill xmlns:a14="http://schemas.microsoft.com/office/drawing/2010/main" xmlns="">
                 <a:solidFill>
                   <a:srgbClr val="FFFFFF"/>
                 </a:solidFill>
@@ -14292,7 +14292,9 @@
         </p:nvSpPr>
         <p:spPr/>
         <p:txBody>
-          <a:bodyPr/>
+          <a:bodyPr>
+            <a:normAutofit lnSpcReduction="10000"/>
+          </a:bodyPr>
           <a:lstStyle/>
           <a:p>
             <a:r>
@@ -14332,6 +14334,31 @@
               <a:rPr lang="en-US" dirty="0"/>
               <a:t>If you do a push and a pull, you have synced the repositories.</a:t>
             </a:r>
+          </a:p>
+          <a:p>
+            <a:r>
+              <a:rPr lang="en-US" dirty="0"/>
+              <a:t>Pull Request</a:t>
+            </a:r>
+          </a:p>
+          <a:p>
+            <a:pPr lvl="1"/>
+            <a:r>
+              <a:rPr lang="en-US" dirty="0"/>
+              <a:t>A request to take a forked branch and merge it back to an upstream branch. For instance, merging a feature branch into master.</a:t>
+            </a:r>
+          </a:p>
+          <a:p>
+            <a:pPr lvl="1"/>
+            <a:r>
+              <a:rPr lang="en-US" dirty="0"/>
+              <a:t>This provides a chance for others to review the code, make comments, and revise the code before it </a:t>
+            </a:r>
+            <a:r>
+              <a:rPr lang="en-US"/>
+              <a:t>is merged.</a:t>
+            </a:r>
+            <a:endParaRPr lang="en-US" dirty="0"/>
           </a:p>
           <a:p>
             <a:endParaRPr lang="en-US" dirty="0"/>

</xml_diff>